<commit_message>
checkpoint so I don't lose anything
</commit_message>
<xml_diff>
--- a/files/diagrams.pptx
+++ b/files/diagrams.pptx
@@ -6,6 +6,7 @@
   </p:sldMasterIdLst>
   <p:sldIdLst>
     <p:sldId id="256" r:id="rId2"/>
+    <p:sldId id="257" r:id="rId3"/>
   </p:sldIdLst>
   <p:sldSz cx="12192000" cy="6858000"/>
   <p:notesSz cx="6858000" cy="9144000"/>
@@ -261,7 +262,7 @@
           <a:p>
             <a:fld id="{0C1DC71D-3ED4-6E45-B7B6-4C096A8C78F7}" type="datetimeFigureOut">
               <a:rPr lang="en-US" smtClean="0"/>
-              <a:t>6/29/23</a:t>
+              <a:t>12/13/23</a:t>
             </a:fld>
             <a:endParaRPr lang="en-US"/>
           </a:p>
@@ -461,7 +462,7 @@
           <a:p>
             <a:fld id="{0C1DC71D-3ED4-6E45-B7B6-4C096A8C78F7}" type="datetimeFigureOut">
               <a:rPr lang="en-US" smtClean="0"/>
-              <a:t>6/29/23</a:t>
+              <a:t>12/13/23</a:t>
             </a:fld>
             <a:endParaRPr lang="en-US"/>
           </a:p>
@@ -671,7 +672,7 @@
           <a:p>
             <a:fld id="{0C1DC71D-3ED4-6E45-B7B6-4C096A8C78F7}" type="datetimeFigureOut">
               <a:rPr lang="en-US" smtClean="0"/>
-              <a:t>6/29/23</a:t>
+              <a:t>12/13/23</a:t>
             </a:fld>
             <a:endParaRPr lang="en-US"/>
           </a:p>
@@ -871,7 +872,7 @@
           <a:p>
             <a:fld id="{0C1DC71D-3ED4-6E45-B7B6-4C096A8C78F7}" type="datetimeFigureOut">
               <a:rPr lang="en-US" smtClean="0"/>
-              <a:t>6/29/23</a:t>
+              <a:t>12/13/23</a:t>
             </a:fld>
             <a:endParaRPr lang="en-US"/>
           </a:p>
@@ -1147,7 +1148,7 @@
           <a:p>
             <a:fld id="{0C1DC71D-3ED4-6E45-B7B6-4C096A8C78F7}" type="datetimeFigureOut">
               <a:rPr lang="en-US" smtClean="0"/>
-              <a:t>6/29/23</a:t>
+              <a:t>12/13/23</a:t>
             </a:fld>
             <a:endParaRPr lang="en-US"/>
           </a:p>
@@ -1415,7 +1416,7 @@
           <a:p>
             <a:fld id="{0C1DC71D-3ED4-6E45-B7B6-4C096A8C78F7}" type="datetimeFigureOut">
               <a:rPr lang="en-US" smtClean="0"/>
-              <a:t>6/29/23</a:t>
+              <a:t>12/13/23</a:t>
             </a:fld>
             <a:endParaRPr lang="en-US"/>
           </a:p>
@@ -1830,7 +1831,7 @@
           <a:p>
             <a:fld id="{0C1DC71D-3ED4-6E45-B7B6-4C096A8C78F7}" type="datetimeFigureOut">
               <a:rPr lang="en-US" smtClean="0"/>
-              <a:t>6/29/23</a:t>
+              <a:t>12/13/23</a:t>
             </a:fld>
             <a:endParaRPr lang="en-US"/>
           </a:p>
@@ -1972,7 +1973,7 @@
           <a:p>
             <a:fld id="{0C1DC71D-3ED4-6E45-B7B6-4C096A8C78F7}" type="datetimeFigureOut">
               <a:rPr lang="en-US" smtClean="0"/>
-              <a:t>6/29/23</a:t>
+              <a:t>12/13/23</a:t>
             </a:fld>
             <a:endParaRPr lang="en-US"/>
           </a:p>
@@ -2085,7 +2086,7 @@
           <a:p>
             <a:fld id="{0C1DC71D-3ED4-6E45-B7B6-4C096A8C78F7}" type="datetimeFigureOut">
               <a:rPr lang="en-US" smtClean="0"/>
-              <a:t>6/29/23</a:t>
+              <a:t>12/13/23</a:t>
             </a:fld>
             <a:endParaRPr lang="en-US"/>
           </a:p>
@@ -2398,7 +2399,7 @@
           <a:p>
             <a:fld id="{0C1DC71D-3ED4-6E45-B7B6-4C096A8C78F7}" type="datetimeFigureOut">
               <a:rPr lang="en-US" smtClean="0"/>
-              <a:t>6/29/23</a:t>
+              <a:t>12/13/23</a:t>
             </a:fld>
             <a:endParaRPr lang="en-US"/>
           </a:p>
@@ -2687,7 +2688,7 @@
           <a:p>
             <a:fld id="{0C1DC71D-3ED4-6E45-B7B6-4C096A8C78F7}" type="datetimeFigureOut">
               <a:rPr lang="en-US" smtClean="0"/>
-              <a:t>6/29/23</a:t>
+              <a:t>12/13/23</a:t>
             </a:fld>
             <a:endParaRPr lang="en-US"/>
           </a:p>
@@ -2930,7 +2931,7 @@
           <a:p>
             <a:fld id="{0C1DC71D-3ED4-6E45-B7B6-4C096A8C78F7}" type="datetimeFigureOut">
               <a:rPr lang="en-US" smtClean="0"/>
-              <a:t>6/29/23</a:t>
+              <a:t>12/13/23</a:t>
             </a:fld>
             <a:endParaRPr lang="en-US"/>
           </a:p>
@@ -4146,842 +4147,821 @@
           </a:p>
         </p:txBody>
       </p:sp>
-      <p:grpSp>
-        <p:nvGrpSpPr>
-          <p:cNvPr id="2" name="Group 1">
-            <a:extLst>
-              <a:ext uri="{FF2B5EF4-FFF2-40B4-BE49-F238E27FC236}">
-                <a16:creationId xmlns:a16="http://schemas.microsoft.com/office/drawing/2014/main" id="{AC893E03-146E-BB5B-993A-8D0DEE2A359F}"/>
-              </a:ext>
-            </a:extLst>
-          </p:cNvPr>
-          <p:cNvGrpSpPr/>
+      <p:sp>
+        <p:nvSpPr>
+          <p:cNvPr id="4" name="Oval 3">
+            <a:extLst>
+              <a:ext uri="{FF2B5EF4-FFF2-40B4-BE49-F238E27FC236}">
+                <a16:creationId xmlns:a16="http://schemas.microsoft.com/office/drawing/2014/main" id="{813EF3B2-4DC8-DF40-D77A-390CAB716224}"/>
+              </a:ext>
+            </a:extLst>
+          </p:cNvPr>
+          <p:cNvSpPr/>
           <p:nvPr/>
-        </p:nvGrpSpPr>
-        <p:grpSpPr>
-          <a:xfrm>
-            <a:off x="344951" y="160197"/>
-            <a:ext cx="3266274" cy="2854554"/>
-            <a:chOff x="344951" y="160197"/>
-            <a:chExt cx="3266274" cy="2854554"/>
-          </a:xfrm>
-        </p:grpSpPr>
-        <p:sp>
-          <p:nvSpPr>
-            <p:cNvPr id="4" name="Oval 3">
-              <a:extLst>
-                <a:ext uri="{FF2B5EF4-FFF2-40B4-BE49-F238E27FC236}">
-                  <a16:creationId xmlns:a16="http://schemas.microsoft.com/office/drawing/2014/main" id="{813EF3B2-4DC8-DF40-D77A-390CAB716224}"/>
-                </a:ext>
-              </a:extLst>
-            </p:cNvPr>
-            <p:cNvSpPr/>
-            <p:nvPr/>
-          </p:nvSpPr>
-          <p:spPr>
-            <a:xfrm>
-              <a:off x="512429" y="710892"/>
-              <a:ext cx="678656" cy="635794"/>
-            </a:xfrm>
-            <a:prstGeom prst="ellipse">
-              <a:avLst/>
-            </a:prstGeom>
+        </p:nvSpPr>
+        <p:spPr>
+          <a:xfrm>
+            <a:off x="512429" y="710892"/>
+            <a:ext cx="678656" cy="635794"/>
+          </a:xfrm>
+          <a:prstGeom prst="ellipse">
+            <a:avLst/>
+          </a:prstGeom>
+          <a:solidFill>
+            <a:srgbClr val="FEF8EF"/>
+          </a:solidFill>
+          <a:ln>
             <a:solidFill>
-              <a:srgbClr val="FEF8EF"/>
+              <a:srgbClr val="EFC479"/>
             </a:solidFill>
-            <a:ln>
-              <a:solidFill>
-                <a:srgbClr val="EFC479"/>
-              </a:solidFill>
-            </a:ln>
-          </p:spPr>
-          <p:style>
-            <a:lnRef idx="2">
-              <a:schemeClr val="accent1">
-                <a:shade val="15000"/>
-              </a:schemeClr>
-            </a:lnRef>
-            <a:fillRef idx="1">
-              <a:schemeClr val="accent1"/>
-            </a:fillRef>
-            <a:effectRef idx="0">
-              <a:schemeClr val="accent1"/>
-            </a:effectRef>
-            <a:fontRef idx="minor">
-              <a:schemeClr val="lt1"/>
-            </a:fontRef>
-          </p:style>
-          <p:txBody>
-            <a:bodyPr rtlCol="0" anchor="ctr"/>
-            <a:lstStyle/>
-            <a:p>
-              <a:pPr algn="ctr"/>
-              <a:r>
-                <a:rPr lang="en-US" sz="1200" dirty="0">
-                  <a:solidFill>
-                    <a:schemeClr val="tx1"/>
-                  </a:solidFill>
-                </a:rPr>
-                <a:t>-</a:t>
-              </a:r>
-            </a:p>
-          </p:txBody>
-        </p:sp>
-        <p:sp>
-          <p:nvSpPr>
-            <p:cNvPr id="6" name="TextBox 5">
-              <a:extLst>
-                <a:ext uri="{FF2B5EF4-FFF2-40B4-BE49-F238E27FC236}">
-                  <a16:creationId xmlns:a16="http://schemas.microsoft.com/office/drawing/2014/main" id="{0E9AE8AF-0C83-C9EE-4735-CD91C4042C98}"/>
-                </a:ext>
-              </a:extLst>
-            </p:cNvPr>
-            <p:cNvSpPr txBox="1"/>
-            <p:nvPr/>
-          </p:nvSpPr>
-          <p:spPr>
-            <a:xfrm>
-              <a:off x="344951" y="298697"/>
-              <a:ext cx="1013611" cy="369332"/>
-            </a:xfrm>
-            <a:prstGeom prst="rect">
-              <a:avLst/>
-            </a:prstGeom>
-            <a:noFill/>
-          </p:spPr>
-          <p:txBody>
-            <a:bodyPr wrap="square" rtlCol="0">
-              <a:spAutoFit/>
-            </a:bodyPr>
-            <a:lstStyle/>
-            <a:p>
-              <a:r>
-                <a:rPr lang="en-US" dirty="0"/>
-                <a:t>Thread 0</a:t>
-              </a:r>
-            </a:p>
-          </p:txBody>
-        </p:sp>
-        <p:sp>
-          <p:nvSpPr>
-            <p:cNvPr id="7" name="TextBox 6">
-              <a:extLst>
-                <a:ext uri="{FF2B5EF4-FFF2-40B4-BE49-F238E27FC236}">
-                  <a16:creationId xmlns:a16="http://schemas.microsoft.com/office/drawing/2014/main" id="{6FE10DDD-EF62-529D-921A-4C03EC1ABC2A}"/>
-                </a:ext>
-              </a:extLst>
-            </p:cNvPr>
-            <p:cNvSpPr txBox="1"/>
-            <p:nvPr/>
-          </p:nvSpPr>
-          <p:spPr>
-            <a:xfrm>
-              <a:off x="2597614" y="298697"/>
-              <a:ext cx="1013611" cy="369332"/>
-            </a:xfrm>
-            <a:prstGeom prst="rect">
-              <a:avLst/>
-            </a:prstGeom>
-            <a:noFill/>
-          </p:spPr>
-          <p:txBody>
-            <a:bodyPr wrap="square" rtlCol="0">
-              <a:spAutoFit/>
-            </a:bodyPr>
-            <a:lstStyle/>
-            <a:p>
-              <a:r>
-                <a:rPr lang="en-US" dirty="0"/>
-                <a:t>Thread 1</a:t>
-              </a:r>
-            </a:p>
-          </p:txBody>
-        </p:sp>
-        <p:sp>
-          <p:nvSpPr>
-            <p:cNvPr id="8" name="Rounded Rectangle 7">
-              <a:extLst>
-                <a:ext uri="{FF2B5EF4-FFF2-40B4-BE49-F238E27FC236}">
-                  <a16:creationId xmlns:a16="http://schemas.microsoft.com/office/drawing/2014/main" id="{E9CF7F07-049D-CA7E-0634-E53E000DDAB1}"/>
-                </a:ext>
-              </a:extLst>
-            </p:cNvPr>
-            <p:cNvSpPr/>
-            <p:nvPr/>
-          </p:nvSpPr>
-          <p:spPr>
-            <a:xfrm>
-              <a:off x="1638759" y="1350257"/>
-              <a:ext cx="678657" cy="514350"/>
-            </a:xfrm>
-            <a:prstGeom prst="roundRect">
-              <a:avLst/>
-            </a:prstGeom>
+          </a:ln>
+        </p:spPr>
+        <p:style>
+          <a:lnRef idx="2">
+            <a:schemeClr val="accent1">
+              <a:shade val="15000"/>
+            </a:schemeClr>
+          </a:lnRef>
+          <a:fillRef idx="1">
+            <a:schemeClr val="accent1"/>
+          </a:fillRef>
+          <a:effectRef idx="0">
+            <a:schemeClr val="accent1"/>
+          </a:effectRef>
+          <a:fontRef idx="minor">
+            <a:schemeClr val="lt1"/>
+          </a:fontRef>
+        </p:style>
+        <p:txBody>
+          <a:bodyPr rtlCol="0" anchor="ctr"/>
+          <a:lstStyle/>
+          <a:p>
+            <a:pPr algn="ctr"/>
+            <a:r>
+              <a:rPr lang="en-US" sz="1200" dirty="0">
+                <a:solidFill>
+                  <a:schemeClr val="tx1"/>
+                </a:solidFill>
+              </a:rPr>
+              <a:t>-</a:t>
+            </a:r>
+          </a:p>
+        </p:txBody>
+      </p:sp>
+      <p:sp>
+        <p:nvSpPr>
+          <p:cNvPr id="6" name="TextBox 5">
+            <a:extLst>
+              <a:ext uri="{FF2B5EF4-FFF2-40B4-BE49-F238E27FC236}">
+                <a16:creationId xmlns:a16="http://schemas.microsoft.com/office/drawing/2014/main" id="{0E9AE8AF-0C83-C9EE-4735-CD91C4042C98}"/>
+              </a:ext>
+            </a:extLst>
+          </p:cNvPr>
+          <p:cNvSpPr txBox="1"/>
+          <p:nvPr/>
+        </p:nvSpPr>
+        <p:spPr>
+          <a:xfrm>
+            <a:off x="344951" y="298697"/>
+            <a:ext cx="1013611" cy="369332"/>
+          </a:xfrm>
+          <a:prstGeom prst="rect">
+            <a:avLst/>
+          </a:prstGeom>
+          <a:noFill/>
+        </p:spPr>
+        <p:txBody>
+          <a:bodyPr wrap="square" rtlCol="0">
+            <a:spAutoFit/>
+          </a:bodyPr>
+          <a:lstStyle/>
+          <a:p>
+            <a:r>
+              <a:rPr lang="en-US" dirty="0"/>
+              <a:t>Thread 0</a:t>
+            </a:r>
+          </a:p>
+        </p:txBody>
+      </p:sp>
+      <p:sp>
+        <p:nvSpPr>
+          <p:cNvPr id="7" name="TextBox 6">
+            <a:extLst>
+              <a:ext uri="{FF2B5EF4-FFF2-40B4-BE49-F238E27FC236}">
+                <a16:creationId xmlns:a16="http://schemas.microsoft.com/office/drawing/2014/main" id="{6FE10DDD-EF62-529D-921A-4C03EC1ABC2A}"/>
+              </a:ext>
+            </a:extLst>
+          </p:cNvPr>
+          <p:cNvSpPr txBox="1"/>
+          <p:nvPr/>
+        </p:nvSpPr>
+        <p:spPr>
+          <a:xfrm>
+            <a:off x="2597614" y="298697"/>
+            <a:ext cx="1013611" cy="369332"/>
+          </a:xfrm>
+          <a:prstGeom prst="rect">
+            <a:avLst/>
+          </a:prstGeom>
+          <a:noFill/>
+        </p:spPr>
+        <p:txBody>
+          <a:bodyPr wrap="square" rtlCol="0">
+            <a:spAutoFit/>
+          </a:bodyPr>
+          <a:lstStyle/>
+          <a:p>
+            <a:r>
+              <a:rPr lang="en-US" dirty="0"/>
+              <a:t>Thread 1</a:t>
+            </a:r>
+          </a:p>
+        </p:txBody>
+      </p:sp>
+      <p:sp>
+        <p:nvSpPr>
+          <p:cNvPr id="8" name="Rounded Rectangle 7">
+            <a:extLst>
+              <a:ext uri="{FF2B5EF4-FFF2-40B4-BE49-F238E27FC236}">
+                <a16:creationId xmlns:a16="http://schemas.microsoft.com/office/drawing/2014/main" id="{E9CF7F07-049D-CA7E-0634-E53E000DDAB1}"/>
+              </a:ext>
+            </a:extLst>
+          </p:cNvPr>
+          <p:cNvSpPr/>
+          <p:nvPr/>
+        </p:nvSpPr>
+        <p:spPr>
+          <a:xfrm>
+            <a:off x="1638759" y="1350257"/>
+            <a:ext cx="678657" cy="514350"/>
+          </a:xfrm>
+          <a:prstGeom prst="roundRect">
+            <a:avLst/>
+          </a:prstGeom>
+          <a:solidFill>
+            <a:srgbClr val="EFFDF2"/>
+          </a:solidFill>
+          <a:ln>
             <a:solidFill>
-              <a:srgbClr val="EFFDF2"/>
+              <a:srgbClr val="7EE892"/>
             </a:solidFill>
-            <a:ln>
-              <a:solidFill>
-                <a:srgbClr val="7EE892"/>
-              </a:solidFill>
-            </a:ln>
-          </p:spPr>
-          <p:style>
-            <a:lnRef idx="2">
-              <a:schemeClr val="accent1">
-                <a:shade val="15000"/>
-              </a:schemeClr>
-            </a:lnRef>
-            <a:fillRef idx="1">
-              <a:schemeClr val="accent1"/>
-            </a:fillRef>
-            <a:effectRef idx="0">
-              <a:schemeClr val="accent1"/>
-            </a:effectRef>
-            <a:fontRef idx="minor">
-              <a:schemeClr val="lt1"/>
-            </a:fontRef>
-          </p:style>
-          <p:txBody>
-            <a:bodyPr rtlCol="0" anchor="ctr"/>
-            <a:lstStyle/>
-            <a:p>
-              <a:pPr algn="ctr"/>
-              <a:r>
-                <a:rPr lang="en-US" sz="1200" dirty="0">
-                  <a:solidFill>
-                    <a:schemeClr val="tx1"/>
-                  </a:solidFill>
-                </a:rPr>
-                <a:t>0</a:t>
-              </a:r>
-            </a:p>
-          </p:txBody>
-        </p:sp>
-        <p:sp>
-          <p:nvSpPr>
-            <p:cNvPr id="9" name="Oval 8">
-              <a:extLst>
-                <a:ext uri="{FF2B5EF4-FFF2-40B4-BE49-F238E27FC236}">
-                  <a16:creationId xmlns:a16="http://schemas.microsoft.com/office/drawing/2014/main" id="{5EC9C622-C996-6F5B-4F08-B7F3CD0552D3}"/>
-                </a:ext>
-              </a:extLst>
-            </p:cNvPr>
-            <p:cNvSpPr/>
-            <p:nvPr/>
-          </p:nvSpPr>
-          <p:spPr>
-            <a:xfrm>
-              <a:off x="512429" y="1864607"/>
-              <a:ext cx="678656" cy="635794"/>
-            </a:xfrm>
-            <a:prstGeom prst="ellipse">
-              <a:avLst/>
-            </a:prstGeom>
+          </a:ln>
+        </p:spPr>
+        <p:style>
+          <a:lnRef idx="2">
+            <a:schemeClr val="accent1">
+              <a:shade val="15000"/>
+            </a:schemeClr>
+          </a:lnRef>
+          <a:fillRef idx="1">
+            <a:schemeClr val="accent1"/>
+          </a:fillRef>
+          <a:effectRef idx="0">
+            <a:schemeClr val="accent1"/>
+          </a:effectRef>
+          <a:fontRef idx="minor">
+            <a:schemeClr val="lt1"/>
+          </a:fontRef>
+        </p:style>
+        <p:txBody>
+          <a:bodyPr rtlCol="0" anchor="ctr"/>
+          <a:lstStyle/>
+          <a:p>
+            <a:pPr algn="ctr"/>
+            <a:r>
+              <a:rPr lang="en-US" sz="1200" dirty="0">
+                <a:solidFill>
+                  <a:schemeClr val="tx1"/>
+                </a:solidFill>
+              </a:rPr>
+              <a:t>0</a:t>
+            </a:r>
+          </a:p>
+        </p:txBody>
+      </p:sp>
+      <p:sp>
+        <p:nvSpPr>
+          <p:cNvPr id="9" name="Oval 8">
+            <a:extLst>
+              <a:ext uri="{FF2B5EF4-FFF2-40B4-BE49-F238E27FC236}">
+                <a16:creationId xmlns:a16="http://schemas.microsoft.com/office/drawing/2014/main" id="{5EC9C622-C996-6F5B-4F08-B7F3CD0552D3}"/>
+              </a:ext>
+            </a:extLst>
+          </p:cNvPr>
+          <p:cNvSpPr/>
+          <p:nvPr/>
+        </p:nvSpPr>
+        <p:spPr>
+          <a:xfrm>
+            <a:off x="512429" y="1864607"/>
+            <a:ext cx="678656" cy="635794"/>
+          </a:xfrm>
+          <a:prstGeom prst="ellipse">
+            <a:avLst/>
+          </a:prstGeom>
+          <a:solidFill>
+            <a:srgbClr val="FEF8EF"/>
+          </a:solidFill>
+          <a:ln>
             <a:solidFill>
-              <a:srgbClr val="FEF8EF"/>
+              <a:srgbClr val="EFC479"/>
             </a:solidFill>
-            <a:ln>
-              <a:solidFill>
-                <a:srgbClr val="EFC479"/>
-              </a:solidFill>
-            </a:ln>
-          </p:spPr>
-          <p:style>
-            <a:lnRef idx="2">
-              <a:schemeClr val="accent1">
-                <a:shade val="15000"/>
-              </a:schemeClr>
-            </a:lnRef>
-            <a:fillRef idx="1">
-              <a:schemeClr val="accent1"/>
-            </a:fillRef>
-            <a:effectRef idx="0">
-              <a:schemeClr val="accent1"/>
-            </a:effectRef>
-            <a:fontRef idx="minor">
-              <a:schemeClr val="lt1"/>
-            </a:fontRef>
-          </p:style>
-          <p:txBody>
-            <a:bodyPr rtlCol="0" anchor="ctr"/>
-            <a:lstStyle/>
-            <a:p>
-              <a:pPr algn="ctr"/>
-              <a:r>
-                <a:rPr lang="en-US" sz="1200" dirty="0">
-                  <a:solidFill>
-                    <a:schemeClr val="tx1"/>
-                  </a:solidFill>
-                </a:rPr>
-                <a:t>0</a:t>
-              </a:r>
-            </a:p>
-          </p:txBody>
-        </p:sp>
-        <p:sp>
-          <p:nvSpPr>
-            <p:cNvPr id="10" name="Oval 9">
-              <a:extLst>
-                <a:ext uri="{FF2B5EF4-FFF2-40B4-BE49-F238E27FC236}">
-                  <a16:creationId xmlns:a16="http://schemas.microsoft.com/office/drawing/2014/main" id="{45DC1207-73FB-0B61-78B6-CE8A1A5E6A81}"/>
-                </a:ext>
-              </a:extLst>
-            </p:cNvPr>
-            <p:cNvSpPr/>
-            <p:nvPr/>
-          </p:nvSpPr>
-          <p:spPr>
-            <a:xfrm>
-              <a:off x="2765092" y="757684"/>
-              <a:ext cx="678656" cy="635794"/>
-            </a:xfrm>
-            <a:prstGeom prst="ellipse">
-              <a:avLst/>
-            </a:prstGeom>
+          </a:ln>
+        </p:spPr>
+        <p:style>
+          <a:lnRef idx="2">
+            <a:schemeClr val="accent1">
+              <a:shade val="15000"/>
+            </a:schemeClr>
+          </a:lnRef>
+          <a:fillRef idx="1">
+            <a:schemeClr val="accent1"/>
+          </a:fillRef>
+          <a:effectRef idx="0">
+            <a:schemeClr val="accent1"/>
+          </a:effectRef>
+          <a:fontRef idx="minor">
+            <a:schemeClr val="lt1"/>
+          </a:fontRef>
+        </p:style>
+        <p:txBody>
+          <a:bodyPr rtlCol="0" anchor="ctr"/>
+          <a:lstStyle/>
+          <a:p>
+            <a:pPr algn="ctr"/>
+            <a:r>
+              <a:rPr lang="en-US" sz="1200" dirty="0">
+                <a:solidFill>
+                  <a:schemeClr val="tx1"/>
+                </a:solidFill>
+              </a:rPr>
+              <a:t>0</a:t>
+            </a:r>
+          </a:p>
+        </p:txBody>
+      </p:sp>
+      <p:sp>
+        <p:nvSpPr>
+          <p:cNvPr id="10" name="Oval 9">
+            <a:extLst>
+              <a:ext uri="{FF2B5EF4-FFF2-40B4-BE49-F238E27FC236}">
+                <a16:creationId xmlns:a16="http://schemas.microsoft.com/office/drawing/2014/main" id="{45DC1207-73FB-0B61-78B6-CE8A1A5E6A81}"/>
+              </a:ext>
+            </a:extLst>
+          </p:cNvPr>
+          <p:cNvSpPr/>
+          <p:nvPr/>
+        </p:nvSpPr>
+        <p:spPr>
+          <a:xfrm>
+            <a:off x="2765092" y="757684"/>
+            <a:ext cx="678656" cy="635794"/>
+          </a:xfrm>
+          <a:prstGeom prst="ellipse">
+            <a:avLst/>
+          </a:prstGeom>
+          <a:solidFill>
+            <a:srgbClr val="F9F9F9"/>
+          </a:solidFill>
+          <a:ln>
             <a:solidFill>
-              <a:srgbClr val="F9F9F9"/>
+              <a:srgbClr val="360184"/>
             </a:solidFill>
-            <a:ln>
-              <a:solidFill>
-                <a:srgbClr val="360184"/>
-              </a:solidFill>
-            </a:ln>
-          </p:spPr>
-          <p:style>
-            <a:lnRef idx="2">
-              <a:schemeClr val="accent1">
-                <a:shade val="15000"/>
-              </a:schemeClr>
-            </a:lnRef>
-            <a:fillRef idx="1">
-              <a:schemeClr val="accent1"/>
-            </a:fillRef>
-            <a:effectRef idx="0">
-              <a:schemeClr val="accent1"/>
-            </a:effectRef>
-            <a:fontRef idx="minor">
-              <a:schemeClr val="lt1"/>
-            </a:fontRef>
-          </p:style>
-          <p:txBody>
-            <a:bodyPr rtlCol="0" anchor="ctr"/>
-            <a:lstStyle/>
-            <a:p>
-              <a:pPr algn="ctr"/>
-              <a:r>
-                <a:rPr lang="en-US" sz="1200" dirty="0">
-                  <a:solidFill>
-                    <a:schemeClr val="tx1"/>
-                  </a:solidFill>
-                </a:rPr>
-                <a:t>-</a:t>
-              </a:r>
-            </a:p>
-          </p:txBody>
-        </p:sp>
-        <p:sp>
-          <p:nvSpPr>
-            <p:cNvPr id="11" name="Rounded Rectangle 10">
-              <a:extLst>
-                <a:ext uri="{FF2B5EF4-FFF2-40B4-BE49-F238E27FC236}">
-                  <a16:creationId xmlns:a16="http://schemas.microsoft.com/office/drawing/2014/main" id="{47E607B8-855E-267E-7E2A-8413F398EC3C}"/>
-                </a:ext>
-              </a:extLst>
-            </p:cNvPr>
-            <p:cNvSpPr/>
-            <p:nvPr/>
-          </p:nvSpPr>
-          <p:spPr>
-            <a:xfrm>
-              <a:off x="1638759" y="2500401"/>
-              <a:ext cx="678657" cy="514350"/>
-            </a:xfrm>
-            <a:prstGeom prst="roundRect">
-              <a:avLst/>
-            </a:prstGeom>
+          </a:ln>
+        </p:spPr>
+        <p:style>
+          <a:lnRef idx="2">
+            <a:schemeClr val="accent1">
+              <a:shade val="15000"/>
+            </a:schemeClr>
+          </a:lnRef>
+          <a:fillRef idx="1">
+            <a:schemeClr val="accent1"/>
+          </a:fillRef>
+          <a:effectRef idx="0">
+            <a:schemeClr val="accent1"/>
+          </a:effectRef>
+          <a:fontRef idx="minor">
+            <a:schemeClr val="lt1"/>
+          </a:fontRef>
+        </p:style>
+        <p:txBody>
+          <a:bodyPr rtlCol="0" anchor="ctr"/>
+          <a:lstStyle/>
+          <a:p>
+            <a:pPr algn="ctr"/>
+            <a:r>
+              <a:rPr lang="en-US" sz="1200" dirty="0">
+                <a:solidFill>
+                  <a:schemeClr val="tx1"/>
+                </a:solidFill>
+              </a:rPr>
+              <a:t>-</a:t>
+            </a:r>
+          </a:p>
+        </p:txBody>
+      </p:sp>
+      <p:sp>
+        <p:nvSpPr>
+          <p:cNvPr id="11" name="Rounded Rectangle 10">
+            <a:extLst>
+              <a:ext uri="{FF2B5EF4-FFF2-40B4-BE49-F238E27FC236}">
+                <a16:creationId xmlns:a16="http://schemas.microsoft.com/office/drawing/2014/main" id="{47E607B8-855E-267E-7E2A-8413F398EC3C}"/>
+              </a:ext>
+            </a:extLst>
+          </p:cNvPr>
+          <p:cNvSpPr/>
+          <p:nvPr/>
+        </p:nvSpPr>
+        <p:spPr>
+          <a:xfrm>
+            <a:off x="1638759" y="2500401"/>
+            <a:ext cx="678657" cy="514350"/>
+          </a:xfrm>
+          <a:prstGeom prst="roundRect">
+            <a:avLst/>
+          </a:prstGeom>
+          <a:solidFill>
+            <a:srgbClr val="EFFDF2"/>
+          </a:solidFill>
+          <a:ln>
             <a:solidFill>
-              <a:srgbClr val="EFFDF2"/>
+              <a:srgbClr val="7EE892"/>
             </a:solidFill>
-            <a:ln>
-              <a:solidFill>
-                <a:srgbClr val="7EE892"/>
-              </a:solidFill>
-            </a:ln>
-          </p:spPr>
-          <p:style>
-            <a:lnRef idx="2">
-              <a:schemeClr val="accent1">
-                <a:shade val="15000"/>
-              </a:schemeClr>
-            </a:lnRef>
-            <a:fillRef idx="1">
-              <a:schemeClr val="accent1"/>
-            </a:fillRef>
-            <a:effectRef idx="0">
-              <a:schemeClr val="accent1"/>
-            </a:effectRef>
-            <a:fontRef idx="minor">
-              <a:schemeClr val="lt1"/>
-            </a:fontRef>
-          </p:style>
-          <p:txBody>
-            <a:bodyPr rtlCol="0" anchor="ctr"/>
-            <a:lstStyle/>
-            <a:p>
-              <a:pPr algn="ctr"/>
-              <a:r>
-                <a:rPr lang="en-US" sz="1200" dirty="0">
-                  <a:solidFill>
-                    <a:schemeClr val="tx1"/>
-                  </a:solidFill>
-                </a:rPr>
-                <a:t>1 or 2?</a:t>
-              </a:r>
-            </a:p>
-          </p:txBody>
-        </p:sp>
-        <p:sp>
-          <p:nvSpPr>
-            <p:cNvPr id="13" name="Oval 12">
-              <a:extLst>
-                <a:ext uri="{FF2B5EF4-FFF2-40B4-BE49-F238E27FC236}">
-                  <a16:creationId xmlns:a16="http://schemas.microsoft.com/office/drawing/2014/main" id="{1EE0EA55-1CF2-F300-8079-70D82B368396}"/>
-                </a:ext>
-              </a:extLst>
-            </p:cNvPr>
-            <p:cNvSpPr/>
-            <p:nvPr/>
-          </p:nvSpPr>
-          <p:spPr>
-            <a:xfrm>
-              <a:off x="2765092" y="1957396"/>
-              <a:ext cx="678656" cy="635794"/>
-            </a:xfrm>
-            <a:prstGeom prst="ellipse">
-              <a:avLst/>
-            </a:prstGeom>
+          </a:ln>
+        </p:spPr>
+        <p:style>
+          <a:lnRef idx="2">
+            <a:schemeClr val="accent1">
+              <a:shade val="15000"/>
+            </a:schemeClr>
+          </a:lnRef>
+          <a:fillRef idx="1">
+            <a:schemeClr val="accent1"/>
+          </a:fillRef>
+          <a:effectRef idx="0">
+            <a:schemeClr val="accent1"/>
+          </a:effectRef>
+          <a:fontRef idx="minor">
+            <a:schemeClr val="lt1"/>
+          </a:fontRef>
+        </p:style>
+        <p:txBody>
+          <a:bodyPr rtlCol="0" anchor="ctr"/>
+          <a:lstStyle/>
+          <a:p>
+            <a:pPr algn="ctr"/>
+            <a:r>
+              <a:rPr lang="en-US" sz="1200" dirty="0">
+                <a:solidFill>
+                  <a:schemeClr val="tx1"/>
+                </a:solidFill>
+              </a:rPr>
+              <a:t>1 or 2?</a:t>
+            </a:r>
+          </a:p>
+        </p:txBody>
+      </p:sp>
+      <p:sp>
+        <p:nvSpPr>
+          <p:cNvPr id="13" name="Oval 12">
+            <a:extLst>
+              <a:ext uri="{FF2B5EF4-FFF2-40B4-BE49-F238E27FC236}">
+                <a16:creationId xmlns:a16="http://schemas.microsoft.com/office/drawing/2014/main" id="{1EE0EA55-1CF2-F300-8079-70D82B368396}"/>
+              </a:ext>
+            </a:extLst>
+          </p:cNvPr>
+          <p:cNvSpPr/>
+          <p:nvPr/>
+        </p:nvSpPr>
+        <p:spPr>
+          <a:xfrm>
+            <a:off x="2765092" y="1957396"/>
+            <a:ext cx="678656" cy="635794"/>
+          </a:xfrm>
+          <a:prstGeom prst="ellipse">
+            <a:avLst/>
+          </a:prstGeom>
+          <a:solidFill>
+            <a:srgbClr val="F9F9F9"/>
+          </a:solidFill>
+          <a:ln>
             <a:solidFill>
-              <a:srgbClr val="F9F9F9"/>
+              <a:srgbClr val="360184"/>
             </a:solidFill>
-            <a:ln>
-              <a:solidFill>
-                <a:srgbClr val="360184"/>
-              </a:solidFill>
-            </a:ln>
-          </p:spPr>
-          <p:style>
-            <a:lnRef idx="2">
-              <a:schemeClr val="accent1">
-                <a:shade val="15000"/>
-              </a:schemeClr>
-            </a:lnRef>
-            <a:fillRef idx="1">
-              <a:schemeClr val="accent1"/>
-            </a:fillRef>
-            <a:effectRef idx="0">
-              <a:schemeClr val="accent1"/>
-            </a:effectRef>
-            <a:fontRef idx="minor">
-              <a:schemeClr val="lt1"/>
-            </a:fontRef>
-          </p:style>
-          <p:txBody>
-            <a:bodyPr rtlCol="0" anchor="ctr"/>
-            <a:lstStyle/>
-            <a:p>
-              <a:pPr algn="ctr"/>
-              <a:r>
-                <a:rPr lang="en-US" sz="1200" dirty="0">
-                  <a:solidFill>
-                    <a:schemeClr val="tx1"/>
-                  </a:solidFill>
-                </a:rPr>
-                <a:t>0</a:t>
-              </a:r>
-            </a:p>
-          </p:txBody>
-        </p:sp>
-        <p:cxnSp>
-          <p:nvCxnSpPr>
-            <p:cNvPr id="17" name="Straight Arrow Connector 16">
-              <a:extLst>
-                <a:ext uri="{FF2B5EF4-FFF2-40B4-BE49-F238E27FC236}">
-                  <a16:creationId xmlns:a16="http://schemas.microsoft.com/office/drawing/2014/main" id="{50F416EB-2649-0F4A-13F4-65D2DAE98463}"/>
-                </a:ext>
-              </a:extLst>
-            </p:cNvPr>
-            <p:cNvCxnSpPr>
-              <a:stCxn id="4" idx="6"/>
-              <a:endCxn id="8" idx="1"/>
-            </p:cNvCxnSpPr>
-            <p:nvPr/>
-          </p:nvCxnSpPr>
-          <p:spPr>
-            <a:xfrm>
-              <a:off x="1191085" y="1028789"/>
-              <a:ext cx="447674" cy="578643"/>
-            </a:xfrm>
-            <a:prstGeom prst="straightConnector1">
-              <a:avLst/>
-            </a:prstGeom>
-            <a:ln>
-              <a:solidFill>
-                <a:srgbClr val="EFC479"/>
-              </a:solidFill>
-              <a:tailEnd type="triangle"/>
-            </a:ln>
-          </p:spPr>
-          <p:style>
-            <a:lnRef idx="1">
-              <a:schemeClr val="accent1"/>
-            </a:lnRef>
-            <a:fillRef idx="0">
-              <a:schemeClr val="accent1"/>
-            </a:fillRef>
-            <a:effectRef idx="0">
-              <a:schemeClr val="accent1"/>
-            </a:effectRef>
-            <a:fontRef idx="minor">
-              <a:schemeClr val="tx1"/>
-            </a:fontRef>
-          </p:style>
-        </p:cxnSp>
-        <p:cxnSp>
-          <p:nvCxnSpPr>
-            <p:cNvPr id="19" name="Straight Arrow Connector 18">
-              <a:extLst>
-                <a:ext uri="{FF2B5EF4-FFF2-40B4-BE49-F238E27FC236}">
-                  <a16:creationId xmlns:a16="http://schemas.microsoft.com/office/drawing/2014/main" id="{0629F67D-B05E-BB2A-0565-1BF5439BC455}"/>
-                </a:ext>
-              </a:extLst>
-            </p:cNvPr>
-            <p:cNvCxnSpPr>
-              <a:stCxn id="8" idx="1"/>
-              <a:endCxn id="9" idx="6"/>
-            </p:cNvCxnSpPr>
-            <p:nvPr/>
-          </p:nvCxnSpPr>
-          <p:spPr>
-            <a:xfrm flipH="1">
-              <a:off x="1191085" y="1607432"/>
-              <a:ext cx="447674" cy="575072"/>
-            </a:xfrm>
-            <a:prstGeom prst="straightConnector1">
-              <a:avLst/>
-            </a:prstGeom>
-            <a:ln>
-              <a:solidFill>
-                <a:srgbClr val="EFC479"/>
-              </a:solidFill>
-              <a:tailEnd type="triangle"/>
-            </a:ln>
-          </p:spPr>
-          <p:style>
-            <a:lnRef idx="1">
-              <a:schemeClr val="accent1"/>
-            </a:lnRef>
-            <a:fillRef idx="0">
-              <a:schemeClr val="accent1"/>
-            </a:fillRef>
-            <a:effectRef idx="0">
-              <a:schemeClr val="accent1"/>
-            </a:effectRef>
-            <a:fontRef idx="minor">
-              <a:schemeClr val="tx1"/>
-            </a:fontRef>
-          </p:style>
-        </p:cxnSp>
-        <p:cxnSp>
-          <p:nvCxnSpPr>
-            <p:cNvPr id="21" name="Straight Arrow Connector 20">
-              <a:extLst>
-                <a:ext uri="{FF2B5EF4-FFF2-40B4-BE49-F238E27FC236}">
-                  <a16:creationId xmlns:a16="http://schemas.microsoft.com/office/drawing/2014/main" id="{0666F1B2-C171-FE5C-38EC-418FF86E2AE8}"/>
-                </a:ext>
-              </a:extLst>
-            </p:cNvPr>
-            <p:cNvCxnSpPr>
-              <a:stCxn id="9" idx="6"/>
-              <a:endCxn id="11" idx="1"/>
-            </p:cNvCxnSpPr>
-            <p:nvPr/>
-          </p:nvCxnSpPr>
-          <p:spPr>
-            <a:xfrm>
-              <a:off x="1191085" y="2182504"/>
-              <a:ext cx="447674" cy="575072"/>
-            </a:xfrm>
-            <a:prstGeom prst="straightConnector1">
-              <a:avLst/>
-            </a:prstGeom>
-            <a:ln>
-              <a:solidFill>
-                <a:srgbClr val="EFC479"/>
-              </a:solidFill>
-              <a:tailEnd type="triangle"/>
-            </a:ln>
-          </p:spPr>
-          <p:style>
-            <a:lnRef idx="1">
-              <a:schemeClr val="accent1"/>
-            </a:lnRef>
-            <a:fillRef idx="0">
-              <a:schemeClr val="accent1"/>
-            </a:fillRef>
-            <a:effectRef idx="0">
-              <a:schemeClr val="accent1"/>
-            </a:effectRef>
-            <a:fontRef idx="minor">
-              <a:schemeClr val="tx1"/>
-            </a:fontRef>
-          </p:style>
-        </p:cxnSp>
-        <p:cxnSp>
-          <p:nvCxnSpPr>
-            <p:cNvPr id="27" name="Straight Arrow Connector 26">
-              <a:extLst>
-                <a:ext uri="{FF2B5EF4-FFF2-40B4-BE49-F238E27FC236}">
-                  <a16:creationId xmlns:a16="http://schemas.microsoft.com/office/drawing/2014/main" id="{971784EB-158D-AD97-8AB9-7BDB2D859EC1}"/>
-                </a:ext>
-              </a:extLst>
-            </p:cNvPr>
-            <p:cNvCxnSpPr>
-              <a:cxnSpLocks/>
-              <a:stCxn id="10" idx="2"/>
-              <a:endCxn id="8" idx="3"/>
-            </p:cNvCxnSpPr>
-            <p:nvPr/>
-          </p:nvCxnSpPr>
-          <p:spPr>
-            <a:xfrm flipH="1">
-              <a:off x="2317416" y="1075581"/>
-              <a:ext cx="447676" cy="531851"/>
-            </a:xfrm>
-            <a:prstGeom prst="straightConnector1">
-              <a:avLst/>
-            </a:prstGeom>
-            <a:ln>
-              <a:solidFill>
-                <a:srgbClr val="360184"/>
-              </a:solidFill>
-              <a:tailEnd type="triangle"/>
-            </a:ln>
-          </p:spPr>
-          <p:style>
-            <a:lnRef idx="1">
-              <a:schemeClr val="accent1"/>
-            </a:lnRef>
-            <a:fillRef idx="0">
-              <a:schemeClr val="accent1"/>
-            </a:fillRef>
-            <a:effectRef idx="0">
-              <a:schemeClr val="accent1"/>
-            </a:effectRef>
-            <a:fontRef idx="minor">
-              <a:schemeClr val="tx1"/>
-            </a:fontRef>
-          </p:style>
-        </p:cxnSp>
-        <p:cxnSp>
-          <p:nvCxnSpPr>
-            <p:cNvPr id="29" name="Straight Arrow Connector 28">
-              <a:extLst>
-                <a:ext uri="{FF2B5EF4-FFF2-40B4-BE49-F238E27FC236}">
-                  <a16:creationId xmlns:a16="http://schemas.microsoft.com/office/drawing/2014/main" id="{2A42B072-2B4C-4756-DAA7-DD6C1F7D61B8}"/>
-                </a:ext>
-              </a:extLst>
-            </p:cNvPr>
-            <p:cNvCxnSpPr>
-              <a:cxnSpLocks/>
-              <a:stCxn id="8" idx="3"/>
-              <a:endCxn id="13" idx="2"/>
-            </p:cNvCxnSpPr>
-            <p:nvPr/>
-          </p:nvCxnSpPr>
-          <p:spPr>
-            <a:xfrm>
-              <a:off x="2317416" y="1607432"/>
-              <a:ext cx="447676" cy="667861"/>
-            </a:xfrm>
-            <a:prstGeom prst="straightConnector1">
-              <a:avLst/>
-            </a:prstGeom>
-            <a:ln>
-              <a:solidFill>
-                <a:srgbClr val="360184"/>
-              </a:solidFill>
-              <a:tailEnd type="triangle"/>
-            </a:ln>
-          </p:spPr>
-          <p:style>
-            <a:lnRef idx="1">
-              <a:schemeClr val="accent1"/>
-            </a:lnRef>
-            <a:fillRef idx="0">
-              <a:schemeClr val="accent1"/>
-            </a:fillRef>
-            <a:effectRef idx="0">
-              <a:schemeClr val="accent1"/>
-            </a:effectRef>
-            <a:fontRef idx="minor">
-              <a:schemeClr val="tx1"/>
-            </a:fontRef>
-          </p:style>
-        </p:cxnSp>
-        <p:cxnSp>
-          <p:nvCxnSpPr>
-            <p:cNvPr id="31" name="Straight Arrow Connector 30">
-              <a:extLst>
-                <a:ext uri="{FF2B5EF4-FFF2-40B4-BE49-F238E27FC236}">
-                  <a16:creationId xmlns:a16="http://schemas.microsoft.com/office/drawing/2014/main" id="{260EDC20-00C5-236C-0CF4-0AEEE38D161F}"/>
-                </a:ext>
-              </a:extLst>
-            </p:cNvPr>
-            <p:cNvCxnSpPr>
-              <a:cxnSpLocks/>
-              <a:stCxn id="13" idx="2"/>
-              <a:endCxn id="11" idx="3"/>
-            </p:cNvCxnSpPr>
-            <p:nvPr/>
-          </p:nvCxnSpPr>
-          <p:spPr>
-            <a:xfrm flipH="1">
-              <a:off x="2317416" y="2275293"/>
-              <a:ext cx="447676" cy="482283"/>
-            </a:xfrm>
-            <a:prstGeom prst="straightConnector1">
-              <a:avLst/>
-            </a:prstGeom>
-            <a:ln>
-              <a:solidFill>
-                <a:srgbClr val="360184"/>
-              </a:solidFill>
-              <a:tailEnd type="triangle"/>
-            </a:ln>
-          </p:spPr>
-          <p:style>
-            <a:lnRef idx="1">
-              <a:schemeClr val="accent1"/>
-            </a:lnRef>
-            <a:fillRef idx="0">
-              <a:schemeClr val="accent1"/>
-            </a:fillRef>
-            <a:effectRef idx="0">
-              <a:schemeClr val="accent1"/>
-            </a:effectRef>
-            <a:fontRef idx="minor">
-              <a:schemeClr val="tx1"/>
-            </a:fontRef>
-          </p:style>
-        </p:cxnSp>
-        <p:sp>
-          <p:nvSpPr>
-            <p:cNvPr id="32" name="TextBox 31">
-              <a:extLst>
-                <a:ext uri="{FF2B5EF4-FFF2-40B4-BE49-F238E27FC236}">
-                  <a16:creationId xmlns:a16="http://schemas.microsoft.com/office/drawing/2014/main" id="{C4D3E625-237F-0EAA-EECC-16F95DE1AF7D}"/>
-                </a:ext>
-              </a:extLst>
-            </p:cNvPr>
-            <p:cNvSpPr txBox="1"/>
-            <p:nvPr/>
-          </p:nvSpPr>
-          <p:spPr>
-            <a:xfrm>
-              <a:off x="1471281" y="160197"/>
-              <a:ext cx="1013611" cy="646331"/>
-            </a:xfrm>
-            <a:prstGeom prst="rect">
-              <a:avLst/>
-            </a:prstGeom>
-            <a:noFill/>
-          </p:spPr>
-          <p:txBody>
-            <a:bodyPr wrap="square" rtlCol="0">
-              <a:spAutoFit/>
-            </a:bodyPr>
-            <a:lstStyle/>
-            <a:p>
-              <a:pPr algn="ctr"/>
-              <a:r>
-                <a:rPr lang="en-US" dirty="0"/>
-                <a:t>Shared variable</a:t>
-              </a:r>
-            </a:p>
-          </p:txBody>
-        </p:sp>
-        <p:sp>
-          <p:nvSpPr>
-            <p:cNvPr id="53" name="TextBox 52">
-              <a:extLst>
-                <a:ext uri="{FF2B5EF4-FFF2-40B4-BE49-F238E27FC236}">
-                  <a16:creationId xmlns:a16="http://schemas.microsoft.com/office/drawing/2014/main" id="{AD5A531B-41A4-FD04-E51C-CA127C590EA1}"/>
-                </a:ext>
-              </a:extLst>
-            </p:cNvPr>
-            <p:cNvSpPr txBox="1"/>
-            <p:nvPr/>
-          </p:nvSpPr>
-          <p:spPr>
-            <a:xfrm rot="3158393">
-              <a:off x="1303090" y="2281970"/>
-              <a:ext cx="421869" cy="276999"/>
-            </a:xfrm>
-            <a:prstGeom prst="rect">
-              <a:avLst/>
-            </a:prstGeom>
-            <a:noFill/>
-          </p:spPr>
-          <p:txBody>
-            <a:bodyPr wrap="square" rtlCol="0">
-              <a:spAutoFit/>
-            </a:bodyPr>
-            <a:lstStyle/>
-            <a:p>
-              <a:r>
-                <a:rPr lang="en-US" sz="1200" dirty="0"/>
-                <a:t>+1</a:t>
-              </a:r>
-            </a:p>
-          </p:txBody>
-        </p:sp>
-        <p:sp>
-          <p:nvSpPr>
-            <p:cNvPr id="56" name="TextBox 55">
-              <a:extLst>
-                <a:ext uri="{FF2B5EF4-FFF2-40B4-BE49-F238E27FC236}">
-                  <a16:creationId xmlns:a16="http://schemas.microsoft.com/office/drawing/2014/main" id="{1837CAFC-013A-1724-5D6E-6D766435891A}"/>
-                </a:ext>
-              </a:extLst>
-            </p:cNvPr>
-            <p:cNvSpPr txBox="1"/>
-            <p:nvPr/>
-          </p:nvSpPr>
-          <p:spPr>
-            <a:xfrm rot="18757266">
-              <a:off x="2278845" y="2269835"/>
-              <a:ext cx="421869" cy="276999"/>
-            </a:xfrm>
-            <a:prstGeom prst="rect">
-              <a:avLst/>
-            </a:prstGeom>
-            <a:noFill/>
-          </p:spPr>
-          <p:txBody>
-            <a:bodyPr wrap="square" rtlCol="0">
-              <a:spAutoFit/>
-            </a:bodyPr>
-            <a:lstStyle/>
-            <a:p>
-              <a:r>
-                <a:rPr lang="en-US" sz="1200" dirty="0"/>
-                <a:t>+1</a:t>
-              </a:r>
-            </a:p>
-          </p:txBody>
-        </p:sp>
-      </p:grpSp>
+          </a:ln>
+        </p:spPr>
+        <p:style>
+          <a:lnRef idx="2">
+            <a:schemeClr val="accent1">
+              <a:shade val="15000"/>
+            </a:schemeClr>
+          </a:lnRef>
+          <a:fillRef idx="1">
+            <a:schemeClr val="accent1"/>
+          </a:fillRef>
+          <a:effectRef idx="0">
+            <a:schemeClr val="accent1"/>
+          </a:effectRef>
+          <a:fontRef idx="minor">
+            <a:schemeClr val="lt1"/>
+          </a:fontRef>
+        </p:style>
+        <p:txBody>
+          <a:bodyPr rtlCol="0" anchor="ctr"/>
+          <a:lstStyle/>
+          <a:p>
+            <a:pPr algn="ctr"/>
+            <a:r>
+              <a:rPr lang="en-US" sz="1200" dirty="0">
+                <a:solidFill>
+                  <a:schemeClr val="tx1"/>
+                </a:solidFill>
+              </a:rPr>
+              <a:t>0</a:t>
+            </a:r>
+          </a:p>
+        </p:txBody>
+      </p:sp>
+      <p:cxnSp>
+        <p:nvCxnSpPr>
+          <p:cNvPr id="17" name="Straight Arrow Connector 16">
+            <a:extLst>
+              <a:ext uri="{FF2B5EF4-FFF2-40B4-BE49-F238E27FC236}">
+                <a16:creationId xmlns:a16="http://schemas.microsoft.com/office/drawing/2014/main" id="{50F416EB-2649-0F4A-13F4-65D2DAE98463}"/>
+              </a:ext>
+            </a:extLst>
+          </p:cNvPr>
+          <p:cNvCxnSpPr>
+            <a:stCxn id="4" idx="6"/>
+            <a:endCxn id="8" idx="1"/>
+          </p:cNvCxnSpPr>
+          <p:nvPr/>
+        </p:nvCxnSpPr>
+        <p:spPr>
+          <a:xfrm>
+            <a:off x="1191085" y="1028789"/>
+            <a:ext cx="447674" cy="578643"/>
+          </a:xfrm>
+          <a:prstGeom prst="straightConnector1">
+            <a:avLst/>
+          </a:prstGeom>
+          <a:ln>
+            <a:solidFill>
+              <a:srgbClr val="EFC479"/>
+            </a:solidFill>
+            <a:tailEnd type="triangle"/>
+          </a:ln>
+        </p:spPr>
+        <p:style>
+          <a:lnRef idx="1">
+            <a:schemeClr val="accent1"/>
+          </a:lnRef>
+          <a:fillRef idx="0">
+            <a:schemeClr val="accent1"/>
+          </a:fillRef>
+          <a:effectRef idx="0">
+            <a:schemeClr val="accent1"/>
+          </a:effectRef>
+          <a:fontRef idx="minor">
+            <a:schemeClr val="tx1"/>
+          </a:fontRef>
+        </p:style>
+      </p:cxnSp>
+      <p:cxnSp>
+        <p:nvCxnSpPr>
+          <p:cNvPr id="19" name="Straight Arrow Connector 18">
+            <a:extLst>
+              <a:ext uri="{FF2B5EF4-FFF2-40B4-BE49-F238E27FC236}">
+                <a16:creationId xmlns:a16="http://schemas.microsoft.com/office/drawing/2014/main" id="{0629F67D-B05E-BB2A-0565-1BF5439BC455}"/>
+              </a:ext>
+            </a:extLst>
+          </p:cNvPr>
+          <p:cNvCxnSpPr>
+            <a:stCxn id="8" idx="1"/>
+            <a:endCxn id="9" idx="6"/>
+          </p:cNvCxnSpPr>
+          <p:nvPr/>
+        </p:nvCxnSpPr>
+        <p:spPr>
+          <a:xfrm flipH="1">
+            <a:off x="1191085" y="1607432"/>
+            <a:ext cx="447674" cy="575072"/>
+          </a:xfrm>
+          <a:prstGeom prst="straightConnector1">
+            <a:avLst/>
+          </a:prstGeom>
+          <a:ln>
+            <a:solidFill>
+              <a:srgbClr val="EFC479"/>
+            </a:solidFill>
+            <a:tailEnd type="triangle"/>
+          </a:ln>
+        </p:spPr>
+        <p:style>
+          <a:lnRef idx="1">
+            <a:schemeClr val="accent1"/>
+          </a:lnRef>
+          <a:fillRef idx="0">
+            <a:schemeClr val="accent1"/>
+          </a:fillRef>
+          <a:effectRef idx="0">
+            <a:schemeClr val="accent1"/>
+          </a:effectRef>
+          <a:fontRef idx="minor">
+            <a:schemeClr val="tx1"/>
+          </a:fontRef>
+        </p:style>
+      </p:cxnSp>
+      <p:cxnSp>
+        <p:nvCxnSpPr>
+          <p:cNvPr id="21" name="Straight Arrow Connector 20">
+            <a:extLst>
+              <a:ext uri="{FF2B5EF4-FFF2-40B4-BE49-F238E27FC236}">
+                <a16:creationId xmlns:a16="http://schemas.microsoft.com/office/drawing/2014/main" id="{0666F1B2-C171-FE5C-38EC-418FF86E2AE8}"/>
+              </a:ext>
+            </a:extLst>
+          </p:cNvPr>
+          <p:cNvCxnSpPr>
+            <a:stCxn id="9" idx="6"/>
+            <a:endCxn id="11" idx="1"/>
+          </p:cNvCxnSpPr>
+          <p:nvPr/>
+        </p:nvCxnSpPr>
+        <p:spPr>
+          <a:xfrm>
+            <a:off x="1191085" y="2182504"/>
+            <a:ext cx="447674" cy="575072"/>
+          </a:xfrm>
+          <a:prstGeom prst="straightConnector1">
+            <a:avLst/>
+          </a:prstGeom>
+          <a:ln>
+            <a:solidFill>
+              <a:srgbClr val="EFC479"/>
+            </a:solidFill>
+            <a:tailEnd type="triangle"/>
+          </a:ln>
+        </p:spPr>
+        <p:style>
+          <a:lnRef idx="1">
+            <a:schemeClr val="accent1"/>
+          </a:lnRef>
+          <a:fillRef idx="0">
+            <a:schemeClr val="accent1"/>
+          </a:fillRef>
+          <a:effectRef idx="0">
+            <a:schemeClr val="accent1"/>
+          </a:effectRef>
+          <a:fontRef idx="minor">
+            <a:schemeClr val="tx1"/>
+          </a:fontRef>
+        </p:style>
+      </p:cxnSp>
+      <p:cxnSp>
+        <p:nvCxnSpPr>
+          <p:cNvPr id="27" name="Straight Arrow Connector 26">
+            <a:extLst>
+              <a:ext uri="{FF2B5EF4-FFF2-40B4-BE49-F238E27FC236}">
+                <a16:creationId xmlns:a16="http://schemas.microsoft.com/office/drawing/2014/main" id="{971784EB-158D-AD97-8AB9-7BDB2D859EC1}"/>
+              </a:ext>
+            </a:extLst>
+          </p:cNvPr>
+          <p:cNvCxnSpPr>
+            <a:cxnSpLocks/>
+            <a:stCxn id="10" idx="2"/>
+            <a:endCxn id="8" idx="3"/>
+          </p:cNvCxnSpPr>
+          <p:nvPr/>
+        </p:nvCxnSpPr>
+        <p:spPr>
+          <a:xfrm flipH="1">
+            <a:off x="2317416" y="1075581"/>
+            <a:ext cx="447676" cy="531851"/>
+          </a:xfrm>
+          <a:prstGeom prst="straightConnector1">
+            <a:avLst/>
+          </a:prstGeom>
+          <a:ln>
+            <a:solidFill>
+              <a:srgbClr val="360184"/>
+            </a:solidFill>
+            <a:tailEnd type="triangle"/>
+          </a:ln>
+        </p:spPr>
+        <p:style>
+          <a:lnRef idx="1">
+            <a:schemeClr val="accent1"/>
+          </a:lnRef>
+          <a:fillRef idx="0">
+            <a:schemeClr val="accent1"/>
+          </a:fillRef>
+          <a:effectRef idx="0">
+            <a:schemeClr val="accent1"/>
+          </a:effectRef>
+          <a:fontRef idx="minor">
+            <a:schemeClr val="tx1"/>
+          </a:fontRef>
+        </p:style>
+      </p:cxnSp>
+      <p:cxnSp>
+        <p:nvCxnSpPr>
+          <p:cNvPr id="29" name="Straight Arrow Connector 28">
+            <a:extLst>
+              <a:ext uri="{FF2B5EF4-FFF2-40B4-BE49-F238E27FC236}">
+                <a16:creationId xmlns:a16="http://schemas.microsoft.com/office/drawing/2014/main" id="{2A42B072-2B4C-4756-DAA7-DD6C1F7D61B8}"/>
+              </a:ext>
+            </a:extLst>
+          </p:cNvPr>
+          <p:cNvCxnSpPr>
+            <a:cxnSpLocks/>
+            <a:stCxn id="8" idx="3"/>
+            <a:endCxn id="13" idx="2"/>
+          </p:cNvCxnSpPr>
+          <p:nvPr/>
+        </p:nvCxnSpPr>
+        <p:spPr>
+          <a:xfrm>
+            <a:off x="2317416" y="1607432"/>
+            <a:ext cx="447676" cy="667861"/>
+          </a:xfrm>
+          <a:prstGeom prst="straightConnector1">
+            <a:avLst/>
+          </a:prstGeom>
+          <a:ln>
+            <a:solidFill>
+              <a:srgbClr val="360184"/>
+            </a:solidFill>
+            <a:tailEnd type="triangle"/>
+          </a:ln>
+        </p:spPr>
+        <p:style>
+          <a:lnRef idx="1">
+            <a:schemeClr val="accent1"/>
+          </a:lnRef>
+          <a:fillRef idx="0">
+            <a:schemeClr val="accent1"/>
+          </a:fillRef>
+          <a:effectRef idx="0">
+            <a:schemeClr val="accent1"/>
+          </a:effectRef>
+          <a:fontRef idx="minor">
+            <a:schemeClr val="tx1"/>
+          </a:fontRef>
+        </p:style>
+      </p:cxnSp>
+      <p:cxnSp>
+        <p:nvCxnSpPr>
+          <p:cNvPr id="31" name="Straight Arrow Connector 30">
+            <a:extLst>
+              <a:ext uri="{FF2B5EF4-FFF2-40B4-BE49-F238E27FC236}">
+                <a16:creationId xmlns:a16="http://schemas.microsoft.com/office/drawing/2014/main" id="{260EDC20-00C5-236C-0CF4-0AEEE38D161F}"/>
+              </a:ext>
+            </a:extLst>
+          </p:cNvPr>
+          <p:cNvCxnSpPr>
+            <a:cxnSpLocks/>
+            <a:stCxn id="13" idx="2"/>
+            <a:endCxn id="11" idx="3"/>
+          </p:cNvCxnSpPr>
+          <p:nvPr/>
+        </p:nvCxnSpPr>
+        <p:spPr>
+          <a:xfrm flipH="1">
+            <a:off x="2317416" y="2275293"/>
+            <a:ext cx="447676" cy="482283"/>
+          </a:xfrm>
+          <a:prstGeom prst="straightConnector1">
+            <a:avLst/>
+          </a:prstGeom>
+          <a:ln>
+            <a:solidFill>
+              <a:srgbClr val="360184"/>
+            </a:solidFill>
+            <a:tailEnd type="triangle"/>
+          </a:ln>
+        </p:spPr>
+        <p:style>
+          <a:lnRef idx="1">
+            <a:schemeClr val="accent1"/>
+          </a:lnRef>
+          <a:fillRef idx="0">
+            <a:schemeClr val="accent1"/>
+          </a:fillRef>
+          <a:effectRef idx="0">
+            <a:schemeClr val="accent1"/>
+          </a:effectRef>
+          <a:fontRef idx="minor">
+            <a:schemeClr val="tx1"/>
+          </a:fontRef>
+        </p:style>
+      </p:cxnSp>
+      <p:sp>
+        <p:nvSpPr>
+          <p:cNvPr id="32" name="TextBox 31">
+            <a:extLst>
+              <a:ext uri="{FF2B5EF4-FFF2-40B4-BE49-F238E27FC236}">
+                <a16:creationId xmlns:a16="http://schemas.microsoft.com/office/drawing/2014/main" id="{C4D3E625-237F-0EAA-EECC-16F95DE1AF7D}"/>
+              </a:ext>
+            </a:extLst>
+          </p:cNvPr>
+          <p:cNvSpPr txBox="1"/>
+          <p:nvPr/>
+        </p:nvSpPr>
+        <p:spPr>
+          <a:xfrm>
+            <a:off x="1471281" y="160197"/>
+            <a:ext cx="1013611" cy="646331"/>
+          </a:xfrm>
+          <a:prstGeom prst="rect">
+            <a:avLst/>
+          </a:prstGeom>
+          <a:noFill/>
+        </p:spPr>
+        <p:txBody>
+          <a:bodyPr wrap="square" rtlCol="0">
+            <a:spAutoFit/>
+          </a:bodyPr>
+          <a:lstStyle/>
+          <a:p>
+            <a:pPr algn="ctr"/>
+            <a:r>
+              <a:rPr lang="en-US" dirty="0"/>
+              <a:t>Shared variable</a:t>
+            </a:r>
+          </a:p>
+        </p:txBody>
+      </p:sp>
+      <p:sp>
+        <p:nvSpPr>
+          <p:cNvPr id="53" name="TextBox 52">
+            <a:extLst>
+              <a:ext uri="{FF2B5EF4-FFF2-40B4-BE49-F238E27FC236}">
+                <a16:creationId xmlns:a16="http://schemas.microsoft.com/office/drawing/2014/main" id="{AD5A531B-41A4-FD04-E51C-CA127C590EA1}"/>
+              </a:ext>
+            </a:extLst>
+          </p:cNvPr>
+          <p:cNvSpPr txBox="1"/>
+          <p:nvPr/>
+        </p:nvSpPr>
+        <p:spPr>
+          <a:xfrm rot="3158393">
+            <a:off x="1303090" y="2281970"/>
+            <a:ext cx="421869" cy="276999"/>
+          </a:xfrm>
+          <a:prstGeom prst="rect">
+            <a:avLst/>
+          </a:prstGeom>
+          <a:noFill/>
+        </p:spPr>
+        <p:txBody>
+          <a:bodyPr wrap="square" rtlCol="0">
+            <a:spAutoFit/>
+          </a:bodyPr>
+          <a:lstStyle/>
+          <a:p>
+            <a:r>
+              <a:rPr lang="en-US" sz="1200" dirty="0"/>
+              <a:t>+1</a:t>
+            </a:r>
+          </a:p>
+        </p:txBody>
+      </p:sp>
+      <p:sp>
+        <p:nvSpPr>
+          <p:cNvPr id="56" name="TextBox 55">
+            <a:extLst>
+              <a:ext uri="{FF2B5EF4-FFF2-40B4-BE49-F238E27FC236}">
+                <a16:creationId xmlns:a16="http://schemas.microsoft.com/office/drawing/2014/main" id="{1837CAFC-013A-1724-5D6E-6D766435891A}"/>
+              </a:ext>
+            </a:extLst>
+          </p:cNvPr>
+          <p:cNvSpPr txBox="1"/>
+          <p:nvPr/>
+        </p:nvSpPr>
+        <p:spPr>
+          <a:xfrm rot="18757266">
+            <a:off x="2278845" y="2269835"/>
+            <a:ext cx="421869" cy="276999"/>
+          </a:xfrm>
+          <a:prstGeom prst="rect">
+            <a:avLst/>
+          </a:prstGeom>
+          <a:noFill/>
+        </p:spPr>
+        <p:txBody>
+          <a:bodyPr wrap="square" rtlCol="0">
+            <a:spAutoFit/>
+          </a:bodyPr>
+          <a:lstStyle/>
+          <a:p>
+            <a:r>
+              <a:rPr lang="en-US" sz="1200" dirty="0"/>
+              <a:t>+1</a:t>
+            </a:r>
+          </a:p>
+        </p:txBody>
+      </p:sp>
       <p:sp>
         <p:nvSpPr>
           <p:cNvPr id="94" name="TextBox 93">
@@ -5197,6 +5177,1348 @@
     <p:extLst>
       <p:ext uri="{BB962C8B-B14F-4D97-AF65-F5344CB8AC3E}">
         <p14:creationId xmlns:p14="http://schemas.microsoft.com/office/powerpoint/2010/main" val="4138375852"/>
+      </p:ext>
+    </p:extLst>
+  </p:cSld>
+  <p:clrMapOvr>
+    <a:masterClrMapping/>
+  </p:clrMapOvr>
+</p:sld>
+</file>
+
+<file path=ppt/slides/slide2.xml><?xml version="1.0" encoding="utf-8"?>
+<p:sld xmlns:a="http://schemas.openxmlformats.org/drawingml/2006/main" xmlns:r="http://schemas.openxmlformats.org/officeDocument/2006/relationships" xmlns:p="http://schemas.openxmlformats.org/presentationml/2006/main">
+  <p:cSld>
+    <p:spTree>
+      <p:nvGrpSpPr>
+        <p:cNvPr id="1" name=""/>
+        <p:cNvGrpSpPr/>
+        <p:nvPr/>
+      </p:nvGrpSpPr>
+      <p:grpSpPr>
+        <a:xfrm>
+          <a:off x="0" y="0"/>
+          <a:ext cx="0" cy="0"/>
+          <a:chOff x="0" y="0"/>
+          <a:chExt cx="0" cy="0"/>
+        </a:xfrm>
+      </p:grpSpPr>
+      <p:sp>
+        <p:nvSpPr>
+          <p:cNvPr id="4" name="Rounded Rectangle 3">
+            <a:extLst>
+              <a:ext uri="{FF2B5EF4-FFF2-40B4-BE49-F238E27FC236}">
+                <a16:creationId xmlns:a16="http://schemas.microsoft.com/office/drawing/2014/main" id="{5470C9E2-2C8D-79B7-4C04-21F8B43942B5}"/>
+              </a:ext>
+            </a:extLst>
+          </p:cNvPr>
+          <p:cNvSpPr/>
+          <p:nvPr/>
+        </p:nvSpPr>
+        <p:spPr>
+          <a:xfrm>
+            <a:off x="337125" y="412586"/>
+            <a:ext cx="1112533" cy="514350"/>
+          </a:xfrm>
+          <a:prstGeom prst="roundRect">
+            <a:avLst/>
+          </a:prstGeom>
+          <a:solidFill>
+            <a:srgbClr val="EFFDF2"/>
+          </a:solidFill>
+          <a:ln>
+            <a:solidFill>
+              <a:srgbClr val="7EE892"/>
+            </a:solidFill>
+          </a:ln>
+        </p:spPr>
+        <p:style>
+          <a:lnRef idx="2">
+            <a:schemeClr val="accent1">
+              <a:shade val="15000"/>
+            </a:schemeClr>
+          </a:lnRef>
+          <a:fillRef idx="1">
+            <a:schemeClr val="accent1"/>
+          </a:fillRef>
+          <a:effectRef idx="0">
+            <a:schemeClr val="accent1"/>
+          </a:effectRef>
+          <a:fontRef idx="minor">
+            <a:schemeClr val="lt1"/>
+          </a:fontRef>
+        </p:style>
+        <p:txBody>
+          <a:bodyPr rtlCol="0" anchor="ctr"/>
+          <a:lstStyle/>
+          <a:p>
+            <a:pPr algn="ctr"/>
+            <a:r>
+              <a:rPr lang="en-US" sz="1200" dirty="0">
+                <a:solidFill>
+                  <a:schemeClr val="tx1"/>
+                </a:solidFill>
+              </a:rPr>
+              <a:t>Process 0</a:t>
+            </a:r>
+          </a:p>
+        </p:txBody>
+      </p:sp>
+      <p:sp>
+        <p:nvSpPr>
+          <p:cNvPr id="5" name="Rounded Rectangle 4">
+            <a:extLst>
+              <a:ext uri="{FF2B5EF4-FFF2-40B4-BE49-F238E27FC236}">
+                <a16:creationId xmlns:a16="http://schemas.microsoft.com/office/drawing/2014/main" id="{AB183972-8A0A-A8F1-F069-4380A191375C}"/>
+              </a:ext>
+            </a:extLst>
+          </p:cNvPr>
+          <p:cNvSpPr/>
+          <p:nvPr/>
+        </p:nvSpPr>
+        <p:spPr>
+          <a:xfrm>
+            <a:off x="516834" y="1341185"/>
+            <a:ext cx="753113" cy="271984"/>
+          </a:xfrm>
+          <a:prstGeom prst="roundRect">
+            <a:avLst/>
+          </a:prstGeom>
+          <a:solidFill>
+            <a:srgbClr val="F2F0F6"/>
+          </a:solidFill>
+          <a:ln>
+            <a:solidFill>
+              <a:srgbClr val="360184"/>
+            </a:solidFill>
+          </a:ln>
+        </p:spPr>
+        <p:style>
+          <a:lnRef idx="2">
+            <a:schemeClr val="accent1">
+              <a:shade val="15000"/>
+            </a:schemeClr>
+          </a:lnRef>
+          <a:fillRef idx="1">
+            <a:schemeClr val="accent1"/>
+          </a:fillRef>
+          <a:effectRef idx="0">
+            <a:schemeClr val="accent1"/>
+          </a:effectRef>
+          <a:fontRef idx="minor">
+            <a:schemeClr val="lt1"/>
+          </a:fontRef>
+        </p:style>
+        <p:txBody>
+          <a:bodyPr rtlCol="0" anchor="ctr"/>
+          <a:lstStyle/>
+          <a:p>
+            <a:pPr algn="ctr"/>
+            <a:r>
+              <a:rPr lang="en-US" sz="1000" dirty="0">
+                <a:solidFill>
+                  <a:schemeClr val="tx1"/>
+                </a:solidFill>
+              </a:rPr>
+              <a:t>Thread 0</a:t>
+            </a:r>
+          </a:p>
+        </p:txBody>
+      </p:sp>
+      <p:sp>
+        <p:nvSpPr>
+          <p:cNvPr id="9" name="Rounded Rectangle 8">
+            <a:extLst>
+              <a:ext uri="{FF2B5EF4-FFF2-40B4-BE49-F238E27FC236}">
+                <a16:creationId xmlns:a16="http://schemas.microsoft.com/office/drawing/2014/main" id="{92244CB2-0452-4CD0-8DA7-36D4A7BC91C2}"/>
+              </a:ext>
+            </a:extLst>
+          </p:cNvPr>
+          <p:cNvSpPr/>
+          <p:nvPr/>
+        </p:nvSpPr>
+        <p:spPr>
+          <a:xfrm>
+            <a:off x="515200" y="1613169"/>
+            <a:ext cx="753113" cy="271984"/>
+          </a:xfrm>
+          <a:prstGeom prst="roundRect">
+            <a:avLst/>
+          </a:prstGeom>
+          <a:solidFill>
+            <a:srgbClr val="F2F0F6"/>
+          </a:solidFill>
+          <a:ln>
+            <a:solidFill>
+              <a:srgbClr val="360184"/>
+            </a:solidFill>
+          </a:ln>
+        </p:spPr>
+        <p:style>
+          <a:lnRef idx="2">
+            <a:schemeClr val="accent1">
+              <a:shade val="15000"/>
+            </a:schemeClr>
+          </a:lnRef>
+          <a:fillRef idx="1">
+            <a:schemeClr val="accent1"/>
+          </a:fillRef>
+          <a:effectRef idx="0">
+            <a:schemeClr val="accent1"/>
+          </a:effectRef>
+          <a:fontRef idx="minor">
+            <a:schemeClr val="lt1"/>
+          </a:fontRef>
+        </p:style>
+        <p:txBody>
+          <a:bodyPr rtlCol="0" anchor="ctr"/>
+          <a:lstStyle/>
+          <a:p>
+            <a:pPr algn="ctr"/>
+            <a:r>
+              <a:rPr lang="en-US" sz="1000" dirty="0">
+                <a:solidFill>
+                  <a:schemeClr val="tx1"/>
+                </a:solidFill>
+              </a:rPr>
+              <a:t>Thread 1</a:t>
+            </a:r>
+          </a:p>
+        </p:txBody>
+      </p:sp>
+      <p:sp>
+        <p:nvSpPr>
+          <p:cNvPr id="10" name="Rounded Rectangle 9">
+            <a:extLst>
+              <a:ext uri="{FF2B5EF4-FFF2-40B4-BE49-F238E27FC236}">
+                <a16:creationId xmlns:a16="http://schemas.microsoft.com/office/drawing/2014/main" id="{0B80FB7D-8574-1ECC-6632-E033821FA4D7}"/>
+              </a:ext>
+            </a:extLst>
+          </p:cNvPr>
+          <p:cNvSpPr/>
+          <p:nvPr/>
+        </p:nvSpPr>
+        <p:spPr>
+          <a:xfrm>
+            <a:off x="513566" y="1885153"/>
+            <a:ext cx="753113" cy="271984"/>
+          </a:xfrm>
+          <a:prstGeom prst="roundRect">
+            <a:avLst/>
+          </a:prstGeom>
+          <a:solidFill>
+            <a:srgbClr val="F2F0F6"/>
+          </a:solidFill>
+          <a:ln>
+            <a:solidFill>
+              <a:srgbClr val="360184"/>
+            </a:solidFill>
+          </a:ln>
+        </p:spPr>
+        <p:style>
+          <a:lnRef idx="2">
+            <a:schemeClr val="accent1">
+              <a:shade val="15000"/>
+            </a:schemeClr>
+          </a:lnRef>
+          <a:fillRef idx="1">
+            <a:schemeClr val="accent1"/>
+          </a:fillRef>
+          <a:effectRef idx="0">
+            <a:schemeClr val="accent1"/>
+          </a:effectRef>
+          <a:fontRef idx="minor">
+            <a:schemeClr val="lt1"/>
+          </a:fontRef>
+        </p:style>
+        <p:txBody>
+          <a:bodyPr rtlCol="0" anchor="ctr"/>
+          <a:lstStyle/>
+          <a:p>
+            <a:pPr algn="ctr"/>
+            <a:r>
+              <a:rPr lang="en-US" sz="1000" dirty="0">
+                <a:solidFill>
+                  <a:schemeClr val="tx1"/>
+                </a:solidFill>
+              </a:rPr>
+              <a:t>Thread 2</a:t>
+            </a:r>
+          </a:p>
+        </p:txBody>
+      </p:sp>
+      <p:sp>
+        <p:nvSpPr>
+          <p:cNvPr id="11" name="Rounded Rectangle 10">
+            <a:extLst>
+              <a:ext uri="{FF2B5EF4-FFF2-40B4-BE49-F238E27FC236}">
+                <a16:creationId xmlns:a16="http://schemas.microsoft.com/office/drawing/2014/main" id="{58D2A1E6-A837-4B07-8BE7-1D4F0738D304}"/>
+              </a:ext>
+            </a:extLst>
+          </p:cNvPr>
+          <p:cNvSpPr/>
+          <p:nvPr/>
+        </p:nvSpPr>
+        <p:spPr>
+          <a:xfrm>
+            <a:off x="513565" y="2157137"/>
+            <a:ext cx="753113" cy="271984"/>
+          </a:xfrm>
+          <a:prstGeom prst="roundRect">
+            <a:avLst/>
+          </a:prstGeom>
+          <a:solidFill>
+            <a:srgbClr val="F2F0F6"/>
+          </a:solidFill>
+          <a:ln>
+            <a:solidFill>
+              <a:srgbClr val="360184"/>
+            </a:solidFill>
+          </a:ln>
+        </p:spPr>
+        <p:style>
+          <a:lnRef idx="2">
+            <a:schemeClr val="accent1">
+              <a:shade val="15000"/>
+            </a:schemeClr>
+          </a:lnRef>
+          <a:fillRef idx="1">
+            <a:schemeClr val="accent1"/>
+          </a:fillRef>
+          <a:effectRef idx="0">
+            <a:schemeClr val="accent1"/>
+          </a:effectRef>
+          <a:fontRef idx="minor">
+            <a:schemeClr val="lt1"/>
+          </a:fontRef>
+        </p:style>
+        <p:txBody>
+          <a:bodyPr rtlCol="0" anchor="ctr"/>
+          <a:lstStyle/>
+          <a:p>
+            <a:pPr algn="ctr"/>
+            <a:r>
+              <a:rPr lang="en-US" sz="1000" dirty="0">
+                <a:solidFill>
+                  <a:schemeClr val="tx1"/>
+                </a:solidFill>
+              </a:rPr>
+              <a:t>Thread 3</a:t>
+            </a:r>
+          </a:p>
+        </p:txBody>
+      </p:sp>
+      <p:sp>
+        <p:nvSpPr>
+          <p:cNvPr id="12" name="Rounded Rectangle 11">
+            <a:extLst>
+              <a:ext uri="{FF2B5EF4-FFF2-40B4-BE49-F238E27FC236}">
+                <a16:creationId xmlns:a16="http://schemas.microsoft.com/office/drawing/2014/main" id="{89E63861-4A28-43E9-C198-A5C58EAEFADD}"/>
+              </a:ext>
+            </a:extLst>
+          </p:cNvPr>
+          <p:cNvSpPr/>
+          <p:nvPr/>
+        </p:nvSpPr>
+        <p:spPr>
+          <a:xfrm>
+            <a:off x="2007664" y="412586"/>
+            <a:ext cx="1112533" cy="514350"/>
+          </a:xfrm>
+          <a:prstGeom prst="roundRect">
+            <a:avLst/>
+          </a:prstGeom>
+          <a:solidFill>
+            <a:srgbClr val="EFFDF2"/>
+          </a:solidFill>
+          <a:ln>
+            <a:solidFill>
+              <a:srgbClr val="7EE892"/>
+            </a:solidFill>
+          </a:ln>
+        </p:spPr>
+        <p:style>
+          <a:lnRef idx="2">
+            <a:schemeClr val="accent1">
+              <a:shade val="15000"/>
+            </a:schemeClr>
+          </a:lnRef>
+          <a:fillRef idx="1">
+            <a:schemeClr val="accent1"/>
+          </a:fillRef>
+          <a:effectRef idx="0">
+            <a:schemeClr val="accent1"/>
+          </a:effectRef>
+          <a:fontRef idx="minor">
+            <a:schemeClr val="lt1"/>
+          </a:fontRef>
+        </p:style>
+        <p:txBody>
+          <a:bodyPr rtlCol="0" anchor="ctr"/>
+          <a:lstStyle/>
+          <a:p>
+            <a:pPr algn="ctr"/>
+            <a:r>
+              <a:rPr lang="en-US" sz="1200" dirty="0">
+                <a:solidFill>
+                  <a:schemeClr val="tx1"/>
+                </a:solidFill>
+              </a:rPr>
+              <a:t>Process 1</a:t>
+            </a:r>
+          </a:p>
+        </p:txBody>
+      </p:sp>
+      <p:sp>
+        <p:nvSpPr>
+          <p:cNvPr id="13" name="Rounded Rectangle 12">
+            <a:extLst>
+              <a:ext uri="{FF2B5EF4-FFF2-40B4-BE49-F238E27FC236}">
+                <a16:creationId xmlns:a16="http://schemas.microsoft.com/office/drawing/2014/main" id="{FEB97BE9-98E5-ECC6-8DDF-1AE7F57124AA}"/>
+              </a:ext>
+            </a:extLst>
+          </p:cNvPr>
+          <p:cNvSpPr/>
+          <p:nvPr/>
+        </p:nvSpPr>
+        <p:spPr>
+          <a:xfrm>
+            <a:off x="2187373" y="1341185"/>
+            <a:ext cx="753113" cy="271984"/>
+          </a:xfrm>
+          <a:prstGeom prst="roundRect">
+            <a:avLst/>
+          </a:prstGeom>
+          <a:solidFill>
+            <a:srgbClr val="F2F0F6"/>
+          </a:solidFill>
+          <a:ln>
+            <a:solidFill>
+              <a:srgbClr val="360184"/>
+            </a:solidFill>
+          </a:ln>
+        </p:spPr>
+        <p:style>
+          <a:lnRef idx="2">
+            <a:schemeClr val="accent1">
+              <a:shade val="15000"/>
+            </a:schemeClr>
+          </a:lnRef>
+          <a:fillRef idx="1">
+            <a:schemeClr val="accent1"/>
+          </a:fillRef>
+          <a:effectRef idx="0">
+            <a:schemeClr val="accent1"/>
+          </a:effectRef>
+          <a:fontRef idx="minor">
+            <a:schemeClr val="lt1"/>
+          </a:fontRef>
+        </p:style>
+        <p:txBody>
+          <a:bodyPr rtlCol="0" anchor="ctr"/>
+          <a:lstStyle/>
+          <a:p>
+            <a:pPr algn="ctr"/>
+            <a:r>
+              <a:rPr lang="en-US" sz="1000" dirty="0">
+                <a:solidFill>
+                  <a:schemeClr val="tx1"/>
+                </a:solidFill>
+              </a:rPr>
+              <a:t>Thread 0</a:t>
+            </a:r>
+          </a:p>
+        </p:txBody>
+      </p:sp>
+      <p:sp>
+        <p:nvSpPr>
+          <p:cNvPr id="14" name="Rounded Rectangle 13">
+            <a:extLst>
+              <a:ext uri="{FF2B5EF4-FFF2-40B4-BE49-F238E27FC236}">
+                <a16:creationId xmlns:a16="http://schemas.microsoft.com/office/drawing/2014/main" id="{CCAF9898-ABEF-DE05-7576-C7CB1CB02E70}"/>
+              </a:ext>
+            </a:extLst>
+          </p:cNvPr>
+          <p:cNvSpPr/>
+          <p:nvPr/>
+        </p:nvSpPr>
+        <p:spPr>
+          <a:xfrm>
+            <a:off x="2185739" y="1613169"/>
+            <a:ext cx="753113" cy="271984"/>
+          </a:xfrm>
+          <a:prstGeom prst="roundRect">
+            <a:avLst/>
+          </a:prstGeom>
+          <a:solidFill>
+            <a:srgbClr val="F2F0F6"/>
+          </a:solidFill>
+          <a:ln>
+            <a:solidFill>
+              <a:srgbClr val="360184"/>
+            </a:solidFill>
+          </a:ln>
+        </p:spPr>
+        <p:style>
+          <a:lnRef idx="2">
+            <a:schemeClr val="accent1">
+              <a:shade val="15000"/>
+            </a:schemeClr>
+          </a:lnRef>
+          <a:fillRef idx="1">
+            <a:schemeClr val="accent1"/>
+          </a:fillRef>
+          <a:effectRef idx="0">
+            <a:schemeClr val="accent1"/>
+          </a:effectRef>
+          <a:fontRef idx="minor">
+            <a:schemeClr val="lt1"/>
+          </a:fontRef>
+        </p:style>
+        <p:txBody>
+          <a:bodyPr rtlCol="0" anchor="ctr"/>
+          <a:lstStyle/>
+          <a:p>
+            <a:pPr algn="ctr"/>
+            <a:r>
+              <a:rPr lang="en-US" sz="1000" dirty="0">
+                <a:solidFill>
+                  <a:schemeClr val="tx1"/>
+                </a:solidFill>
+              </a:rPr>
+              <a:t>Thread 1</a:t>
+            </a:r>
+          </a:p>
+        </p:txBody>
+      </p:sp>
+      <p:sp>
+        <p:nvSpPr>
+          <p:cNvPr id="15" name="Rounded Rectangle 14">
+            <a:extLst>
+              <a:ext uri="{FF2B5EF4-FFF2-40B4-BE49-F238E27FC236}">
+                <a16:creationId xmlns:a16="http://schemas.microsoft.com/office/drawing/2014/main" id="{AC4489B4-06E2-7784-F8DA-1CDB6BF6908D}"/>
+              </a:ext>
+            </a:extLst>
+          </p:cNvPr>
+          <p:cNvSpPr/>
+          <p:nvPr/>
+        </p:nvSpPr>
+        <p:spPr>
+          <a:xfrm>
+            <a:off x="2184105" y="1885153"/>
+            <a:ext cx="753113" cy="271984"/>
+          </a:xfrm>
+          <a:prstGeom prst="roundRect">
+            <a:avLst/>
+          </a:prstGeom>
+          <a:solidFill>
+            <a:srgbClr val="F2F0F6"/>
+          </a:solidFill>
+          <a:ln>
+            <a:solidFill>
+              <a:srgbClr val="360184"/>
+            </a:solidFill>
+          </a:ln>
+        </p:spPr>
+        <p:style>
+          <a:lnRef idx="2">
+            <a:schemeClr val="accent1">
+              <a:shade val="15000"/>
+            </a:schemeClr>
+          </a:lnRef>
+          <a:fillRef idx="1">
+            <a:schemeClr val="accent1"/>
+          </a:fillRef>
+          <a:effectRef idx="0">
+            <a:schemeClr val="accent1"/>
+          </a:effectRef>
+          <a:fontRef idx="minor">
+            <a:schemeClr val="lt1"/>
+          </a:fontRef>
+        </p:style>
+        <p:txBody>
+          <a:bodyPr rtlCol="0" anchor="ctr"/>
+          <a:lstStyle/>
+          <a:p>
+            <a:pPr algn="ctr"/>
+            <a:r>
+              <a:rPr lang="en-US" sz="1000" dirty="0">
+                <a:solidFill>
+                  <a:schemeClr val="tx1"/>
+                </a:solidFill>
+              </a:rPr>
+              <a:t>Thread 2</a:t>
+            </a:r>
+          </a:p>
+        </p:txBody>
+      </p:sp>
+      <p:sp>
+        <p:nvSpPr>
+          <p:cNvPr id="16" name="Rounded Rectangle 15">
+            <a:extLst>
+              <a:ext uri="{FF2B5EF4-FFF2-40B4-BE49-F238E27FC236}">
+                <a16:creationId xmlns:a16="http://schemas.microsoft.com/office/drawing/2014/main" id="{24E7DBBE-D707-E725-B1BA-25919EEC23C3}"/>
+              </a:ext>
+            </a:extLst>
+          </p:cNvPr>
+          <p:cNvSpPr/>
+          <p:nvPr/>
+        </p:nvSpPr>
+        <p:spPr>
+          <a:xfrm>
+            <a:off x="2184104" y="2157137"/>
+            <a:ext cx="753113" cy="271984"/>
+          </a:xfrm>
+          <a:prstGeom prst="roundRect">
+            <a:avLst/>
+          </a:prstGeom>
+          <a:solidFill>
+            <a:srgbClr val="F2F0F6"/>
+          </a:solidFill>
+          <a:ln>
+            <a:solidFill>
+              <a:srgbClr val="360184"/>
+            </a:solidFill>
+          </a:ln>
+        </p:spPr>
+        <p:style>
+          <a:lnRef idx="2">
+            <a:schemeClr val="accent1">
+              <a:shade val="15000"/>
+            </a:schemeClr>
+          </a:lnRef>
+          <a:fillRef idx="1">
+            <a:schemeClr val="accent1"/>
+          </a:fillRef>
+          <a:effectRef idx="0">
+            <a:schemeClr val="accent1"/>
+          </a:effectRef>
+          <a:fontRef idx="minor">
+            <a:schemeClr val="lt1"/>
+          </a:fontRef>
+        </p:style>
+        <p:txBody>
+          <a:bodyPr rtlCol="0" anchor="ctr"/>
+          <a:lstStyle/>
+          <a:p>
+            <a:pPr algn="ctr"/>
+            <a:r>
+              <a:rPr lang="en-US" sz="1000" dirty="0">
+                <a:solidFill>
+                  <a:schemeClr val="tx1"/>
+                </a:solidFill>
+              </a:rPr>
+              <a:t>Thread 3</a:t>
+            </a:r>
+          </a:p>
+        </p:txBody>
+      </p:sp>
+      <p:sp>
+        <p:nvSpPr>
+          <p:cNvPr id="17" name="Rounded Rectangle 16">
+            <a:extLst>
+              <a:ext uri="{FF2B5EF4-FFF2-40B4-BE49-F238E27FC236}">
+                <a16:creationId xmlns:a16="http://schemas.microsoft.com/office/drawing/2014/main" id="{5F5CE83B-4F03-A66D-B822-3850555B77F0}"/>
+              </a:ext>
+            </a:extLst>
+          </p:cNvPr>
+          <p:cNvSpPr/>
+          <p:nvPr/>
+        </p:nvSpPr>
+        <p:spPr>
+          <a:xfrm>
+            <a:off x="3678203" y="412586"/>
+            <a:ext cx="1112533" cy="514350"/>
+          </a:xfrm>
+          <a:prstGeom prst="roundRect">
+            <a:avLst/>
+          </a:prstGeom>
+          <a:solidFill>
+            <a:srgbClr val="EFFDF2"/>
+          </a:solidFill>
+          <a:ln>
+            <a:solidFill>
+              <a:srgbClr val="7EE892"/>
+            </a:solidFill>
+          </a:ln>
+        </p:spPr>
+        <p:style>
+          <a:lnRef idx="2">
+            <a:schemeClr val="accent1">
+              <a:shade val="15000"/>
+            </a:schemeClr>
+          </a:lnRef>
+          <a:fillRef idx="1">
+            <a:schemeClr val="accent1"/>
+          </a:fillRef>
+          <a:effectRef idx="0">
+            <a:schemeClr val="accent1"/>
+          </a:effectRef>
+          <a:fontRef idx="minor">
+            <a:schemeClr val="lt1"/>
+          </a:fontRef>
+        </p:style>
+        <p:txBody>
+          <a:bodyPr rtlCol="0" anchor="ctr"/>
+          <a:lstStyle/>
+          <a:p>
+            <a:pPr algn="ctr"/>
+            <a:r>
+              <a:rPr lang="en-US" sz="1200" dirty="0">
+                <a:solidFill>
+                  <a:schemeClr val="tx1"/>
+                </a:solidFill>
+              </a:rPr>
+              <a:t>Process 2</a:t>
+            </a:r>
+          </a:p>
+        </p:txBody>
+      </p:sp>
+      <p:sp>
+        <p:nvSpPr>
+          <p:cNvPr id="18" name="Rounded Rectangle 17">
+            <a:extLst>
+              <a:ext uri="{FF2B5EF4-FFF2-40B4-BE49-F238E27FC236}">
+                <a16:creationId xmlns:a16="http://schemas.microsoft.com/office/drawing/2014/main" id="{6276E1CB-AB8A-30DF-73B8-A85F1901EF21}"/>
+              </a:ext>
+            </a:extLst>
+          </p:cNvPr>
+          <p:cNvSpPr/>
+          <p:nvPr/>
+        </p:nvSpPr>
+        <p:spPr>
+          <a:xfrm>
+            <a:off x="3857912" y="1341185"/>
+            <a:ext cx="753113" cy="271984"/>
+          </a:xfrm>
+          <a:prstGeom prst="roundRect">
+            <a:avLst/>
+          </a:prstGeom>
+          <a:solidFill>
+            <a:srgbClr val="F2F0F6"/>
+          </a:solidFill>
+          <a:ln>
+            <a:solidFill>
+              <a:srgbClr val="360184"/>
+            </a:solidFill>
+          </a:ln>
+        </p:spPr>
+        <p:style>
+          <a:lnRef idx="2">
+            <a:schemeClr val="accent1">
+              <a:shade val="15000"/>
+            </a:schemeClr>
+          </a:lnRef>
+          <a:fillRef idx="1">
+            <a:schemeClr val="accent1"/>
+          </a:fillRef>
+          <a:effectRef idx="0">
+            <a:schemeClr val="accent1"/>
+          </a:effectRef>
+          <a:fontRef idx="minor">
+            <a:schemeClr val="lt1"/>
+          </a:fontRef>
+        </p:style>
+        <p:txBody>
+          <a:bodyPr rtlCol="0" anchor="ctr"/>
+          <a:lstStyle/>
+          <a:p>
+            <a:pPr algn="ctr"/>
+            <a:r>
+              <a:rPr lang="en-US" sz="1000" dirty="0">
+                <a:solidFill>
+                  <a:schemeClr val="tx1"/>
+                </a:solidFill>
+              </a:rPr>
+              <a:t>Thread 0</a:t>
+            </a:r>
+          </a:p>
+        </p:txBody>
+      </p:sp>
+      <p:sp>
+        <p:nvSpPr>
+          <p:cNvPr id="19" name="Rounded Rectangle 18">
+            <a:extLst>
+              <a:ext uri="{FF2B5EF4-FFF2-40B4-BE49-F238E27FC236}">
+                <a16:creationId xmlns:a16="http://schemas.microsoft.com/office/drawing/2014/main" id="{4A646303-B254-EC91-D77E-B4D08270A089}"/>
+              </a:ext>
+            </a:extLst>
+          </p:cNvPr>
+          <p:cNvSpPr/>
+          <p:nvPr/>
+        </p:nvSpPr>
+        <p:spPr>
+          <a:xfrm>
+            <a:off x="3856278" y="1613169"/>
+            <a:ext cx="753113" cy="271984"/>
+          </a:xfrm>
+          <a:prstGeom prst="roundRect">
+            <a:avLst/>
+          </a:prstGeom>
+          <a:solidFill>
+            <a:srgbClr val="F2F0F6"/>
+          </a:solidFill>
+          <a:ln>
+            <a:solidFill>
+              <a:srgbClr val="360184"/>
+            </a:solidFill>
+          </a:ln>
+        </p:spPr>
+        <p:style>
+          <a:lnRef idx="2">
+            <a:schemeClr val="accent1">
+              <a:shade val="15000"/>
+            </a:schemeClr>
+          </a:lnRef>
+          <a:fillRef idx="1">
+            <a:schemeClr val="accent1"/>
+          </a:fillRef>
+          <a:effectRef idx="0">
+            <a:schemeClr val="accent1"/>
+          </a:effectRef>
+          <a:fontRef idx="minor">
+            <a:schemeClr val="lt1"/>
+          </a:fontRef>
+        </p:style>
+        <p:txBody>
+          <a:bodyPr rtlCol="0" anchor="ctr"/>
+          <a:lstStyle/>
+          <a:p>
+            <a:pPr algn="ctr"/>
+            <a:r>
+              <a:rPr lang="en-US" sz="1000" dirty="0">
+                <a:solidFill>
+                  <a:schemeClr val="tx1"/>
+                </a:solidFill>
+              </a:rPr>
+              <a:t>Thread 1</a:t>
+            </a:r>
+          </a:p>
+        </p:txBody>
+      </p:sp>
+      <p:sp>
+        <p:nvSpPr>
+          <p:cNvPr id="20" name="Rounded Rectangle 19">
+            <a:extLst>
+              <a:ext uri="{FF2B5EF4-FFF2-40B4-BE49-F238E27FC236}">
+                <a16:creationId xmlns:a16="http://schemas.microsoft.com/office/drawing/2014/main" id="{6CF209F5-5B38-17C5-848F-CEAA21C2AB53}"/>
+              </a:ext>
+            </a:extLst>
+          </p:cNvPr>
+          <p:cNvSpPr/>
+          <p:nvPr/>
+        </p:nvSpPr>
+        <p:spPr>
+          <a:xfrm>
+            <a:off x="3854644" y="1885153"/>
+            <a:ext cx="753113" cy="271984"/>
+          </a:xfrm>
+          <a:prstGeom prst="roundRect">
+            <a:avLst/>
+          </a:prstGeom>
+          <a:solidFill>
+            <a:srgbClr val="F2F0F6"/>
+          </a:solidFill>
+          <a:ln>
+            <a:solidFill>
+              <a:srgbClr val="360184"/>
+            </a:solidFill>
+          </a:ln>
+        </p:spPr>
+        <p:style>
+          <a:lnRef idx="2">
+            <a:schemeClr val="accent1">
+              <a:shade val="15000"/>
+            </a:schemeClr>
+          </a:lnRef>
+          <a:fillRef idx="1">
+            <a:schemeClr val="accent1"/>
+          </a:fillRef>
+          <a:effectRef idx="0">
+            <a:schemeClr val="accent1"/>
+          </a:effectRef>
+          <a:fontRef idx="minor">
+            <a:schemeClr val="lt1"/>
+          </a:fontRef>
+        </p:style>
+        <p:txBody>
+          <a:bodyPr rtlCol="0" anchor="ctr"/>
+          <a:lstStyle/>
+          <a:p>
+            <a:pPr algn="ctr"/>
+            <a:r>
+              <a:rPr lang="en-US" sz="1000" dirty="0">
+                <a:solidFill>
+                  <a:schemeClr val="tx1"/>
+                </a:solidFill>
+              </a:rPr>
+              <a:t>Thread 2</a:t>
+            </a:r>
+          </a:p>
+        </p:txBody>
+      </p:sp>
+      <p:sp>
+        <p:nvSpPr>
+          <p:cNvPr id="21" name="Rounded Rectangle 20">
+            <a:extLst>
+              <a:ext uri="{FF2B5EF4-FFF2-40B4-BE49-F238E27FC236}">
+                <a16:creationId xmlns:a16="http://schemas.microsoft.com/office/drawing/2014/main" id="{65541D10-A30F-31FF-75A8-EA8CCBB81A4F}"/>
+              </a:ext>
+            </a:extLst>
+          </p:cNvPr>
+          <p:cNvSpPr/>
+          <p:nvPr/>
+        </p:nvSpPr>
+        <p:spPr>
+          <a:xfrm>
+            <a:off x="3854643" y="2157137"/>
+            <a:ext cx="753113" cy="271984"/>
+          </a:xfrm>
+          <a:prstGeom prst="roundRect">
+            <a:avLst/>
+          </a:prstGeom>
+          <a:solidFill>
+            <a:srgbClr val="F2F0F6"/>
+          </a:solidFill>
+          <a:ln>
+            <a:solidFill>
+              <a:srgbClr val="360184"/>
+            </a:solidFill>
+          </a:ln>
+        </p:spPr>
+        <p:style>
+          <a:lnRef idx="2">
+            <a:schemeClr val="accent1">
+              <a:shade val="15000"/>
+            </a:schemeClr>
+          </a:lnRef>
+          <a:fillRef idx="1">
+            <a:schemeClr val="accent1"/>
+          </a:fillRef>
+          <a:effectRef idx="0">
+            <a:schemeClr val="accent1"/>
+          </a:effectRef>
+          <a:fontRef idx="minor">
+            <a:schemeClr val="lt1"/>
+          </a:fontRef>
+        </p:style>
+        <p:txBody>
+          <a:bodyPr rtlCol="0" anchor="ctr"/>
+          <a:lstStyle/>
+          <a:p>
+            <a:pPr algn="ctr"/>
+            <a:r>
+              <a:rPr lang="en-US" sz="1000" dirty="0">
+                <a:solidFill>
+                  <a:schemeClr val="tx1"/>
+                </a:solidFill>
+              </a:rPr>
+              <a:t>Thread 3</a:t>
+            </a:r>
+          </a:p>
+        </p:txBody>
+      </p:sp>
+      <p:cxnSp>
+        <p:nvCxnSpPr>
+          <p:cNvPr id="23" name="Straight Arrow Connector 22">
+            <a:extLst>
+              <a:ext uri="{FF2B5EF4-FFF2-40B4-BE49-F238E27FC236}">
+                <a16:creationId xmlns:a16="http://schemas.microsoft.com/office/drawing/2014/main" id="{F4C62C61-0319-3C82-56B5-5BBE8DC5AA61}"/>
+              </a:ext>
+            </a:extLst>
+          </p:cNvPr>
+          <p:cNvCxnSpPr>
+            <a:cxnSpLocks/>
+          </p:cNvCxnSpPr>
+          <p:nvPr/>
+        </p:nvCxnSpPr>
+        <p:spPr>
+          <a:xfrm>
+            <a:off x="1449658" y="615651"/>
+            <a:ext cx="558006" cy="0"/>
+          </a:xfrm>
+          <a:prstGeom prst="straightConnector1">
+            <a:avLst/>
+          </a:prstGeom>
+          <a:ln w="12700">
+            <a:solidFill>
+              <a:schemeClr val="tx1"/>
+            </a:solidFill>
+            <a:tailEnd type="triangle"/>
+          </a:ln>
+        </p:spPr>
+        <p:style>
+          <a:lnRef idx="1">
+            <a:schemeClr val="accent1"/>
+          </a:lnRef>
+          <a:fillRef idx="0">
+            <a:schemeClr val="accent1"/>
+          </a:fillRef>
+          <a:effectRef idx="0">
+            <a:schemeClr val="accent1"/>
+          </a:effectRef>
+          <a:fontRef idx="minor">
+            <a:schemeClr val="tx1"/>
+          </a:fontRef>
+        </p:style>
+      </p:cxnSp>
+      <p:cxnSp>
+        <p:nvCxnSpPr>
+          <p:cNvPr id="24" name="Straight Arrow Connector 23">
+            <a:extLst>
+              <a:ext uri="{FF2B5EF4-FFF2-40B4-BE49-F238E27FC236}">
+                <a16:creationId xmlns:a16="http://schemas.microsoft.com/office/drawing/2014/main" id="{741D8A21-9299-65C8-AFE1-4D690DB0C454}"/>
+              </a:ext>
+            </a:extLst>
+          </p:cNvPr>
+          <p:cNvCxnSpPr>
+            <a:cxnSpLocks/>
+          </p:cNvCxnSpPr>
+          <p:nvPr/>
+        </p:nvCxnSpPr>
+        <p:spPr>
+          <a:xfrm flipH="1">
+            <a:off x="1449658" y="723871"/>
+            <a:ext cx="558006" cy="0"/>
+          </a:xfrm>
+          <a:prstGeom prst="straightConnector1">
+            <a:avLst/>
+          </a:prstGeom>
+          <a:ln w="12700">
+            <a:solidFill>
+              <a:schemeClr val="tx1"/>
+            </a:solidFill>
+            <a:tailEnd type="triangle"/>
+          </a:ln>
+        </p:spPr>
+        <p:style>
+          <a:lnRef idx="1">
+            <a:schemeClr val="accent1"/>
+          </a:lnRef>
+          <a:fillRef idx="0">
+            <a:schemeClr val="accent1"/>
+          </a:fillRef>
+          <a:effectRef idx="0">
+            <a:schemeClr val="accent1"/>
+          </a:effectRef>
+          <a:fontRef idx="minor">
+            <a:schemeClr val="tx1"/>
+          </a:fontRef>
+        </p:style>
+      </p:cxnSp>
+      <p:cxnSp>
+        <p:nvCxnSpPr>
+          <p:cNvPr id="25" name="Straight Arrow Connector 24">
+            <a:extLst>
+              <a:ext uri="{FF2B5EF4-FFF2-40B4-BE49-F238E27FC236}">
+                <a16:creationId xmlns:a16="http://schemas.microsoft.com/office/drawing/2014/main" id="{4275F2C2-8AF3-827F-1D0C-936571A780EE}"/>
+              </a:ext>
+            </a:extLst>
+          </p:cNvPr>
+          <p:cNvCxnSpPr>
+            <a:cxnSpLocks/>
+          </p:cNvCxnSpPr>
+          <p:nvPr/>
+        </p:nvCxnSpPr>
+        <p:spPr>
+          <a:xfrm>
+            <a:off x="3120197" y="615651"/>
+            <a:ext cx="558006" cy="0"/>
+          </a:xfrm>
+          <a:prstGeom prst="straightConnector1">
+            <a:avLst/>
+          </a:prstGeom>
+          <a:ln w="12700">
+            <a:solidFill>
+              <a:schemeClr val="tx1"/>
+            </a:solidFill>
+            <a:tailEnd type="triangle"/>
+          </a:ln>
+        </p:spPr>
+        <p:style>
+          <a:lnRef idx="1">
+            <a:schemeClr val="accent1"/>
+          </a:lnRef>
+          <a:fillRef idx="0">
+            <a:schemeClr val="accent1"/>
+          </a:fillRef>
+          <a:effectRef idx="0">
+            <a:schemeClr val="accent1"/>
+          </a:effectRef>
+          <a:fontRef idx="minor">
+            <a:schemeClr val="tx1"/>
+          </a:fontRef>
+        </p:style>
+      </p:cxnSp>
+      <p:cxnSp>
+        <p:nvCxnSpPr>
+          <p:cNvPr id="26" name="Straight Arrow Connector 25">
+            <a:extLst>
+              <a:ext uri="{FF2B5EF4-FFF2-40B4-BE49-F238E27FC236}">
+                <a16:creationId xmlns:a16="http://schemas.microsoft.com/office/drawing/2014/main" id="{B03C4195-D917-D768-9008-83DF505E1C1B}"/>
+              </a:ext>
+            </a:extLst>
+          </p:cNvPr>
+          <p:cNvCxnSpPr>
+            <a:cxnSpLocks/>
+          </p:cNvCxnSpPr>
+          <p:nvPr/>
+        </p:nvCxnSpPr>
+        <p:spPr>
+          <a:xfrm flipH="1">
+            <a:off x="3120197" y="723871"/>
+            <a:ext cx="558006" cy="0"/>
+          </a:xfrm>
+          <a:prstGeom prst="straightConnector1">
+            <a:avLst/>
+          </a:prstGeom>
+          <a:ln w="12700">
+            <a:solidFill>
+              <a:schemeClr val="tx1"/>
+            </a:solidFill>
+            <a:tailEnd type="triangle"/>
+          </a:ln>
+        </p:spPr>
+        <p:style>
+          <a:lnRef idx="1">
+            <a:schemeClr val="accent1"/>
+          </a:lnRef>
+          <a:fillRef idx="0">
+            <a:schemeClr val="accent1"/>
+          </a:fillRef>
+          <a:effectRef idx="0">
+            <a:schemeClr val="accent1"/>
+          </a:effectRef>
+          <a:fontRef idx="minor">
+            <a:schemeClr val="tx1"/>
+          </a:fontRef>
+        </p:style>
+      </p:cxnSp>
+      <p:cxnSp>
+        <p:nvCxnSpPr>
+          <p:cNvPr id="28" name="Straight Arrow Connector 27">
+            <a:extLst>
+              <a:ext uri="{FF2B5EF4-FFF2-40B4-BE49-F238E27FC236}">
+                <a16:creationId xmlns:a16="http://schemas.microsoft.com/office/drawing/2014/main" id="{9D01E4B8-8569-7B7B-7620-99BB622CF791}"/>
+              </a:ext>
+            </a:extLst>
+          </p:cNvPr>
+          <p:cNvCxnSpPr>
+            <a:stCxn id="4" idx="2"/>
+            <a:endCxn id="5" idx="0"/>
+          </p:cNvCxnSpPr>
+          <p:nvPr/>
+        </p:nvCxnSpPr>
+        <p:spPr>
+          <a:xfrm flipH="1">
+            <a:off x="893391" y="926936"/>
+            <a:ext cx="1" cy="414249"/>
+          </a:xfrm>
+          <a:prstGeom prst="straightConnector1">
+            <a:avLst/>
+          </a:prstGeom>
+          <a:ln w="12700">
+            <a:solidFill>
+              <a:schemeClr val="tx1"/>
+            </a:solidFill>
+            <a:tailEnd type="triangle"/>
+          </a:ln>
+        </p:spPr>
+        <p:style>
+          <a:lnRef idx="1">
+            <a:schemeClr val="accent1"/>
+          </a:lnRef>
+          <a:fillRef idx="0">
+            <a:schemeClr val="accent1"/>
+          </a:fillRef>
+          <a:effectRef idx="0">
+            <a:schemeClr val="accent1"/>
+          </a:effectRef>
+          <a:fontRef idx="minor">
+            <a:schemeClr val="tx1"/>
+          </a:fontRef>
+        </p:style>
+      </p:cxnSp>
+      <p:cxnSp>
+        <p:nvCxnSpPr>
+          <p:cNvPr id="29" name="Straight Arrow Connector 28">
+            <a:extLst>
+              <a:ext uri="{FF2B5EF4-FFF2-40B4-BE49-F238E27FC236}">
+                <a16:creationId xmlns:a16="http://schemas.microsoft.com/office/drawing/2014/main" id="{B841F6C8-14FE-C92D-4346-F9201CAD8A4E}"/>
+              </a:ext>
+            </a:extLst>
+          </p:cNvPr>
+          <p:cNvCxnSpPr/>
+          <p:nvPr/>
+        </p:nvCxnSpPr>
+        <p:spPr>
+          <a:xfrm flipH="1">
+            <a:off x="2560659" y="926936"/>
+            <a:ext cx="1" cy="414249"/>
+          </a:xfrm>
+          <a:prstGeom prst="straightConnector1">
+            <a:avLst/>
+          </a:prstGeom>
+          <a:ln w="12700">
+            <a:solidFill>
+              <a:schemeClr val="tx1"/>
+            </a:solidFill>
+            <a:tailEnd type="triangle"/>
+          </a:ln>
+        </p:spPr>
+        <p:style>
+          <a:lnRef idx="1">
+            <a:schemeClr val="accent1"/>
+          </a:lnRef>
+          <a:fillRef idx="0">
+            <a:schemeClr val="accent1"/>
+          </a:fillRef>
+          <a:effectRef idx="0">
+            <a:schemeClr val="accent1"/>
+          </a:effectRef>
+          <a:fontRef idx="minor">
+            <a:schemeClr val="tx1"/>
+          </a:fontRef>
+        </p:style>
+      </p:cxnSp>
+      <p:cxnSp>
+        <p:nvCxnSpPr>
+          <p:cNvPr id="30" name="Straight Arrow Connector 29">
+            <a:extLst>
+              <a:ext uri="{FF2B5EF4-FFF2-40B4-BE49-F238E27FC236}">
+                <a16:creationId xmlns:a16="http://schemas.microsoft.com/office/drawing/2014/main" id="{E6296B51-F81A-3962-C316-965A05F8E610}"/>
+              </a:ext>
+            </a:extLst>
+          </p:cNvPr>
+          <p:cNvCxnSpPr/>
+          <p:nvPr/>
+        </p:nvCxnSpPr>
+        <p:spPr>
+          <a:xfrm flipH="1">
+            <a:off x="4240708" y="920663"/>
+            <a:ext cx="1" cy="414249"/>
+          </a:xfrm>
+          <a:prstGeom prst="straightConnector1">
+            <a:avLst/>
+          </a:prstGeom>
+          <a:ln w="12700">
+            <a:solidFill>
+              <a:schemeClr val="tx1"/>
+            </a:solidFill>
+            <a:tailEnd type="triangle"/>
+          </a:ln>
+        </p:spPr>
+        <p:style>
+          <a:lnRef idx="1">
+            <a:schemeClr val="accent1"/>
+          </a:lnRef>
+          <a:fillRef idx="0">
+            <a:schemeClr val="accent1"/>
+          </a:fillRef>
+          <a:effectRef idx="0">
+            <a:schemeClr val="accent1"/>
+          </a:effectRef>
+          <a:fontRef idx="minor">
+            <a:schemeClr val="tx1"/>
+          </a:fontRef>
+        </p:style>
+      </p:cxnSp>
+      <p:cxnSp>
+        <p:nvCxnSpPr>
+          <p:cNvPr id="34" name="Elbow Connector 33">
+            <a:extLst>
+              <a:ext uri="{FF2B5EF4-FFF2-40B4-BE49-F238E27FC236}">
+                <a16:creationId xmlns:a16="http://schemas.microsoft.com/office/drawing/2014/main" id="{FDBE5BB2-DF94-69FF-8A76-D01D9E1E7776}"/>
+              </a:ext>
+            </a:extLst>
+          </p:cNvPr>
+          <p:cNvCxnSpPr>
+            <a:cxnSpLocks/>
+          </p:cNvCxnSpPr>
+          <p:nvPr/>
+        </p:nvCxnSpPr>
+        <p:spPr>
+          <a:xfrm rot="5400000" flipH="1" flipV="1">
+            <a:off x="2509821" y="-1257953"/>
+            <a:ext cx="12700" cy="3341078"/>
+          </a:xfrm>
+          <a:prstGeom prst="bentConnector3">
+            <a:avLst>
+              <a:gd name="adj1" fmla="val 1800000"/>
+            </a:avLst>
+          </a:prstGeom>
+          <a:ln w="12700">
+            <a:solidFill>
+              <a:schemeClr val="tx1"/>
+            </a:solidFill>
+            <a:tailEnd type="triangle"/>
+          </a:ln>
+        </p:spPr>
+        <p:style>
+          <a:lnRef idx="1">
+            <a:schemeClr val="accent1"/>
+          </a:lnRef>
+          <a:fillRef idx="0">
+            <a:schemeClr val="accent1"/>
+          </a:fillRef>
+          <a:effectRef idx="0">
+            <a:schemeClr val="accent1"/>
+          </a:effectRef>
+          <a:fontRef idx="minor">
+            <a:schemeClr val="tx1"/>
+          </a:fontRef>
+        </p:style>
+      </p:cxnSp>
+      <p:cxnSp>
+        <p:nvCxnSpPr>
+          <p:cNvPr id="35" name="Elbow Connector 34">
+            <a:extLst>
+              <a:ext uri="{FF2B5EF4-FFF2-40B4-BE49-F238E27FC236}">
+                <a16:creationId xmlns:a16="http://schemas.microsoft.com/office/drawing/2014/main" id="{0E7670D9-6C6F-6621-1246-279F0450E349}"/>
+              </a:ext>
+            </a:extLst>
+          </p:cNvPr>
+          <p:cNvCxnSpPr>
+            <a:cxnSpLocks/>
+          </p:cNvCxnSpPr>
+          <p:nvPr/>
+        </p:nvCxnSpPr>
+        <p:spPr>
+          <a:xfrm rot="16200000" flipV="1">
+            <a:off x="2618041" y="-1256579"/>
+            <a:ext cx="12700" cy="3341078"/>
+          </a:xfrm>
+          <a:prstGeom prst="bentConnector3">
+            <a:avLst>
+              <a:gd name="adj1" fmla="val 2396449"/>
+            </a:avLst>
+          </a:prstGeom>
+          <a:ln w="12700">
+            <a:solidFill>
+              <a:schemeClr val="tx1"/>
+            </a:solidFill>
+            <a:tailEnd type="triangle"/>
+          </a:ln>
+        </p:spPr>
+        <p:style>
+          <a:lnRef idx="1">
+            <a:schemeClr val="accent1"/>
+          </a:lnRef>
+          <a:fillRef idx="0">
+            <a:schemeClr val="accent1"/>
+          </a:fillRef>
+          <a:effectRef idx="0">
+            <a:schemeClr val="accent1"/>
+          </a:effectRef>
+          <a:fontRef idx="minor">
+            <a:schemeClr val="tx1"/>
+          </a:fontRef>
+        </p:style>
+      </p:cxnSp>
+    </p:spTree>
+    <p:extLst>
+      <p:ext uri="{BB962C8B-B14F-4D97-AF65-F5344CB8AC3E}">
+        <p14:creationId xmlns:p14="http://schemas.microsoft.com/office/powerpoint/2010/main" val="3763073775"/>
       </p:ext>
     </p:extLst>
   </p:cSld>

</xml_diff>

<commit_message>
Deploying to gh-pages from @ Southampton-RSG-Training/dirac-intro-to-openmp@a6478b2e90206cef84877b794be4cbec2e72a1c2 🚀
</commit_message>
<xml_diff>
--- a/files/diagrams.pptx
+++ b/files/diagrams.pptx
@@ -6,6 +6,7 @@
   </p:sldMasterIdLst>
   <p:sldIdLst>
     <p:sldId id="256" r:id="rId2"/>
+    <p:sldId id="257" r:id="rId3"/>
   </p:sldIdLst>
   <p:sldSz cx="12192000" cy="6858000"/>
   <p:notesSz cx="6858000" cy="9144000"/>
@@ -261,7 +262,7 @@
           <a:p>
             <a:fld id="{0C1DC71D-3ED4-6E45-B7B6-4C096A8C78F7}" type="datetimeFigureOut">
               <a:rPr lang="en-US" smtClean="0"/>
-              <a:t>6/29/23</a:t>
+              <a:t>12/13/23</a:t>
             </a:fld>
             <a:endParaRPr lang="en-US"/>
           </a:p>
@@ -461,7 +462,7 @@
           <a:p>
             <a:fld id="{0C1DC71D-3ED4-6E45-B7B6-4C096A8C78F7}" type="datetimeFigureOut">
               <a:rPr lang="en-US" smtClean="0"/>
-              <a:t>6/29/23</a:t>
+              <a:t>12/13/23</a:t>
             </a:fld>
             <a:endParaRPr lang="en-US"/>
           </a:p>
@@ -671,7 +672,7 @@
           <a:p>
             <a:fld id="{0C1DC71D-3ED4-6E45-B7B6-4C096A8C78F7}" type="datetimeFigureOut">
               <a:rPr lang="en-US" smtClean="0"/>
-              <a:t>6/29/23</a:t>
+              <a:t>12/13/23</a:t>
             </a:fld>
             <a:endParaRPr lang="en-US"/>
           </a:p>
@@ -871,7 +872,7 @@
           <a:p>
             <a:fld id="{0C1DC71D-3ED4-6E45-B7B6-4C096A8C78F7}" type="datetimeFigureOut">
               <a:rPr lang="en-US" smtClean="0"/>
-              <a:t>6/29/23</a:t>
+              <a:t>12/13/23</a:t>
             </a:fld>
             <a:endParaRPr lang="en-US"/>
           </a:p>
@@ -1147,7 +1148,7 @@
           <a:p>
             <a:fld id="{0C1DC71D-3ED4-6E45-B7B6-4C096A8C78F7}" type="datetimeFigureOut">
               <a:rPr lang="en-US" smtClean="0"/>
-              <a:t>6/29/23</a:t>
+              <a:t>12/13/23</a:t>
             </a:fld>
             <a:endParaRPr lang="en-US"/>
           </a:p>
@@ -1415,7 +1416,7 @@
           <a:p>
             <a:fld id="{0C1DC71D-3ED4-6E45-B7B6-4C096A8C78F7}" type="datetimeFigureOut">
               <a:rPr lang="en-US" smtClean="0"/>
-              <a:t>6/29/23</a:t>
+              <a:t>12/13/23</a:t>
             </a:fld>
             <a:endParaRPr lang="en-US"/>
           </a:p>
@@ -1830,7 +1831,7 @@
           <a:p>
             <a:fld id="{0C1DC71D-3ED4-6E45-B7B6-4C096A8C78F7}" type="datetimeFigureOut">
               <a:rPr lang="en-US" smtClean="0"/>
-              <a:t>6/29/23</a:t>
+              <a:t>12/13/23</a:t>
             </a:fld>
             <a:endParaRPr lang="en-US"/>
           </a:p>
@@ -1972,7 +1973,7 @@
           <a:p>
             <a:fld id="{0C1DC71D-3ED4-6E45-B7B6-4C096A8C78F7}" type="datetimeFigureOut">
               <a:rPr lang="en-US" smtClean="0"/>
-              <a:t>6/29/23</a:t>
+              <a:t>12/13/23</a:t>
             </a:fld>
             <a:endParaRPr lang="en-US"/>
           </a:p>
@@ -2085,7 +2086,7 @@
           <a:p>
             <a:fld id="{0C1DC71D-3ED4-6E45-B7B6-4C096A8C78F7}" type="datetimeFigureOut">
               <a:rPr lang="en-US" smtClean="0"/>
-              <a:t>6/29/23</a:t>
+              <a:t>12/13/23</a:t>
             </a:fld>
             <a:endParaRPr lang="en-US"/>
           </a:p>
@@ -2398,7 +2399,7 @@
           <a:p>
             <a:fld id="{0C1DC71D-3ED4-6E45-B7B6-4C096A8C78F7}" type="datetimeFigureOut">
               <a:rPr lang="en-US" smtClean="0"/>
-              <a:t>6/29/23</a:t>
+              <a:t>12/13/23</a:t>
             </a:fld>
             <a:endParaRPr lang="en-US"/>
           </a:p>
@@ -2687,7 +2688,7 @@
           <a:p>
             <a:fld id="{0C1DC71D-3ED4-6E45-B7B6-4C096A8C78F7}" type="datetimeFigureOut">
               <a:rPr lang="en-US" smtClean="0"/>
-              <a:t>6/29/23</a:t>
+              <a:t>12/13/23</a:t>
             </a:fld>
             <a:endParaRPr lang="en-US"/>
           </a:p>
@@ -2930,7 +2931,7 @@
           <a:p>
             <a:fld id="{0C1DC71D-3ED4-6E45-B7B6-4C096A8C78F7}" type="datetimeFigureOut">
               <a:rPr lang="en-US" smtClean="0"/>
-              <a:t>6/29/23</a:t>
+              <a:t>12/13/23</a:t>
             </a:fld>
             <a:endParaRPr lang="en-US"/>
           </a:p>
@@ -4146,842 +4147,821 @@
           </a:p>
         </p:txBody>
       </p:sp>
-      <p:grpSp>
-        <p:nvGrpSpPr>
-          <p:cNvPr id="2" name="Group 1">
-            <a:extLst>
-              <a:ext uri="{FF2B5EF4-FFF2-40B4-BE49-F238E27FC236}">
-                <a16:creationId xmlns:a16="http://schemas.microsoft.com/office/drawing/2014/main" id="{AC893E03-146E-BB5B-993A-8D0DEE2A359F}"/>
-              </a:ext>
-            </a:extLst>
-          </p:cNvPr>
-          <p:cNvGrpSpPr/>
+      <p:sp>
+        <p:nvSpPr>
+          <p:cNvPr id="4" name="Oval 3">
+            <a:extLst>
+              <a:ext uri="{FF2B5EF4-FFF2-40B4-BE49-F238E27FC236}">
+                <a16:creationId xmlns:a16="http://schemas.microsoft.com/office/drawing/2014/main" id="{813EF3B2-4DC8-DF40-D77A-390CAB716224}"/>
+              </a:ext>
+            </a:extLst>
+          </p:cNvPr>
+          <p:cNvSpPr/>
           <p:nvPr/>
-        </p:nvGrpSpPr>
-        <p:grpSpPr>
-          <a:xfrm>
-            <a:off x="344951" y="160197"/>
-            <a:ext cx="3266274" cy="2854554"/>
-            <a:chOff x="344951" y="160197"/>
-            <a:chExt cx="3266274" cy="2854554"/>
-          </a:xfrm>
-        </p:grpSpPr>
-        <p:sp>
-          <p:nvSpPr>
-            <p:cNvPr id="4" name="Oval 3">
-              <a:extLst>
-                <a:ext uri="{FF2B5EF4-FFF2-40B4-BE49-F238E27FC236}">
-                  <a16:creationId xmlns:a16="http://schemas.microsoft.com/office/drawing/2014/main" id="{813EF3B2-4DC8-DF40-D77A-390CAB716224}"/>
-                </a:ext>
-              </a:extLst>
-            </p:cNvPr>
-            <p:cNvSpPr/>
-            <p:nvPr/>
-          </p:nvSpPr>
-          <p:spPr>
-            <a:xfrm>
-              <a:off x="512429" y="710892"/>
-              <a:ext cx="678656" cy="635794"/>
-            </a:xfrm>
-            <a:prstGeom prst="ellipse">
-              <a:avLst/>
-            </a:prstGeom>
+        </p:nvSpPr>
+        <p:spPr>
+          <a:xfrm>
+            <a:off x="512429" y="710892"/>
+            <a:ext cx="678656" cy="635794"/>
+          </a:xfrm>
+          <a:prstGeom prst="ellipse">
+            <a:avLst/>
+          </a:prstGeom>
+          <a:solidFill>
+            <a:srgbClr val="FEF8EF"/>
+          </a:solidFill>
+          <a:ln>
             <a:solidFill>
-              <a:srgbClr val="FEF8EF"/>
+              <a:srgbClr val="EFC479"/>
             </a:solidFill>
-            <a:ln>
-              <a:solidFill>
-                <a:srgbClr val="EFC479"/>
-              </a:solidFill>
-            </a:ln>
-          </p:spPr>
-          <p:style>
-            <a:lnRef idx="2">
-              <a:schemeClr val="accent1">
-                <a:shade val="15000"/>
-              </a:schemeClr>
-            </a:lnRef>
-            <a:fillRef idx="1">
-              <a:schemeClr val="accent1"/>
-            </a:fillRef>
-            <a:effectRef idx="0">
-              <a:schemeClr val="accent1"/>
-            </a:effectRef>
-            <a:fontRef idx="minor">
-              <a:schemeClr val="lt1"/>
-            </a:fontRef>
-          </p:style>
-          <p:txBody>
-            <a:bodyPr rtlCol="0" anchor="ctr"/>
-            <a:lstStyle/>
-            <a:p>
-              <a:pPr algn="ctr"/>
-              <a:r>
-                <a:rPr lang="en-US" sz="1200" dirty="0">
-                  <a:solidFill>
-                    <a:schemeClr val="tx1"/>
-                  </a:solidFill>
-                </a:rPr>
-                <a:t>-</a:t>
-              </a:r>
-            </a:p>
-          </p:txBody>
-        </p:sp>
-        <p:sp>
-          <p:nvSpPr>
-            <p:cNvPr id="6" name="TextBox 5">
-              <a:extLst>
-                <a:ext uri="{FF2B5EF4-FFF2-40B4-BE49-F238E27FC236}">
-                  <a16:creationId xmlns:a16="http://schemas.microsoft.com/office/drawing/2014/main" id="{0E9AE8AF-0C83-C9EE-4735-CD91C4042C98}"/>
-                </a:ext>
-              </a:extLst>
-            </p:cNvPr>
-            <p:cNvSpPr txBox="1"/>
-            <p:nvPr/>
-          </p:nvSpPr>
-          <p:spPr>
-            <a:xfrm>
-              <a:off x="344951" y="298697"/>
-              <a:ext cx="1013611" cy="369332"/>
-            </a:xfrm>
-            <a:prstGeom prst="rect">
-              <a:avLst/>
-            </a:prstGeom>
-            <a:noFill/>
-          </p:spPr>
-          <p:txBody>
-            <a:bodyPr wrap="square" rtlCol="0">
-              <a:spAutoFit/>
-            </a:bodyPr>
-            <a:lstStyle/>
-            <a:p>
-              <a:r>
-                <a:rPr lang="en-US" dirty="0"/>
-                <a:t>Thread 0</a:t>
-              </a:r>
-            </a:p>
-          </p:txBody>
-        </p:sp>
-        <p:sp>
-          <p:nvSpPr>
-            <p:cNvPr id="7" name="TextBox 6">
-              <a:extLst>
-                <a:ext uri="{FF2B5EF4-FFF2-40B4-BE49-F238E27FC236}">
-                  <a16:creationId xmlns:a16="http://schemas.microsoft.com/office/drawing/2014/main" id="{6FE10DDD-EF62-529D-921A-4C03EC1ABC2A}"/>
-                </a:ext>
-              </a:extLst>
-            </p:cNvPr>
-            <p:cNvSpPr txBox="1"/>
-            <p:nvPr/>
-          </p:nvSpPr>
-          <p:spPr>
-            <a:xfrm>
-              <a:off x="2597614" y="298697"/>
-              <a:ext cx="1013611" cy="369332"/>
-            </a:xfrm>
-            <a:prstGeom prst="rect">
-              <a:avLst/>
-            </a:prstGeom>
-            <a:noFill/>
-          </p:spPr>
-          <p:txBody>
-            <a:bodyPr wrap="square" rtlCol="0">
-              <a:spAutoFit/>
-            </a:bodyPr>
-            <a:lstStyle/>
-            <a:p>
-              <a:r>
-                <a:rPr lang="en-US" dirty="0"/>
-                <a:t>Thread 1</a:t>
-              </a:r>
-            </a:p>
-          </p:txBody>
-        </p:sp>
-        <p:sp>
-          <p:nvSpPr>
-            <p:cNvPr id="8" name="Rounded Rectangle 7">
-              <a:extLst>
-                <a:ext uri="{FF2B5EF4-FFF2-40B4-BE49-F238E27FC236}">
-                  <a16:creationId xmlns:a16="http://schemas.microsoft.com/office/drawing/2014/main" id="{E9CF7F07-049D-CA7E-0634-E53E000DDAB1}"/>
-                </a:ext>
-              </a:extLst>
-            </p:cNvPr>
-            <p:cNvSpPr/>
-            <p:nvPr/>
-          </p:nvSpPr>
-          <p:spPr>
-            <a:xfrm>
-              <a:off x="1638759" y="1350257"/>
-              <a:ext cx="678657" cy="514350"/>
-            </a:xfrm>
-            <a:prstGeom prst="roundRect">
-              <a:avLst/>
-            </a:prstGeom>
+          </a:ln>
+        </p:spPr>
+        <p:style>
+          <a:lnRef idx="2">
+            <a:schemeClr val="accent1">
+              <a:shade val="15000"/>
+            </a:schemeClr>
+          </a:lnRef>
+          <a:fillRef idx="1">
+            <a:schemeClr val="accent1"/>
+          </a:fillRef>
+          <a:effectRef idx="0">
+            <a:schemeClr val="accent1"/>
+          </a:effectRef>
+          <a:fontRef idx="minor">
+            <a:schemeClr val="lt1"/>
+          </a:fontRef>
+        </p:style>
+        <p:txBody>
+          <a:bodyPr rtlCol="0" anchor="ctr"/>
+          <a:lstStyle/>
+          <a:p>
+            <a:pPr algn="ctr"/>
+            <a:r>
+              <a:rPr lang="en-US" sz="1200" dirty="0">
+                <a:solidFill>
+                  <a:schemeClr val="tx1"/>
+                </a:solidFill>
+              </a:rPr>
+              <a:t>-</a:t>
+            </a:r>
+          </a:p>
+        </p:txBody>
+      </p:sp>
+      <p:sp>
+        <p:nvSpPr>
+          <p:cNvPr id="6" name="TextBox 5">
+            <a:extLst>
+              <a:ext uri="{FF2B5EF4-FFF2-40B4-BE49-F238E27FC236}">
+                <a16:creationId xmlns:a16="http://schemas.microsoft.com/office/drawing/2014/main" id="{0E9AE8AF-0C83-C9EE-4735-CD91C4042C98}"/>
+              </a:ext>
+            </a:extLst>
+          </p:cNvPr>
+          <p:cNvSpPr txBox="1"/>
+          <p:nvPr/>
+        </p:nvSpPr>
+        <p:spPr>
+          <a:xfrm>
+            <a:off x="344951" y="298697"/>
+            <a:ext cx="1013611" cy="369332"/>
+          </a:xfrm>
+          <a:prstGeom prst="rect">
+            <a:avLst/>
+          </a:prstGeom>
+          <a:noFill/>
+        </p:spPr>
+        <p:txBody>
+          <a:bodyPr wrap="square" rtlCol="0">
+            <a:spAutoFit/>
+          </a:bodyPr>
+          <a:lstStyle/>
+          <a:p>
+            <a:r>
+              <a:rPr lang="en-US" dirty="0"/>
+              <a:t>Thread 0</a:t>
+            </a:r>
+          </a:p>
+        </p:txBody>
+      </p:sp>
+      <p:sp>
+        <p:nvSpPr>
+          <p:cNvPr id="7" name="TextBox 6">
+            <a:extLst>
+              <a:ext uri="{FF2B5EF4-FFF2-40B4-BE49-F238E27FC236}">
+                <a16:creationId xmlns:a16="http://schemas.microsoft.com/office/drawing/2014/main" id="{6FE10DDD-EF62-529D-921A-4C03EC1ABC2A}"/>
+              </a:ext>
+            </a:extLst>
+          </p:cNvPr>
+          <p:cNvSpPr txBox="1"/>
+          <p:nvPr/>
+        </p:nvSpPr>
+        <p:spPr>
+          <a:xfrm>
+            <a:off x="2597614" y="298697"/>
+            <a:ext cx="1013611" cy="369332"/>
+          </a:xfrm>
+          <a:prstGeom prst="rect">
+            <a:avLst/>
+          </a:prstGeom>
+          <a:noFill/>
+        </p:spPr>
+        <p:txBody>
+          <a:bodyPr wrap="square" rtlCol="0">
+            <a:spAutoFit/>
+          </a:bodyPr>
+          <a:lstStyle/>
+          <a:p>
+            <a:r>
+              <a:rPr lang="en-US" dirty="0"/>
+              <a:t>Thread 1</a:t>
+            </a:r>
+          </a:p>
+        </p:txBody>
+      </p:sp>
+      <p:sp>
+        <p:nvSpPr>
+          <p:cNvPr id="8" name="Rounded Rectangle 7">
+            <a:extLst>
+              <a:ext uri="{FF2B5EF4-FFF2-40B4-BE49-F238E27FC236}">
+                <a16:creationId xmlns:a16="http://schemas.microsoft.com/office/drawing/2014/main" id="{E9CF7F07-049D-CA7E-0634-E53E000DDAB1}"/>
+              </a:ext>
+            </a:extLst>
+          </p:cNvPr>
+          <p:cNvSpPr/>
+          <p:nvPr/>
+        </p:nvSpPr>
+        <p:spPr>
+          <a:xfrm>
+            <a:off x="1638759" y="1350257"/>
+            <a:ext cx="678657" cy="514350"/>
+          </a:xfrm>
+          <a:prstGeom prst="roundRect">
+            <a:avLst/>
+          </a:prstGeom>
+          <a:solidFill>
+            <a:srgbClr val="EFFDF2"/>
+          </a:solidFill>
+          <a:ln>
             <a:solidFill>
-              <a:srgbClr val="EFFDF2"/>
+              <a:srgbClr val="7EE892"/>
             </a:solidFill>
-            <a:ln>
-              <a:solidFill>
-                <a:srgbClr val="7EE892"/>
-              </a:solidFill>
-            </a:ln>
-          </p:spPr>
-          <p:style>
-            <a:lnRef idx="2">
-              <a:schemeClr val="accent1">
-                <a:shade val="15000"/>
-              </a:schemeClr>
-            </a:lnRef>
-            <a:fillRef idx="1">
-              <a:schemeClr val="accent1"/>
-            </a:fillRef>
-            <a:effectRef idx="0">
-              <a:schemeClr val="accent1"/>
-            </a:effectRef>
-            <a:fontRef idx="minor">
-              <a:schemeClr val="lt1"/>
-            </a:fontRef>
-          </p:style>
-          <p:txBody>
-            <a:bodyPr rtlCol="0" anchor="ctr"/>
-            <a:lstStyle/>
-            <a:p>
-              <a:pPr algn="ctr"/>
-              <a:r>
-                <a:rPr lang="en-US" sz="1200" dirty="0">
-                  <a:solidFill>
-                    <a:schemeClr val="tx1"/>
-                  </a:solidFill>
-                </a:rPr>
-                <a:t>0</a:t>
-              </a:r>
-            </a:p>
-          </p:txBody>
-        </p:sp>
-        <p:sp>
-          <p:nvSpPr>
-            <p:cNvPr id="9" name="Oval 8">
-              <a:extLst>
-                <a:ext uri="{FF2B5EF4-FFF2-40B4-BE49-F238E27FC236}">
-                  <a16:creationId xmlns:a16="http://schemas.microsoft.com/office/drawing/2014/main" id="{5EC9C622-C996-6F5B-4F08-B7F3CD0552D3}"/>
-                </a:ext>
-              </a:extLst>
-            </p:cNvPr>
-            <p:cNvSpPr/>
-            <p:nvPr/>
-          </p:nvSpPr>
-          <p:spPr>
-            <a:xfrm>
-              <a:off x="512429" y="1864607"/>
-              <a:ext cx="678656" cy="635794"/>
-            </a:xfrm>
-            <a:prstGeom prst="ellipse">
-              <a:avLst/>
-            </a:prstGeom>
+          </a:ln>
+        </p:spPr>
+        <p:style>
+          <a:lnRef idx="2">
+            <a:schemeClr val="accent1">
+              <a:shade val="15000"/>
+            </a:schemeClr>
+          </a:lnRef>
+          <a:fillRef idx="1">
+            <a:schemeClr val="accent1"/>
+          </a:fillRef>
+          <a:effectRef idx="0">
+            <a:schemeClr val="accent1"/>
+          </a:effectRef>
+          <a:fontRef idx="minor">
+            <a:schemeClr val="lt1"/>
+          </a:fontRef>
+        </p:style>
+        <p:txBody>
+          <a:bodyPr rtlCol="0" anchor="ctr"/>
+          <a:lstStyle/>
+          <a:p>
+            <a:pPr algn="ctr"/>
+            <a:r>
+              <a:rPr lang="en-US" sz="1200" dirty="0">
+                <a:solidFill>
+                  <a:schemeClr val="tx1"/>
+                </a:solidFill>
+              </a:rPr>
+              <a:t>0</a:t>
+            </a:r>
+          </a:p>
+        </p:txBody>
+      </p:sp>
+      <p:sp>
+        <p:nvSpPr>
+          <p:cNvPr id="9" name="Oval 8">
+            <a:extLst>
+              <a:ext uri="{FF2B5EF4-FFF2-40B4-BE49-F238E27FC236}">
+                <a16:creationId xmlns:a16="http://schemas.microsoft.com/office/drawing/2014/main" id="{5EC9C622-C996-6F5B-4F08-B7F3CD0552D3}"/>
+              </a:ext>
+            </a:extLst>
+          </p:cNvPr>
+          <p:cNvSpPr/>
+          <p:nvPr/>
+        </p:nvSpPr>
+        <p:spPr>
+          <a:xfrm>
+            <a:off x="512429" y="1864607"/>
+            <a:ext cx="678656" cy="635794"/>
+          </a:xfrm>
+          <a:prstGeom prst="ellipse">
+            <a:avLst/>
+          </a:prstGeom>
+          <a:solidFill>
+            <a:srgbClr val="FEF8EF"/>
+          </a:solidFill>
+          <a:ln>
             <a:solidFill>
-              <a:srgbClr val="FEF8EF"/>
+              <a:srgbClr val="EFC479"/>
             </a:solidFill>
-            <a:ln>
-              <a:solidFill>
-                <a:srgbClr val="EFC479"/>
-              </a:solidFill>
-            </a:ln>
-          </p:spPr>
-          <p:style>
-            <a:lnRef idx="2">
-              <a:schemeClr val="accent1">
-                <a:shade val="15000"/>
-              </a:schemeClr>
-            </a:lnRef>
-            <a:fillRef idx="1">
-              <a:schemeClr val="accent1"/>
-            </a:fillRef>
-            <a:effectRef idx="0">
-              <a:schemeClr val="accent1"/>
-            </a:effectRef>
-            <a:fontRef idx="minor">
-              <a:schemeClr val="lt1"/>
-            </a:fontRef>
-          </p:style>
-          <p:txBody>
-            <a:bodyPr rtlCol="0" anchor="ctr"/>
-            <a:lstStyle/>
-            <a:p>
-              <a:pPr algn="ctr"/>
-              <a:r>
-                <a:rPr lang="en-US" sz="1200" dirty="0">
-                  <a:solidFill>
-                    <a:schemeClr val="tx1"/>
-                  </a:solidFill>
-                </a:rPr>
-                <a:t>0</a:t>
-              </a:r>
-            </a:p>
-          </p:txBody>
-        </p:sp>
-        <p:sp>
-          <p:nvSpPr>
-            <p:cNvPr id="10" name="Oval 9">
-              <a:extLst>
-                <a:ext uri="{FF2B5EF4-FFF2-40B4-BE49-F238E27FC236}">
-                  <a16:creationId xmlns:a16="http://schemas.microsoft.com/office/drawing/2014/main" id="{45DC1207-73FB-0B61-78B6-CE8A1A5E6A81}"/>
-                </a:ext>
-              </a:extLst>
-            </p:cNvPr>
-            <p:cNvSpPr/>
-            <p:nvPr/>
-          </p:nvSpPr>
-          <p:spPr>
-            <a:xfrm>
-              <a:off x="2765092" y="757684"/>
-              <a:ext cx="678656" cy="635794"/>
-            </a:xfrm>
-            <a:prstGeom prst="ellipse">
-              <a:avLst/>
-            </a:prstGeom>
+          </a:ln>
+        </p:spPr>
+        <p:style>
+          <a:lnRef idx="2">
+            <a:schemeClr val="accent1">
+              <a:shade val="15000"/>
+            </a:schemeClr>
+          </a:lnRef>
+          <a:fillRef idx="1">
+            <a:schemeClr val="accent1"/>
+          </a:fillRef>
+          <a:effectRef idx="0">
+            <a:schemeClr val="accent1"/>
+          </a:effectRef>
+          <a:fontRef idx="minor">
+            <a:schemeClr val="lt1"/>
+          </a:fontRef>
+        </p:style>
+        <p:txBody>
+          <a:bodyPr rtlCol="0" anchor="ctr"/>
+          <a:lstStyle/>
+          <a:p>
+            <a:pPr algn="ctr"/>
+            <a:r>
+              <a:rPr lang="en-US" sz="1200" dirty="0">
+                <a:solidFill>
+                  <a:schemeClr val="tx1"/>
+                </a:solidFill>
+              </a:rPr>
+              <a:t>0</a:t>
+            </a:r>
+          </a:p>
+        </p:txBody>
+      </p:sp>
+      <p:sp>
+        <p:nvSpPr>
+          <p:cNvPr id="10" name="Oval 9">
+            <a:extLst>
+              <a:ext uri="{FF2B5EF4-FFF2-40B4-BE49-F238E27FC236}">
+                <a16:creationId xmlns:a16="http://schemas.microsoft.com/office/drawing/2014/main" id="{45DC1207-73FB-0B61-78B6-CE8A1A5E6A81}"/>
+              </a:ext>
+            </a:extLst>
+          </p:cNvPr>
+          <p:cNvSpPr/>
+          <p:nvPr/>
+        </p:nvSpPr>
+        <p:spPr>
+          <a:xfrm>
+            <a:off x="2765092" y="757684"/>
+            <a:ext cx="678656" cy="635794"/>
+          </a:xfrm>
+          <a:prstGeom prst="ellipse">
+            <a:avLst/>
+          </a:prstGeom>
+          <a:solidFill>
+            <a:srgbClr val="F9F9F9"/>
+          </a:solidFill>
+          <a:ln>
             <a:solidFill>
-              <a:srgbClr val="F9F9F9"/>
+              <a:srgbClr val="360184"/>
             </a:solidFill>
-            <a:ln>
-              <a:solidFill>
-                <a:srgbClr val="360184"/>
-              </a:solidFill>
-            </a:ln>
-          </p:spPr>
-          <p:style>
-            <a:lnRef idx="2">
-              <a:schemeClr val="accent1">
-                <a:shade val="15000"/>
-              </a:schemeClr>
-            </a:lnRef>
-            <a:fillRef idx="1">
-              <a:schemeClr val="accent1"/>
-            </a:fillRef>
-            <a:effectRef idx="0">
-              <a:schemeClr val="accent1"/>
-            </a:effectRef>
-            <a:fontRef idx="minor">
-              <a:schemeClr val="lt1"/>
-            </a:fontRef>
-          </p:style>
-          <p:txBody>
-            <a:bodyPr rtlCol="0" anchor="ctr"/>
-            <a:lstStyle/>
-            <a:p>
-              <a:pPr algn="ctr"/>
-              <a:r>
-                <a:rPr lang="en-US" sz="1200" dirty="0">
-                  <a:solidFill>
-                    <a:schemeClr val="tx1"/>
-                  </a:solidFill>
-                </a:rPr>
-                <a:t>-</a:t>
-              </a:r>
-            </a:p>
-          </p:txBody>
-        </p:sp>
-        <p:sp>
-          <p:nvSpPr>
-            <p:cNvPr id="11" name="Rounded Rectangle 10">
-              <a:extLst>
-                <a:ext uri="{FF2B5EF4-FFF2-40B4-BE49-F238E27FC236}">
-                  <a16:creationId xmlns:a16="http://schemas.microsoft.com/office/drawing/2014/main" id="{47E607B8-855E-267E-7E2A-8413F398EC3C}"/>
-                </a:ext>
-              </a:extLst>
-            </p:cNvPr>
-            <p:cNvSpPr/>
-            <p:nvPr/>
-          </p:nvSpPr>
-          <p:spPr>
-            <a:xfrm>
-              <a:off x="1638759" y="2500401"/>
-              <a:ext cx="678657" cy="514350"/>
-            </a:xfrm>
-            <a:prstGeom prst="roundRect">
-              <a:avLst/>
-            </a:prstGeom>
+          </a:ln>
+        </p:spPr>
+        <p:style>
+          <a:lnRef idx="2">
+            <a:schemeClr val="accent1">
+              <a:shade val="15000"/>
+            </a:schemeClr>
+          </a:lnRef>
+          <a:fillRef idx="1">
+            <a:schemeClr val="accent1"/>
+          </a:fillRef>
+          <a:effectRef idx="0">
+            <a:schemeClr val="accent1"/>
+          </a:effectRef>
+          <a:fontRef idx="minor">
+            <a:schemeClr val="lt1"/>
+          </a:fontRef>
+        </p:style>
+        <p:txBody>
+          <a:bodyPr rtlCol="0" anchor="ctr"/>
+          <a:lstStyle/>
+          <a:p>
+            <a:pPr algn="ctr"/>
+            <a:r>
+              <a:rPr lang="en-US" sz="1200" dirty="0">
+                <a:solidFill>
+                  <a:schemeClr val="tx1"/>
+                </a:solidFill>
+              </a:rPr>
+              <a:t>-</a:t>
+            </a:r>
+          </a:p>
+        </p:txBody>
+      </p:sp>
+      <p:sp>
+        <p:nvSpPr>
+          <p:cNvPr id="11" name="Rounded Rectangle 10">
+            <a:extLst>
+              <a:ext uri="{FF2B5EF4-FFF2-40B4-BE49-F238E27FC236}">
+                <a16:creationId xmlns:a16="http://schemas.microsoft.com/office/drawing/2014/main" id="{47E607B8-855E-267E-7E2A-8413F398EC3C}"/>
+              </a:ext>
+            </a:extLst>
+          </p:cNvPr>
+          <p:cNvSpPr/>
+          <p:nvPr/>
+        </p:nvSpPr>
+        <p:spPr>
+          <a:xfrm>
+            <a:off x="1638759" y="2500401"/>
+            <a:ext cx="678657" cy="514350"/>
+          </a:xfrm>
+          <a:prstGeom prst="roundRect">
+            <a:avLst/>
+          </a:prstGeom>
+          <a:solidFill>
+            <a:srgbClr val="EFFDF2"/>
+          </a:solidFill>
+          <a:ln>
             <a:solidFill>
-              <a:srgbClr val="EFFDF2"/>
+              <a:srgbClr val="7EE892"/>
             </a:solidFill>
-            <a:ln>
-              <a:solidFill>
-                <a:srgbClr val="7EE892"/>
-              </a:solidFill>
-            </a:ln>
-          </p:spPr>
-          <p:style>
-            <a:lnRef idx="2">
-              <a:schemeClr val="accent1">
-                <a:shade val="15000"/>
-              </a:schemeClr>
-            </a:lnRef>
-            <a:fillRef idx="1">
-              <a:schemeClr val="accent1"/>
-            </a:fillRef>
-            <a:effectRef idx="0">
-              <a:schemeClr val="accent1"/>
-            </a:effectRef>
-            <a:fontRef idx="minor">
-              <a:schemeClr val="lt1"/>
-            </a:fontRef>
-          </p:style>
-          <p:txBody>
-            <a:bodyPr rtlCol="0" anchor="ctr"/>
-            <a:lstStyle/>
-            <a:p>
-              <a:pPr algn="ctr"/>
-              <a:r>
-                <a:rPr lang="en-US" sz="1200" dirty="0">
-                  <a:solidFill>
-                    <a:schemeClr val="tx1"/>
-                  </a:solidFill>
-                </a:rPr>
-                <a:t>1 or 2?</a:t>
-              </a:r>
-            </a:p>
-          </p:txBody>
-        </p:sp>
-        <p:sp>
-          <p:nvSpPr>
-            <p:cNvPr id="13" name="Oval 12">
-              <a:extLst>
-                <a:ext uri="{FF2B5EF4-FFF2-40B4-BE49-F238E27FC236}">
-                  <a16:creationId xmlns:a16="http://schemas.microsoft.com/office/drawing/2014/main" id="{1EE0EA55-1CF2-F300-8079-70D82B368396}"/>
-                </a:ext>
-              </a:extLst>
-            </p:cNvPr>
-            <p:cNvSpPr/>
-            <p:nvPr/>
-          </p:nvSpPr>
-          <p:spPr>
-            <a:xfrm>
-              <a:off x="2765092" y="1957396"/>
-              <a:ext cx="678656" cy="635794"/>
-            </a:xfrm>
-            <a:prstGeom prst="ellipse">
-              <a:avLst/>
-            </a:prstGeom>
+          </a:ln>
+        </p:spPr>
+        <p:style>
+          <a:lnRef idx="2">
+            <a:schemeClr val="accent1">
+              <a:shade val="15000"/>
+            </a:schemeClr>
+          </a:lnRef>
+          <a:fillRef idx="1">
+            <a:schemeClr val="accent1"/>
+          </a:fillRef>
+          <a:effectRef idx="0">
+            <a:schemeClr val="accent1"/>
+          </a:effectRef>
+          <a:fontRef idx="minor">
+            <a:schemeClr val="lt1"/>
+          </a:fontRef>
+        </p:style>
+        <p:txBody>
+          <a:bodyPr rtlCol="0" anchor="ctr"/>
+          <a:lstStyle/>
+          <a:p>
+            <a:pPr algn="ctr"/>
+            <a:r>
+              <a:rPr lang="en-US" sz="1200" dirty="0">
+                <a:solidFill>
+                  <a:schemeClr val="tx1"/>
+                </a:solidFill>
+              </a:rPr>
+              <a:t>1 or 2?</a:t>
+            </a:r>
+          </a:p>
+        </p:txBody>
+      </p:sp>
+      <p:sp>
+        <p:nvSpPr>
+          <p:cNvPr id="13" name="Oval 12">
+            <a:extLst>
+              <a:ext uri="{FF2B5EF4-FFF2-40B4-BE49-F238E27FC236}">
+                <a16:creationId xmlns:a16="http://schemas.microsoft.com/office/drawing/2014/main" id="{1EE0EA55-1CF2-F300-8079-70D82B368396}"/>
+              </a:ext>
+            </a:extLst>
+          </p:cNvPr>
+          <p:cNvSpPr/>
+          <p:nvPr/>
+        </p:nvSpPr>
+        <p:spPr>
+          <a:xfrm>
+            <a:off x="2765092" y="1957396"/>
+            <a:ext cx="678656" cy="635794"/>
+          </a:xfrm>
+          <a:prstGeom prst="ellipse">
+            <a:avLst/>
+          </a:prstGeom>
+          <a:solidFill>
+            <a:srgbClr val="F9F9F9"/>
+          </a:solidFill>
+          <a:ln>
             <a:solidFill>
-              <a:srgbClr val="F9F9F9"/>
+              <a:srgbClr val="360184"/>
             </a:solidFill>
-            <a:ln>
-              <a:solidFill>
-                <a:srgbClr val="360184"/>
-              </a:solidFill>
-            </a:ln>
-          </p:spPr>
-          <p:style>
-            <a:lnRef idx="2">
-              <a:schemeClr val="accent1">
-                <a:shade val="15000"/>
-              </a:schemeClr>
-            </a:lnRef>
-            <a:fillRef idx="1">
-              <a:schemeClr val="accent1"/>
-            </a:fillRef>
-            <a:effectRef idx="0">
-              <a:schemeClr val="accent1"/>
-            </a:effectRef>
-            <a:fontRef idx="minor">
-              <a:schemeClr val="lt1"/>
-            </a:fontRef>
-          </p:style>
-          <p:txBody>
-            <a:bodyPr rtlCol="0" anchor="ctr"/>
-            <a:lstStyle/>
-            <a:p>
-              <a:pPr algn="ctr"/>
-              <a:r>
-                <a:rPr lang="en-US" sz="1200" dirty="0">
-                  <a:solidFill>
-                    <a:schemeClr val="tx1"/>
-                  </a:solidFill>
-                </a:rPr>
-                <a:t>0</a:t>
-              </a:r>
-            </a:p>
-          </p:txBody>
-        </p:sp>
-        <p:cxnSp>
-          <p:nvCxnSpPr>
-            <p:cNvPr id="17" name="Straight Arrow Connector 16">
-              <a:extLst>
-                <a:ext uri="{FF2B5EF4-FFF2-40B4-BE49-F238E27FC236}">
-                  <a16:creationId xmlns:a16="http://schemas.microsoft.com/office/drawing/2014/main" id="{50F416EB-2649-0F4A-13F4-65D2DAE98463}"/>
-                </a:ext>
-              </a:extLst>
-            </p:cNvPr>
-            <p:cNvCxnSpPr>
-              <a:stCxn id="4" idx="6"/>
-              <a:endCxn id="8" idx="1"/>
-            </p:cNvCxnSpPr>
-            <p:nvPr/>
-          </p:nvCxnSpPr>
-          <p:spPr>
-            <a:xfrm>
-              <a:off x="1191085" y="1028789"/>
-              <a:ext cx="447674" cy="578643"/>
-            </a:xfrm>
-            <a:prstGeom prst="straightConnector1">
-              <a:avLst/>
-            </a:prstGeom>
-            <a:ln>
-              <a:solidFill>
-                <a:srgbClr val="EFC479"/>
-              </a:solidFill>
-              <a:tailEnd type="triangle"/>
-            </a:ln>
-          </p:spPr>
-          <p:style>
-            <a:lnRef idx="1">
-              <a:schemeClr val="accent1"/>
-            </a:lnRef>
-            <a:fillRef idx="0">
-              <a:schemeClr val="accent1"/>
-            </a:fillRef>
-            <a:effectRef idx="0">
-              <a:schemeClr val="accent1"/>
-            </a:effectRef>
-            <a:fontRef idx="minor">
-              <a:schemeClr val="tx1"/>
-            </a:fontRef>
-          </p:style>
-        </p:cxnSp>
-        <p:cxnSp>
-          <p:nvCxnSpPr>
-            <p:cNvPr id="19" name="Straight Arrow Connector 18">
-              <a:extLst>
-                <a:ext uri="{FF2B5EF4-FFF2-40B4-BE49-F238E27FC236}">
-                  <a16:creationId xmlns:a16="http://schemas.microsoft.com/office/drawing/2014/main" id="{0629F67D-B05E-BB2A-0565-1BF5439BC455}"/>
-                </a:ext>
-              </a:extLst>
-            </p:cNvPr>
-            <p:cNvCxnSpPr>
-              <a:stCxn id="8" idx="1"/>
-              <a:endCxn id="9" idx="6"/>
-            </p:cNvCxnSpPr>
-            <p:nvPr/>
-          </p:nvCxnSpPr>
-          <p:spPr>
-            <a:xfrm flipH="1">
-              <a:off x="1191085" y="1607432"/>
-              <a:ext cx="447674" cy="575072"/>
-            </a:xfrm>
-            <a:prstGeom prst="straightConnector1">
-              <a:avLst/>
-            </a:prstGeom>
-            <a:ln>
-              <a:solidFill>
-                <a:srgbClr val="EFC479"/>
-              </a:solidFill>
-              <a:tailEnd type="triangle"/>
-            </a:ln>
-          </p:spPr>
-          <p:style>
-            <a:lnRef idx="1">
-              <a:schemeClr val="accent1"/>
-            </a:lnRef>
-            <a:fillRef idx="0">
-              <a:schemeClr val="accent1"/>
-            </a:fillRef>
-            <a:effectRef idx="0">
-              <a:schemeClr val="accent1"/>
-            </a:effectRef>
-            <a:fontRef idx="minor">
-              <a:schemeClr val="tx1"/>
-            </a:fontRef>
-          </p:style>
-        </p:cxnSp>
-        <p:cxnSp>
-          <p:nvCxnSpPr>
-            <p:cNvPr id="21" name="Straight Arrow Connector 20">
-              <a:extLst>
-                <a:ext uri="{FF2B5EF4-FFF2-40B4-BE49-F238E27FC236}">
-                  <a16:creationId xmlns:a16="http://schemas.microsoft.com/office/drawing/2014/main" id="{0666F1B2-C171-FE5C-38EC-418FF86E2AE8}"/>
-                </a:ext>
-              </a:extLst>
-            </p:cNvPr>
-            <p:cNvCxnSpPr>
-              <a:stCxn id="9" idx="6"/>
-              <a:endCxn id="11" idx="1"/>
-            </p:cNvCxnSpPr>
-            <p:nvPr/>
-          </p:nvCxnSpPr>
-          <p:spPr>
-            <a:xfrm>
-              <a:off x="1191085" y="2182504"/>
-              <a:ext cx="447674" cy="575072"/>
-            </a:xfrm>
-            <a:prstGeom prst="straightConnector1">
-              <a:avLst/>
-            </a:prstGeom>
-            <a:ln>
-              <a:solidFill>
-                <a:srgbClr val="EFC479"/>
-              </a:solidFill>
-              <a:tailEnd type="triangle"/>
-            </a:ln>
-          </p:spPr>
-          <p:style>
-            <a:lnRef idx="1">
-              <a:schemeClr val="accent1"/>
-            </a:lnRef>
-            <a:fillRef idx="0">
-              <a:schemeClr val="accent1"/>
-            </a:fillRef>
-            <a:effectRef idx="0">
-              <a:schemeClr val="accent1"/>
-            </a:effectRef>
-            <a:fontRef idx="minor">
-              <a:schemeClr val="tx1"/>
-            </a:fontRef>
-          </p:style>
-        </p:cxnSp>
-        <p:cxnSp>
-          <p:nvCxnSpPr>
-            <p:cNvPr id="27" name="Straight Arrow Connector 26">
-              <a:extLst>
-                <a:ext uri="{FF2B5EF4-FFF2-40B4-BE49-F238E27FC236}">
-                  <a16:creationId xmlns:a16="http://schemas.microsoft.com/office/drawing/2014/main" id="{971784EB-158D-AD97-8AB9-7BDB2D859EC1}"/>
-                </a:ext>
-              </a:extLst>
-            </p:cNvPr>
-            <p:cNvCxnSpPr>
-              <a:cxnSpLocks/>
-              <a:stCxn id="10" idx="2"/>
-              <a:endCxn id="8" idx="3"/>
-            </p:cNvCxnSpPr>
-            <p:nvPr/>
-          </p:nvCxnSpPr>
-          <p:spPr>
-            <a:xfrm flipH="1">
-              <a:off x="2317416" y="1075581"/>
-              <a:ext cx="447676" cy="531851"/>
-            </a:xfrm>
-            <a:prstGeom prst="straightConnector1">
-              <a:avLst/>
-            </a:prstGeom>
-            <a:ln>
-              <a:solidFill>
-                <a:srgbClr val="360184"/>
-              </a:solidFill>
-              <a:tailEnd type="triangle"/>
-            </a:ln>
-          </p:spPr>
-          <p:style>
-            <a:lnRef idx="1">
-              <a:schemeClr val="accent1"/>
-            </a:lnRef>
-            <a:fillRef idx="0">
-              <a:schemeClr val="accent1"/>
-            </a:fillRef>
-            <a:effectRef idx="0">
-              <a:schemeClr val="accent1"/>
-            </a:effectRef>
-            <a:fontRef idx="minor">
-              <a:schemeClr val="tx1"/>
-            </a:fontRef>
-          </p:style>
-        </p:cxnSp>
-        <p:cxnSp>
-          <p:nvCxnSpPr>
-            <p:cNvPr id="29" name="Straight Arrow Connector 28">
-              <a:extLst>
-                <a:ext uri="{FF2B5EF4-FFF2-40B4-BE49-F238E27FC236}">
-                  <a16:creationId xmlns:a16="http://schemas.microsoft.com/office/drawing/2014/main" id="{2A42B072-2B4C-4756-DAA7-DD6C1F7D61B8}"/>
-                </a:ext>
-              </a:extLst>
-            </p:cNvPr>
-            <p:cNvCxnSpPr>
-              <a:cxnSpLocks/>
-              <a:stCxn id="8" idx="3"/>
-              <a:endCxn id="13" idx="2"/>
-            </p:cNvCxnSpPr>
-            <p:nvPr/>
-          </p:nvCxnSpPr>
-          <p:spPr>
-            <a:xfrm>
-              <a:off x="2317416" y="1607432"/>
-              <a:ext cx="447676" cy="667861"/>
-            </a:xfrm>
-            <a:prstGeom prst="straightConnector1">
-              <a:avLst/>
-            </a:prstGeom>
-            <a:ln>
-              <a:solidFill>
-                <a:srgbClr val="360184"/>
-              </a:solidFill>
-              <a:tailEnd type="triangle"/>
-            </a:ln>
-          </p:spPr>
-          <p:style>
-            <a:lnRef idx="1">
-              <a:schemeClr val="accent1"/>
-            </a:lnRef>
-            <a:fillRef idx="0">
-              <a:schemeClr val="accent1"/>
-            </a:fillRef>
-            <a:effectRef idx="0">
-              <a:schemeClr val="accent1"/>
-            </a:effectRef>
-            <a:fontRef idx="minor">
-              <a:schemeClr val="tx1"/>
-            </a:fontRef>
-          </p:style>
-        </p:cxnSp>
-        <p:cxnSp>
-          <p:nvCxnSpPr>
-            <p:cNvPr id="31" name="Straight Arrow Connector 30">
-              <a:extLst>
-                <a:ext uri="{FF2B5EF4-FFF2-40B4-BE49-F238E27FC236}">
-                  <a16:creationId xmlns:a16="http://schemas.microsoft.com/office/drawing/2014/main" id="{260EDC20-00C5-236C-0CF4-0AEEE38D161F}"/>
-                </a:ext>
-              </a:extLst>
-            </p:cNvPr>
-            <p:cNvCxnSpPr>
-              <a:cxnSpLocks/>
-              <a:stCxn id="13" idx="2"/>
-              <a:endCxn id="11" idx="3"/>
-            </p:cNvCxnSpPr>
-            <p:nvPr/>
-          </p:nvCxnSpPr>
-          <p:spPr>
-            <a:xfrm flipH="1">
-              <a:off x="2317416" y="2275293"/>
-              <a:ext cx="447676" cy="482283"/>
-            </a:xfrm>
-            <a:prstGeom prst="straightConnector1">
-              <a:avLst/>
-            </a:prstGeom>
-            <a:ln>
-              <a:solidFill>
-                <a:srgbClr val="360184"/>
-              </a:solidFill>
-              <a:tailEnd type="triangle"/>
-            </a:ln>
-          </p:spPr>
-          <p:style>
-            <a:lnRef idx="1">
-              <a:schemeClr val="accent1"/>
-            </a:lnRef>
-            <a:fillRef idx="0">
-              <a:schemeClr val="accent1"/>
-            </a:fillRef>
-            <a:effectRef idx="0">
-              <a:schemeClr val="accent1"/>
-            </a:effectRef>
-            <a:fontRef idx="minor">
-              <a:schemeClr val="tx1"/>
-            </a:fontRef>
-          </p:style>
-        </p:cxnSp>
-        <p:sp>
-          <p:nvSpPr>
-            <p:cNvPr id="32" name="TextBox 31">
-              <a:extLst>
-                <a:ext uri="{FF2B5EF4-FFF2-40B4-BE49-F238E27FC236}">
-                  <a16:creationId xmlns:a16="http://schemas.microsoft.com/office/drawing/2014/main" id="{C4D3E625-237F-0EAA-EECC-16F95DE1AF7D}"/>
-                </a:ext>
-              </a:extLst>
-            </p:cNvPr>
-            <p:cNvSpPr txBox="1"/>
-            <p:nvPr/>
-          </p:nvSpPr>
-          <p:spPr>
-            <a:xfrm>
-              <a:off x="1471281" y="160197"/>
-              <a:ext cx="1013611" cy="646331"/>
-            </a:xfrm>
-            <a:prstGeom prst="rect">
-              <a:avLst/>
-            </a:prstGeom>
-            <a:noFill/>
-          </p:spPr>
-          <p:txBody>
-            <a:bodyPr wrap="square" rtlCol="0">
-              <a:spAutoFit/>
-            </a:bodyPr>
-            <a:lstStyle/>
-            <a:p>
-              <a:pPr algn="ctr"/>
-              <a:r>
-                <a:rPr lang="en-US" dirty="0"/>
-                <a:t>Shared variable</a:t>
-              </a:r>
-            </a:p>
-          </p:txBody>
-        </p:sp>
-        <p:sp>
-          <p:nvSpPr>
-            <p:cNvPr id="53" name="TextBox 52">
-              <a:extLst>
-                <a:ext uri="{FF2B5EF4-FFF2-40B4-BE49-F238E27FC236}">
-                  <a16:creationId xmlns:a16="http://schemas.microsoft.com/office/drawing/2014/main" id="{AD5A531B-41A4-FD04-E51C-CA127C590EA1}"/>
-                </a:ext>
-              </a:extLst>
-            </p:cNvPr>
-            <p:cNvSpPr txBox="1"/>
-            <p:nvPr/>
-          </p:nvSpPr>
-          <p:spPr>
-            <a:xfrm rot="3158393">
-              <a:off x="1303090" y="2281970"/>
-              <a:ext cx="421869" cy="276999"/>
-            </a:xfrm>
-            <a:prstGeom prst="rect">
-              <a:avLst/>
-            </a:prstGeom>
-            <a:noFill/>
-          </p:spPr>
-          <p:txBody>
-            <a:bodyPr wrap="square" rtlCol="0">
-              <a:spAutoFit/>
-            </a:bodyPr>
-            <a:lstStyle/>
-            <a:p>
-              <a:r>
-                <a:rPr lang="en-US" sz="1200" dirty="0"/>
-                <a:t>+1</a:t>
-              </a:r>
-            </a:p>
-          </p:txBody>
-        </p:sp>
-        <p:sp>
-          <p:nvSpPr>
-            <p:cNvPr id="56" name="TextBox 55">
-              <a:extLst>
-                <a:ext uri="{FF2B5EF4-FFF2-40B4-BE49-F238E27FC236}">
-                  <a16:creationId xmlns:a16="http://schemas.microsoft.com/office/drawing/2014/main" id="{1837CAFC-013A-1724-5D6E-6D766435891A}"/>
-                </a:ext>
-              </a:extLst>
-            </p:cNvPr>
-            <p:cNvSpPr txBox="1"/>
-            <p:nvPr/>
-          </p:nvSpPr>
-          <p:spPr>
-            <a:xfrm rot="18757266">
-              <a:off x="2278845" y="2269835"/>
-              <a:ext cx="421869" cy="276999"/>
-            </a:xfrm>
-            <a:prstGeom prst="rect">
-              <a:avLst/>
-            </a:prstGeom>
-            <a:noFill/>
-          </p:spPr>
-          <p:txBody>
-            <a:bodyPr wrap="square" rtlCol="0">
-              <a:spAutoFit/>
-            </a:bodyPr>
-            <a:lstStyle/>
-            <a:p>
-              <a:r>
-                <a:rPr lang="en-US" sz="1200" dirty="0"/>
-                <a:t>+1</a:t>
-              </a:r>
-            </a:p>
-          </p:txBody>
-        </p:sp>
-      </p:grpSp>
+          </a:ln>
+        </p:spPr>
+        <p:style>
+          <a:lnRef idx="2">
+            <a:schemeClr val="accent1">
+              <a:shade val="15000"/>
+            </a:schemeClr>
+          </a:lnRef>
+          <a:fillRef idx="1">
+            <a:schemeClr val="accent1"/>
+          </a:fillRef>
+          <a:effectRef idx="0">
+            <a:schemeClr val="accent1"/>
+          </a:effectRef>
+          <a:fontRef idx="minor">
+            <a:schemeClr val="lt1"/>
+          </a:fontRef>
+        </p:style>
+        <p:txBody>
+          <a:bodyPr rtlCol="0" anchor="ctr"/>
+          <a:lstStyle/>
+          <a:p>
+            <a:pPr algn="ctr"/>
+            <a:r>
+              <a:rPr lang="en-US" sz="1200" dirty="0">
+                <a:solidFill>
+                  <a:schemeClr val="tx1"/>
+                </a:solidFill>
+              </a:rPr>
+              <a:t>0</a:t>
+            </a:r>
+          </a:p>
+        </p:txBody>
+      </p:sp>
+      <p:cxnSp>
+        <p:nvCxnSpPr>
+          <p:cNvPr id="17" name="Straight Arrow Connector 16">
+            <a:extLst>
+              <a:ext uri="{FF2B5EF4-FFF2-40B4-BE49-F238E27FC236}">
+                <a16:creationId xmlns:a16="http://schemas.microsoft.com/office/drawing/2014/main" id="{50F416EB-2649-0F4A-13F4-65D2DAE98463}"/>
+              </a:ext>
+            </a:extLst>
+          </p:cNvPr>
+          <p:cNvCxnSpPr>
+            <a:stCxn id="4" idx="6"/>
+            <a:endCxn id="8" idx="1"/>
+          </p:cNvCxnSpPr>
+          <p:nvPr/>
+        </p:nvCxnSpPr>
+        <p:spPr>
+          <a:xfrm>
+            <a:off x="1191085" y="1028789"/>
+            <a:ext cx="447674" cy="578643"/>
+          </a:xfrm>
+          <a:prstGeom prst="straightConnector1">
+            <a:avLst/>
+          </a:prstGeom>
+          <a:ln>
+            <a:solidFill>
+              <a:srgbClr val="EFC479"/>
+            </a:solidFill>
+            <a:tailEnd type="triangle"/>
+          </a:ln>
+        </p:spPr>
+        <p:style>
+          <a:lnRef idx="1">
+            <a:schemeClr val="accent1"/>
+          </a:lnRef>
+          <a:fillRef idx="0">
+            <a:schemeClr val="accent1"/>
+          </a:fillRef>
+          <a:effectRef idx="0">
+            <a:schemeClr val="accent1"/>
+          </a:effectRef>
+          <a:fontRef idx="minor">
+            <a:schemeClr val="tx1"/>
+          </a:fontRef>
+        </p:style>
+      </p:cxnSp>
+      <p:cxnSp>
+        <p:nvCxnSpPr>
+          <p:cNvPr id="19" name="Straight Arrow Connector 18">
+            <a:extLst>
+              <a:ext uri="{FF2B5EF4-FFF2-40B4-BE49-F238E27FC236}">
+                <a16:creationId xmlns:a16="http://schemas.microsoft.com/office/drawing/2014/main" id="{0629F67D-B05E-BB2A-0565-1BF5439BC455}"/>
+              </a:ext>
+            </a:extLst>
+          </p:cNvPr>
+          <p:cNvCxnSpPr>
+            <a:stCxn id="8" idx="1"/>
+            <a:endCxn id="9" idx="6"/>
+          </p:cNvCxnSpPr>
+          <p:nvPr/>
+        </p:nvCxnSpPr>
+        <p:spPr>
+          <a:xfrm flipH="1">
+            <a:off x="1191085" y="1607432"/>
+            <a:ext cx="447674" cy="575072"/>
+          </a:xfrm>
+          <a:prstGeom prst="straightConnector1">
+            <a:avLst/>
+          </a:prstGeom>
+          <a:ln>
+            <a:solidFill>
+              <a:srgbClr val="EFC479"/>
+            </a:solidFill>
+            <a:tailEnd type="triangle"/>
+          </a:ln>
+        </p:spPr>
+        <p:style>
+          <a:lnRef idx="1">
+            <a:schemeClr val="accent1"/>
+          </a:lnRef>
+          <a:fillRef idx="0">
+            <a:schemeClr val="accent1"/>
+          </a:fillRef>
+          <a:effectRef idx="0">
+            <a:schemeClr val="accent1"/>
+          </a:effectRef>
+          <a:fontRef idx="minor">
+            <a:schemeClr val="tx1"/>
+          </a:fontRef>
+        </p:style>
+      </p:cxnSp>
+      <p:cxnSp>
+        <p:nvCxnSpPr>
+          <p:cNvPr id="21" name="Straight Arrow Connector 20">
+            <a:extLst>
+              <a:ext uri="{FF2B5EF4-FFF2-40B4-BE49-F238E27FC236}">
+                <a16:creationId xmlns:a16="http://schemas.microsoft.com/office/drawing/2014/main" id="{0666F1B2-C171-FE5C-38EC-418FF86E2AE8}"/>
+              </a:ext>
+            </a:extLst>
+          </p:cNvPr>
+          <p:cNvCxnSpPr>
+            <a:stCxn id="9" idx="6"/>
+            <a:endCxn id="11" idx="1"/>
+          </p:cNvCxnSpPr>
+          <p:nvPr/>
+        </p:nvCxnSpPr>
+        <p:spPr>
+          <a:xfrm>
+            <a:off x="1191085" y="2182504"/>
+            <a:ext cx="447674" cy="575072"/>
+          </a:xfrm>
+          <a:prstGeom prst="straightConnector1">
+            <a:avLst/>
+          </a:prstGeom>
+          <a:ln>
+            <a:solidFill>
+              <a:srgbClr val="EFC479"/>
+            </a:solidFill>
+            <a:tailEnd type="triangle"/>
+          </a:ln>
+        </p:spPr>
+        <p:style>
+          <a:lnRef idx="1">
+            <a:schemeClr val="accent1"/>
+          </a:lnRef>
+          <a:fillRef idx="0">
+            <a:schemeClr val="accent1"/>
+          </a:fillRef>
+          <a:effectRef idx="0">
+            <a:schemeClr val="accent1"/>
+          </a:effectRef>
+          <a:fontRef idx="minor">
+            <a:schemeClr val="tx1"/>
+          </a:fontRef>
+        </p:style>
+      </p:cxnSp>
+      <p:cxnSp>
+        <p:nvCxnSpPr>
+          <p:cNvPr id="27" name="Straight Arrow Connector 26">
+            <a:extLst>
+              <a:ext uri="{FF2B5EF4-FFF2-40B4-BE49-F238E27FC236}">
+                <a16:creationId xmlns:a16="http://schemas.microsoft.com/office/drawing/2014/main" id="{971784EB-158D-AD97-8AB9-7BDB2D859EC1}"/>
+              </a:ext>
+            </a:extLst>
+          </p:cNvPr>
+          <p:cNvCxnSpPr>
+            <a:cxnSpLocks/>
+            <a:stCxn id="10" idx="2"/>
+            <a:endCxn id="8" idx="3"/>
+          </p:cNvCxnSpPr>
+          <p:nvPr/>
+        </p:nvCxnSpPr>
+        <p:spPr>
+          <a:xfrm flipH="1">
+            <a:off x="2317416" y="1075581"/>
+            <a:ext cx="447676" cy="531851"/>
+          </a:xfrm>
+          <a:prstGeom prst="straightConnector1">
+            <a:avLst/>
+          </a:prstGeom>
+          <a:ln>
+            <a:solidFill>
+              <a:srgbClr val="360184"/>
+            </a:solidFill>
+            <a:tailEnd type="triangle"/>
+          </a:ln>
+        </p:spPr>
+        <p:style>
+          <a:lnRef idx="1">
+            <a:schemeClr val="accent1"/>
+          </a:lnRef>
+          <a:fillRef idx="0">
+            <a:schemeClr val="accent1"/>
+          </a:fillRef>
+          <a:effectRef idx="0">
+            <a:schemeClr val="accent1"/>
+          </a:effectRef>
+          <a:fontRef idx="minor">
+            <a:schemeClr val="tx1"/>
+          </a:fontRef>
+        </p:style>
+      </p:cxnSp>
+      <p:cxnSp>
+        <p:nvCxnSpPr>
+          <p:cNvPr id="29" name="Straight Arrow Connector 28">
+            <a:extLst>
+              <a:ext uri="{FF2B5EF4-FFF2-40B4-BE49-F238E27FC236}">
+                <a16:creationId xmlns:a16="http://schemas.microsoft.com/office/drawing/2014/main" id="{2A42B072-2B4C-4756-DAA7-DD6C1F7D61B8}"/>
+              </a:ext>
+            </a:extLst>
+          </p:cNvPr>
+          <p:cNvCxnSpPr>
+            <a:cxnSpLocks/>
+            <a:stCxn id="8" idx="3"/>
+            <a:endCxn id="13" idx="2"/>
+          </p:cNvCxnSpPr>
+          <p:nvPr/>
+        </p:nvCxnSpPr>
+        <p:spPr>
+          <a:xfrm>
+            <a:off x="2317416" y="1607432"/>
+            <a:ext cx="447676" cy="667861"/>
+          </a:xfrm>
+          <a:prstGeom prst="straightConnector1">
+            <a:avLst/>
+          </a:prstGeom>
+          <a:ln>
+            <a:solidFill>
+              <a:srgbClr val="360184"/>
+            </a:solidFill>
+            <a:tailEnd type="triangle"/>
+          </a:ln>
+        </p:spPr>
+        <p:style>
+          <a:lnRef idx="1">
+            <a:schemeClr val="accent1"/>
+          </a:lnRef>
+          <a:fillRef idx="0">
+            <a:schemeClr val="accent1"/>
+          </a:fillRef>
+          <a:effectRef idx="0">
+            <a:schemeClr val="accent1"/>
+          </a:effectRef>
+          <a:fontRef idx="minor">
+            <a:schemeClr val="tx1"/>
+          </a:fontRef>
+        </p:style>
+      </p:cxnSp>
+      <p:cxnSp>
+        <p:nvCxnSpPr>
+          <p:cNvPr id="31" name="Straight Arrow Connector 30">
+            <a:extLst>
+              <a:ext uri="{FF2B5EF4-FFF2-40B4-BE49-F238E27FC236}">
+                <a16:creationId xmlns:a16="http://schemas.microsoft.com/office/drawing/2014/main" id="{260EDC20-00C5-236C-0CF4-0AEEE38D161F}"/>
+              </a:ext>
+            </a:extLst>
+          </p:cNvPr>
+          <p:cNvCxnSpPr>
+            <a:cxnSpLocks/>
+            <a:stCxn id="13" idx="2"/>
+            <a:endCxn id="11" idx="3"/>
+          </p:cNvCxnSpPr>
+          <p:nvPr/>
+        </p:nvCxnSpPr>
+        <p:spPr>
+          <a:xfrm flipH="1">
+            <a:off x="2317416" y="2275293"/>
+            <a:ext cx="447676" cy="482283"/>
+          </a:xfrm>
+          <a:prstGeom prst="straightConnector1">
+            <a:avLst/>
+          </a:prstGeom>
+          <a:ln>
+            <a:solidFill>
+              <a:srgbClr val="360184"/>
+            </a:solidFill>
+            <a:tailEnd type="triangle"/>
+          </a:ln>
+        </p:spPr>
+        <p:style>
+          <a:lnRef idx="1">
+            <a:schemeClr val="accent1"/>
+          </a:lnRef>
+          <a:fillRef idx="0">
+            <a:schemeClr val="accent1"/>
+          </a:fillRef>
+          <a:effectRef idx="0">
+            <a:schemeClr val="accent1"/>
+          </a:effectRef>
+          <a:fontRef idx="minor">
+            <a:schemeClr val="tx1"/>
+          </a:fontRef>
+        </p:style>
+      </p:cxnSp>
+      <p:sp>
+        <p:nvSpPr>
+          <p:cNvPr id="32" name="TextBox 31">
+            <a:extLst>
+              <a:ext uri="{FF2B5EF4-FFF2-40B4-BE49-F238E27FC236}">
+                <a16:creationId xmlns:a16="http://schemas.microsoft.com/office/drawing/2014/main" id="{C4D3E625-237F-0EAA-EECC-16F95DE1AF7D}"/>
+              </a:ext>
+            </a:extLst>
+          </p:cNvPr>
+          <p:cNvSpPr txBox="1"/>
+          <p:nvPr/>
+        </p:nvSpPr>
+        <p:spPr>
+          <a:xfrm>
+            <a:off x="1471281" y="160197"/>
+            <a:ext cx="1013611" cy="646331"/>
+          </a:xfrm>
+          <a:prstGeom prst="rect">
+            <a:avLst/>
+          </a:prstGeom>
+          <a:noFill/>
+        </p:spPr>
+        <p:txBody>
+          <a:bodyPr wrap="square" rtlCol="0">
+            <a:spAutoFit/>
+          </a:bodyPr>
+          <a:lstStyle/>
+          <a:p>
+            <a:pPr algn="ctr"/>
+            <a:r>
+              <a:rPr lang="en-US" dirty="0"/>
+              <a:t>Shared variable</a:t>
+            </a:r>
+          </a:p>
+        </p:txBody>
+      </p:sp>
+      <p:sp>
+        <p:nvSpPr>
+          <p:cNvPr id="53" name="TextBox 52">
+            <a:extLst>
+              <a:ext uri="{FF2B5EF4-FFF2-40B4-BE49-F238E27FC236}">
+                <a16:creationId xmlns:a16="http://schemas.microsoft.com/office/drawing/2014/main" id="{AD5A531B-41A4-FD04-E51C-CA127C590EA1}"/>
+              </a:ext>
+            </a:extLst>
+          </p:cNvPr>
+          <p:cNvSpPr txBox="1"/>
+          <p:nvPr/>
+        </p:nvSpPr>
+        <p:spPr>
+          <a:xfrm rot="3158393">
+            <a:off x="1303090" y="2281970"/>
+            <a:ext cx="421869" cy="276999"/>
+          </a:xfrm>
+          <a:prstGeom prst="rect">
+            <a:avLst/>
+          </a:prstGeom>
+          <a:noFill/>
+        </p:spPr>
+        <p:txBody>
+          <a:bodyPr wrap="square" rtlCol="0">
+            <a:spAutoFit/>
+          </a:bodyPr>
+          <a:lstStyle/>
+          <a:p>
+            <a:r>
+              <a:rPr lang="en-US" sz="1200" dirty="0"/>
+              <a:t>+1</a:t>
+            </a:r>
+          </a:p>
+        </p:txBody>
+      </p:sp>
+      <p:sp>
+        <p:nvSpPr>
+          <p:cNvPr id="56" name="TextBox 55">
+            <a:extLst>
+              <a:ext uri="{FF2B5EF4-FFF2-40B4-BE49-F238E27FC236}">
+                <a16:creationId xmlns:a16="http://schemas.microsoft.com/office/drawing/2014/main" id="{1837CAFC-013A-1724-5D6E-6D766435891A}"/>
+              </a:ext>
+            </a:extLst>
+          </p:cNvPr>
+          <p:cNvSpPr txBox="1"/>
+          <p:nvPr/>
+        </p:nvSpPr>
+        <p:spPr>
+          <a:xfrm rot="18757266">
+            <a:off x="2278845" y="2269835"/>
+            <a:ext cx="421869" cy="276999"/>
+          </a:xfrm>
+          <a:prstGeom prst="rect">
+            <a:avLst/>
+          </a:prstGeom>
+          <a:noFill/>
+        </p:spPr>
+        <p:txBody>
+          <a:bodyPr wrap="square" rtlCol="0">
+            <a:spAutoFit/>
+          </a:bodyPr>
+          <a:lstStyle/>
+          <a:p>
+            <a:r>
+              <a:rPr lang="en-US" sz="1200" dirty="0"/>
+              <a:t>+1</a:t>
+            </a:r>
+          </a:p>
+        </p:txBody>
+      </p:sp>
       <p:sp>
         <p:nvSpPr>
           <p:cNvPr id="94" name="TextBox 93">
@@ -5197,6 +5177,1348 @@
     <p:extLst>
       <p:ext uri="{BB962C8B-B14F-4D97-AF65-F5344CB8AC3E}">
         <p14:creationId xmlns:p14="http://schemas.microsoft.com/office/powerpoint/2010/main" val="4138375852"/>
+      </p:ext>
+    </p:extLst>
+  </p:cSld>
+  <p:clrMapOvr>
+    <a:masterClrMapping/>
+  </p:clrMapOvr>
+</p:sld>
+</file>
+
+<file path=ppt/slides/slide2.xml><?xml version="1.0" encoding="utf-8"?>
+<p:sld xmlns:a="http://schemas.openxmlformats.org/drawingml/2006/main" xmlns:r="http://schemas.openxmlformats.org/officeDocument/2006/relationships" xmlns:p="http://schemas.openxmlformats.org/presentationml/2006/main">
+  <p:cSld>
+    <p:spTree>
+      <p:nvGrpSpPr>
+        <p:cNvPr id="1" name=""/>
+        <p:cNvGrpSpPr/>
+        <p:nvPr/>
+      </p:nvGrpSpPr>
+      <p:grpSpPr>
+        <a:xfrm>
+          <a:off x="0" y="0"/>
+          <a:ext cx="0" cy="0"/>
+          <a:chOff x="0" y="0"/>
+          <a:chExt cx="0" cy="0"/>
+        </a:xfrm>
+      </p:grpSpPr>
+      <p:sp>
+        <p:nvSpPr>
+          <p:cNvPr id="4" name="Rounded Rectangle 3">
+            <a:extLst>
+              <a:ext uri="{FF2B5EF4-FFF2-40B4-BE49-F238E27FC236}">
+                <a16:creationId xmlns:a16="http://schemas.microsoft.com/office/drawing/2014/main" id="{5470C9E2-2C8D-79B7-4C04-21F8B43942B5}"/>
+              </a:ext>
+            </a:extLst>
+          </p:cNvPr>
+          <p:cNvSpPr/>
+          <p:nvPr/>
+        </p:nvSpPr>
+        <p:spPr>
+          <a:xfrm>
+            <a:off x="337125" y="412586"/>
+            <a:ext cx="1112533" cy="514350"/>
+          </a:xfrm>
+          <a:prstGeom prst="roundRect">
+            <a:avLst/>
+          </a:prstGeom>
+          <a:solidFill>
+            <a:srgbClr val="EFFDF2"/>
+          </a:solidFill>
+          <a:ln>
+            <a:solidFill>
+              <a:srgbClr val="7EE892"/>
+            </a:solidFill>
+          </a:ln>
+        </p:spPr>
+        <p:style>
+          <a:lnRef idx="2">
+            <a:schemeClr val="accent1">
+              <a:shade val="15000"/>
+            </a:schemeClr>
+          </a:lnRef>
+          <a:fillRef idx="1">
+            <a:schemeClr val="accent1"/>
+          </a:fillRef>
+          <a:effectRef idx="0">
+            <a:schemeClr val="accent1"/>
+          </a:effectRef>
+          <a:fontRef idx="minor">
+            <a:schemeClr val="lt1"/>
+          </a:fontRef>
+        </p:style>
+        <p:txBody>
+          <a:bodyPr rtlCol="0" anchor="ctr"/>
+          <a:lstStyle/>
+          <a:p>
+            <a:pPr algn="ctr"/>
+            <a:r>
+              <a:rPr lang="en-US" sz="1200" dirty="0">
+                <a:solidFill>
+                  <a:schemeClr val="tx1"/>
+                </a:solidFill>
+              </a:rPr>
+              <a:t>Process 0</a:t>
+            </a:r>
+          </a:p>
+        </p:txBody>
+      </p:sp>
+      <p:sp>
+        <p:nvSpPr>
+          <p:cNvPr id="5" name="Rounded Rectangle 4">
+            <a:extLst>
+              <a:ext uri="{FF2B5EF4-FFF2-40B4-BE49-F238E27FC236}">
+                <a16:creationId xmlns:a16="http://schemas.microsoft.com/office/drawing/2014/main" id="{AB183972-8A0A-A8F1-F069-4380A191375C}"/>
+              </a:ext>
+            </a:extLst>
+          </p:cNvPr>
+          <p:cNvSpPr/>
+          <p:nvPr/>
+        </p:nvSpPr>
+        <p:spPr>
+          <a:xfrm>
+            <a:off x="516834" y="1341185"/>
+            <a:ext cx="753113" cy="271984"/>
+          </a:xfrm>
+          <a:prstGeom prst="roundRect">
+            <a:avLst/>
+          </a:prstGeom>
+          <a:solidFill>
+            <a:srgbClr val="F2F0F6"/>
+          </a:solidFill>
+          <a:ln>
+            <a:solidFill>
+              <a:srgbClr val="360184"/>
+            </a:solidFill>
+          </a:ln>
+        </p:spPr>
+        <p:style>
+          <a:lnRef idx="2">
+            <a:schemeClr val="accent1">
+              <a:shade val="15000"/>
+            </a:schemeClr>
+          </a:lnRef>
+          <a:fillRef idx="1">
+            <a:schemeClr val="accent1"/>
+          </a:fillRef>
+          <a:effectRef idx="0">
+            <a:schemeClr val="accent1"/>
+          </a:effectRef>
+          <a:fontRef idx="minor">
+            <a:schemeClr val="lt1"/>
+          </a:fontRef>
+        </p:style>
+        <p:txBody>
+          <a:bodyPr rtlCol="0" anchor="ctr"/>
+          <a:lstStyle/>
+          <a:p>
+            <a:pPr algn="ctr"/>
+            <a:r>
+              <a:rPr lang="en-US" sz="1000" dirty="0">
+                <a:solidFill>
+                  <a:schemeClr val="tx1"/>
+                </a:solidFill>
+              </a:rPr>
+              <a:t>Thread 0</a:t>
+            </a:r>
+          </a:p>
+        </p:txBody>
+      </p:sp>
+      <p:sp>
+        <p:nvSpPr>
+          <p:cNvPr id="9" name="Rounded Rectangle 8">
+            <a:extLst>
+              <a:ext uri="{FF2B5EF4-FFF2-40B4-BE49-F238E27FC236}">
+                <a16:creationId xmlns:a16="http://schemas.microsoft.com/office/drawing/2014/main" id="{92244CB2-0452-4CD0-8DA7-36D4A7BC91C2}"/>
+              </a:ext>
+            </a:extLst>
+          </p:cNvPr>
+          <p:cNvSpPr/>
+          <p:nvPr/>
+        </p:nvSpPr>
+        <p:spPr>
+          <a:xfrm>
+            <a:off x="515200" y="1613169"/>
+            <a:ext cx="753113" cy="271984"/>
+          </a:xfrm>
+          <a:prstGeom prst="roundRect">
+            <a:avLst/>
+          </a:prstGeom>
+          <a:solidFill>
+            <a:srgbClr val="F2F0F6"/>
+          </a:solidFill>
+          <a:ln>
+            <a:solidFill>
+              <a:srgbClr val="360184"/>
+            </a:solidFill>
+          </a:ln>
+        </p:spPr>
+        <p:style>
+          <a:lnRef idx="2">
+            <a:schemeClr val="accent1">
+              <a:shade val="15000"/>
+            </a:schemeClr>
+          </a:lnRef>
+          <a:fillRef idx="1">
+            <a:schemeClr val="accent1"/>
+          </a:fillRef>
+          <a:effectRef idx="0">
+            <a:schemeClr val="accent1"/>
+          </a:effectRef>
+          <a:fontRef idx="minor">
+            <a:schemeClr val="lt1"/>
+          </a:fontRef>
+        </p:style>
+        <p:txBody>
+          <a:bodyPr rtlCol="0" anchor="ctr"/>
+          <a:lstStyle/>
+          <a:p>
+            <a:pPr algn="ctr"/>
+            <a:r>
+              <a:rPr lang="en-US" sz="1000" dirty="0">
+                <a:solidFill>
+                  <a:schemeClr val="tx1"/>
+                </a:solidFill>
+              </a:rPr>
+              <a:t>Thread 1</a:t>
+            </a:r>
+          </a:p>
+        </p:txBody>
+      </p:sp>
+      <p:sp>
+        <p:nvSpPr>
+          <p:cNvPr id="10" name="Rounded Rectangle 9">
+            <a:extLst>
+              <a:ext uri="{FF2B5EF4-FFF2-40B4-BE49-F238E27FC236}">
+                <a16:creationId xmlns:a16="http://schemas.microsoft.com/office/drawing/2014/main" id="{0B80FB7D-8574-1ECC-6632-E033821FA4D7}"/>
+              </a:ext>
+            </a:extLst>
+          </p:cNvPr>
+          <p:cNvSpPr/>
+          <p:nvPr/>
+        </p:nvSpPr>
+        <p:spPr>
+          <a:xfrm>
+            <a:off x="513566" y="1885153"/>
+            <a:ext cx="753113" cy="271984"/>
+          </a:xfrm>
+          <a:prstGeom prst="roundRect">
+            <a:avLst/>
+          </a:prstGeom>
+          <a:solidFill>
+            <a:srgbClr val="F2F0F6"/>
+          </a:solidFill>
+          <a:ln>
+            <a:solidFill>
+              <a:srgbClr val="360184"/>
+            </a:solidFill>
+          </a:ln>
+        </p:spPr>
+        <p:style>
+          <a:lnRef idx="2">
+            <a:schemeClr val="accent1">
+              <a:shade val="15000"/>
+            </a:schemeClr>
+          </a:lnRef>
+          <a:fillRef idx="1">
+            <a:schemeClr val="accent1"/>
+          </a:fillRef>
+          <a:effectRef idx="0">
+            <a:schemeClr val="accent1"/>
+          </a:effectRef>
+          <a:fontRef idx="minor">
+            <a:schemeClr val="lt1"/>
+          </a:fontRef>
+        </p:style>
+        <p:txBody>
+          <a:bodyPr rtlCol="0" anchor="ctr"/>
+          <a:lstStyle/>
+          <a:p>
+            <a:pPr algn="ctr"/>
+            <a:r>
+              <a:rPr lang="en-US" sz="1000" dirty="0">
+                <a:solidFill>
+                  <a:schemeClr val="tx1"/>
+                </a:solidFill>
+              </a:rPr>
+              <a:t>Thread 2</a:t>
+            </a:r>
+          </a:p>
+        </p:txBody>
+      </p:sp>
+      <p:sp>
+        <p:nvSpPr>
+          <p:cNvPr id="11" name="Rounded Rectangle 10">
+            <a:extLst>
+              <a:ext uri="{FF2B5EF4-FFF2-40B4-BE49-F238E27FC236}">
+                <a16:creationId xmlns:a16="http://schemas.microsoft.com/office/drawing/2014/main" id="{58D2A1E6-A837-4B07-8BE7-1D4F0738D304}"/>
+              </a:ext>
+            </a:extLst>
+          </p:cNvPr>
+          <p:cNvSpPr/>
+          <p:nvPr/>
+        </p:nvSpPr>
+        <p:spPr>
+          <a:xfrm>
+            <a:off x="513565" y="2157137"/>
+            <a:ext cx="753113" cy="271984"/>
+          </a:xfrm>
+          <a:prstGeom prst="roundRect">
+            <a:avLst/>
+          </a:prstGeom>
+          <a:solidFill>
+            <a:srgbClr val="F2F0F6"/>
+          </a:solidFill>
+          <a:ln>
+            <a:solidFill>
+              <a:srgbClr val="360184"/>
+            </a:solidFill>
+          </a:ln>
+        </p:spPr>
+        <p:style>
+          <a:lnRef idx="2">
+            <a:schemeClr val="accent1">
+              <a:shade val="15000"/>
+            </a:schemeClr>
+          </a:lnRef>
+          <a:fillRef idx="1">
+            <a:schemeClr val="accent1"/>
+          </a:fillRef>
+          <a:effectRef idx="0">
+            <a:schemeClr val="accent1"/>
+          </a:effectRef>
+          <a:fontRef idx="minor">
+            <a:schemeClr val="lt1"/>
+          </a:fontRef>
+        </p:style>
+        <p:txBody>
+          <a:bodyPr rtlCol="0" anchor="ctr"/>
+          <a:lstStyle/>
+          <a:p>
+            <a:pPr algn="ctr"/>
+            <a:r>
+              <a:rPr lang="en-US" sz="1000" dirty="0">
+                <a:solidFill>
+                  <a:schemeClr val="tx1"/>
+                </a:solidFill>
+              </a:rPr>
+              <a:t>Thread 3</a:t>
+            </a:r>
+          </a:p>
+        </p:txBody>
+      </p:sp>
+      <p:sp>
+        <p:nvSpPr>
+          <p:cNvPr id="12" name="Rounded Rectangle 11">
+            <a:extLst>
+              <a:ext uri="{FF2B5EF4-FFF2-40B4-BE49-F238E27FC236}">
+                <a16:creationId xmlns:a16="http://schemas.microsoft.com/office/drawing/2014/main" id="{89E63861-4A28-43E9-C198-A5C58EAEFADD}"/>
+              </a:ext>
+            </a:extLst>
+          </p:cNvPr>
+          <p:cNvSpPr/>
+          <p:nvPr/>
+        </p:nvSpPr>
+        <p:spPr>
+          <a:xfrm>
+            <a:off x="2007664" y="412586"/>
+            <a:ext cx="1112533" cy="514350"/>
+          </a:xfrm>
+          <a:prstGeom prst="roundRect">
+            <a:avLst/>
+          </a:prstGeom>
+          <a:solidFill>
+            <a:srgbClr val="EFFDF2"/>
+          </a:solidFill>
+          <a:ln>
+            <a:solidFill>
+              <a:srgbClr val="7EE892"/>
+            </a:solidFill>
+          </a:ln>
+        </p:spPr>
+        <p:style>
+          <a:lnRef idx="2">
+            <a:schemeClr val="accent1">
+              <a:shade val="15000"/>
+            </a:schemeClr>
+          </a:lnRef>
+          <a:fillRef idx="1">
+            <a:schemeClr val="accent1"/>
+          </a:fillRef>
+          <a:effectRef idx="0">
+            <a:schemeClr val="accent1"/>
+          </a:effectRef>
+          <a:fontRef idx="minor">
+            <a:schemeClr val="lt1"/>
+          </a:fontRef>
+        </p:style>
+        <p:txBody>
+          <a:bodyPr rtlCol="0" anchor="ctr"/>
+          <a:lstStyle/>
+          <a:p>
+            <a:pPr algn="ctr"/>
+            <a:r>
+              <a:rPr lang="en-US" sz="1200" dirty="0">
+                <a:solidFill>
+                  <a:schemeClr val="tx1"/>
+                </a:solidFill>
+              </a:rPr>
+              <a:t>Process 1</a:t>
+            </a:r>
+          </a:p>
+        </p:txBody>
+      </p:sp>
+      <p:sp>
+        <p:nvSpPr>
+          <p:cNvPr id="13" name="Rounded Rectangle 12">
+            <a:extLst>
+              <a:ext uri="{FF2B5EF4-FFF2-40B4-BE49-F238E27FC236}">
+                <a16:creationId xmlns:a16="http://schemas.microsoft.com/office/drawing/2014/main" id="{FEB97BE9-98E5-ECC6-8DDF-1AE7F57124AA}"/>
+              </a:ext>
+            </a:extLst>
+          </p:cNvPr>
+          <p:cNvSpPr/>
+          <p:nvPr/>
+        </p:nvSpPr>
+        <p:spPr>
+          <a:xfrm>
+            <a:off x="2187373" y="1341185"/>
+            <a:ext cx="753113" cy="271984"/>
+          </a:xfrm>
+          <a:prstGeom prst="roundRect">
+            <a:avLst/>
+          </a:prstGeom>
+          <a:solidFill>
+            <a:srgbClr val="F2F0F6"/>
+          </a:solidFill>
+          <a:ln>
+            <a:solidFill>
+              <a:srgbClr val="360184"/>
+            </a:solidFill>
+          </a:ln>
+        </p:spPr>
+        <p:style>
+          <a:lnRef idx="2">
+            <a:schemeClr val="accent1">
+              <a:shade val="15000"/>
+            </a:schemeClr>
+          </a:lnRef>
+          <a:fillRef idx="1">
+            <a:schemeClr val="accent1"/>
+          </a:fillRef>
+          <a:effectRef idx="0">
+            <a:schemeClr val="accent1"/>
+          </a:effectRef>
+          <a:fontRef idx="minor">
+            <a:schemeClr val="lt1"/>
+          </a:fontRef>
+        </p:style>
+        <p:txBody>
+          <a:bodyPr rtlCol="0" anchor="ctr"/>
+          <a:lstStyle/>
+          <a:p>
+            <a:pPr algn="ctr"/>
+            <a:r>
+              <a:rPr lang="en-US" sz="1000" dirty="0">
+                <a:solidFill>
+                  <a:schemeClr val="tx1"/>
+                </a:solidFill>
+              </a:rPr>
+              <a:t>Thread 0</a:t>
+            </a:r>
+          </a:p>
+        </p:txBody>
+      </p:sp>
+      <p:sp>
+        <p:nvSpPr>
+          <p:cNvPr id="14" name="Rounded Rectangle 13">
+            <a:extLst>
+              <a:ext uri="{FF2B5EF4-FFF2-40B4-BE49-F238E27FC236}">
+                <a16:creationId xmlns:a16="http://schemas.microsoft.com/office/drawing/2014/main" id="{CCAF9898-ABEF-DE05-7576-C7CB1CB02E70}"/>
+              </a:ext>
+            </a:extLst>
+          </p:cNvPr>
+          <p:cNvSpPr/>
+          <p:nvPr/>
+        </p:nvSpPr>
+        <p:spPr>
+          <a:xfrm>
+            <a:off x="2185739" y="1613169"/>
+            <a:ext cx="753113" cy="271984"/>
+          </a:xfrm>
+          <a:prstGeom prst="roundRect">
+            <a:avLst/>
+          </a:prstGeom>
+          <a:solidFill>
+            <a:srgbClr val="F2F0F6"/>
+          </a:solidFill>
+          <a:ln>
+            <a:solidFill>
+              <a:srgbClr val="360184"/>
+            </a:solidFill>
+          </a:ln>
+        </p:spPr>
+        <p:style>
+          <a:lnRef idx="2">
+            <a:schemeClr val="accent1">
+              <a:shade val="15000"/>
+            </a:schemeClr>
+          </a:lnRef>
+          <a:fillRef idx="1">
+            <a:schemeClr val="accent1"/>
+          </a:fillRef>
+          <a:effectRef idx="0">
+            <a:schemeClr val="accent1"/>
+          </a:effectRef>
+          <a:fontRef idx="minor">
+            <a:schemeClr val="lt1"/>
+          </a:fontRef>
+        </p:style>
+        <p:txBody>
+          <a:bodyPr rtlCol="0" anchor="ctr"/>
+          <a:lstStyle/>
+          <a:p>
+            <a:pPr algn="ctr"/>
+            <a:r>
+              <a:rPr lang="en-US" sz="1000" dirty="0">
+                <a:solidFill>
+                  <a:schemeClr val="tx1"/>
+                </a:solidFill>
+              </a:rPr>
+              <a:t>Thread 1</a:t>
+            </a:r>
+          </a:p>
+        </p:txBody>
+      </p:sp>
+      <p:sp>
+        <p:nvSpPr>
+          <p:cNvPr id="15" name="Rounded Rectangle 14">
+            <a:extLst>
+              <a:ext uri="{FF2B5EF4-FFF2-40B4-BE49-F238E27FC236}">
+                <a16:creationId xmlns:a16="http://schemas.microsoft.com/office/drawing/2014/main" id="{AC4489B4-06E2-7784-F8DA-1CDB6BF6908D}"/>
+              </a:ext>
+            </a:extLst>
+          </p:cNvPr>
+          <p:cNvSpPr/>
+          <p:nvPr/>
+        </p:nvSpPr>
+        <p:spPr>
+          <a:xfrm>
+            <a:off x="2184105" y="1885153"/>
+            <a:ext cx="753113" cy="271984"/>
+          </a:xfrm>
+          <a:prstGeom prst="roundRect">
+            <a:avLst/>
+          </a:prstGeom>
+          <a:solidFill>
+            <a:srgbClr val="F2F0F6"/>
+          </a:solidFill>
+          <a:ln>
+            <a:solidFill>
+              <a:srgbClr val="360184"/>
+            </a:solidFill>
+          </a:ln>
+        </p:spPr>
+        <p:style>
+          <a:lnRef idx="2">
+            <a:schemeClr val="accent1">
+              <a:shade val="15000"/>
+            </a:schemeClr>
+          </a:lnRef>
+          <a:fillRef idx="1">
+            <a:schemeClr val="accent1"/>
+          </a:fillRef>
+          <a:effectRef idx="0">
+            <a:schemeClr val="accent1"/>
+          </a:effectRef>
+          <a:fontRef idx="minor">
+            <a:schemeClr val="lt1"/>
+          </a:fontRef>
+        </p:style>
+        <p:txBody>
+          <a:bodyPr rtlCol="0" anchor="ctr"/>
+          <a:lstStyle/>
+          <a:p>
+            <a:pPr algn="ctr"/>
+            <a:r>
+              <a:rPr lang="en-US" sz="1000" dirty="0">
+                <a:solidFill>
+                  <a:schemeClr val="tx1"/>
+                </a:solidFill>
+              </a:rPr>
+              <a:t>Thread 2</a:t>
+            </a:r>
+          </a:p>
+        </p:txBody>
+      </p:sp>
+      <p:sp>
+        <p:nvSpPr>
+          <p:cNvPr id="16" name="Rounded Rectangle 15">
+            <a:extLst>
+              <a:ext uri="{FF2B5EF4-FFF2-40B4-BE49-F238E27FC236}">
+                <a16:creationId xmlns:a16="http://schemas.microsoft.com/office/drawing/2014/main" id="{24E7DBBE-D707-E725-B1BA-25919EEC23C3}"/>
+              </a:ext>
+            </a:extLst>
+          </p:cNvPr>
+          <p:cNvSpPr/>
+          <p:nvPr/>
+        </p:nvSpPr>
+        <p:spPr>
+          <a:xfrm>
+            <a:off x="2184104" y="2157137"/>
+            <a:ext cx="753113" cy="271984"/>
+          </a:xfrm>
+          <a:prstGeom prst="roundRect">
+            <a:avLst/>
+          </a:prstGeom>
+          <a:solidFill>
+            <a:srgbClr val="F2F0F6"/>
+          </a:solidFill>
+          <a:ln>
+            <a:solidFill>
+              <a:srgbClr val="360184"/>
+            </a:solidFill>
+          </a:ln>
+        </p:spPr>
+        <p:style>
+          <a:lnRef idx="2">
+            <a:schemeClr val="accent1">
+              <a:shade val="15000"/>
+            </a:schemeClr>
+          </a:lnRef>
+          <a:fillRef idx="1">
+            <a:schemeClr val="accent1"/>
+          </a:fillRef>
+          <a:effectRef idx="0">
+            <a:schemeClr val="accent1"/>
+          </a:effectRef>
+          <a:fontRef idx="minor">
+            <a:schemeClr val="lt1"/>
+          </a:fontRef>
+        </p:style>
+        <p:txBody>
+          <a:bodyPr rtlCol="0" anchor="ctr"/>
+          <a:lstStyle/>
+          <a:p>
+            <a:pPr algn="ctr"/>
+            <a:r>
+              <a:rPr lang="en-US" sz="1000" dirty="0">
+                <a:solidFill>
+                  <a:schemeClr val="tx1"/>
+                </a:solidFill>
+              </a:rPr>
+              <a:t>Thread 3</a:t>
+            </a:r>
+          </a:p>
+        </p:txBody>
+      </p:sp>
+      <p:sp>
+        <p:nvSpPr>
+          <p:cNvPr id="17" name="Rounded Rectangle 16">
+            <a:extLst>
+              <a:ext uri="{FF2B5EF4-FFF2-40B4-BE49-F238E27FC236}">
+                <a16:creationId xmlns:a16="http://schemas.microsoft.com/office/drawing/2014/main" id="{5F5CE83B-4F03-A66D-B822-3850555B77F0}"/>
+              </a:ext>
+            </a:extLst>
+          </p:cNvPr>
+          <p:cNvSpPr/>
+          <p:nvPr/>
+        </p:nvSpPr>
+        <p:spPr>
+          <a:xfrm>
+            <a:off x="3678203" y="412586"/>
+            <a:ext cx="1112533" cy="514350"/>
+          </a:xfrm>
+          <a:prstGeom prst="roundRect">
+            <a:avLst/>
+          </a:prstGeom>
+          <a:solidFill>
+            <a:srgbClr val="EFFDF2"/>
+          </a:solidFill>
+          <a:ln>
+            <a:solidFill>
+              <a:srgbClr val="7EE892"/>
+            </a:solidFill>
+          </a:ln>
+        </p:spPr>
+        <p:style>
+          <a:lnRef idx="2">
+            <a:schemeClr val="accent1">
+              <a:shade val="15000"/>
+            </a:schemeClr>
+          </a:lnRef>
+          <a:fillRef idx="1">
+            <a:schemeClr val="accent1"/>
+          </a:fillRef>
+          <a:effectRef idx="0">
+            <a:schemeClr val="accent1"/>
+          </a:effectRef>
+          <a:fontRef idx="minor">
+            <a:schemeClr val="lt1"/>
+          </a:fontRef>
+        </p:style>
+        <p:txBody>
+          <a:bodyPr rtlCol="0" anchor="ctr"/>
+          <a:lstStyle/>
+          <a:p>
+            <a:pPr algn="ctr"/>
+            <a:r>
+              <a:rPr lang="en-US" sz="1200" dirty="0">
+                <a:solidFill>
+                  <a:schemeClr val="tx1"/>
+                </a:solidFill>
+              </a:rPr>
+              <a:t>Process 2</a:t>
+            </a:r>
+          </a:p>
+        </p:txBody>
+      </p:sp>
+      <p:sp>
+        <p:nvSpPr>
+          <p:cNvPr id="18" name="Rounded Rectangle 17">
+            <a:extLst>
+              <a:ext uri="{FF2B5EF4-FFF2-40B4-BE49-F238E27FC236}">
+                <a16:creationId xmlns:a16="http://schemas.microsoft.com/office/drawing/2014/main" id="{6276E1CB-AB8A-30DF-73B8-A85F1901EF21}"/>
+              </a:ext>
+            </a:extLst>
+          </p:cNvPr>
+          <p:cNvSpPr/>
+          <p:nvPr/>
+        </p:nvSpPr>
+        <p:spPr>
+          <a:xfrm>
+            <a:off x="3857912" y="1341185"/>
+            <a:ext cx="753113" cy="271984"/>
+          </a:xfrm>
+          <a:prstGeom prst="roundRect">
+            <a:avLst/>
+          </a:prstGeom>
+          <a:solidFill>
+            <a:srgbClr val="F2F0F6"/>
+          </a:solidFill>
+          <a:ln>
+            <a:solidFill>
+              <a:srgbClr val="360184"/>
+            </a:solidFill>
+          </a:ln>
+        </p:spPr>
+        <p:style>
+          <a:lnRef idx="2">
+            <a:schemeClr val="accent1">
+              <a:shade val="15000"/>
+            </a:schemeClr>
+          </a:lnRef>
+          <a:fillRef idx="1">
+            <a:schemeClr val="accent1"/>
+          </a:fillRef>
+          <a:effectRef idx="0">
+            <a:schemeClr val="accent1"/>
+          </a:effectRef>
+          <a:fontRef idx="minor">
+            <a:schemeClr val="lt1"/>
+          </a:fontRef>
+        </p:style>
+        <p:txBody>
+          <a:bodyPr rtlCol="0" anchor="ctr"/>
+          <a:lstStyle/>
+          <a:p>
+            <a:pPr algn="ctr"/>
+            <a:r>
+              <a:rPr lang="en-US" sz="1000" dirty="0">
+                <a:solidFill>
+                  <a:schemeClr val="tx1"/>
+                </a:solidFill>
+              </a:rPr>
+              <a:t>Thread 0</a:t>
+            </a:r>
+          </a:p>
+        </p:txBody>
+      </p:sp>
+      <p:sp>
+        <p:nvSpPr>
+          <p:cNvPr id="19" name="Rounded Rectangle 18">
+            <a:extLst>
+              <a:ext uri="{FF2B5EF4-FFF2-40B4-BE49-F238E27FC236}">
+                <a16:creationId xmlns:a16="http://schemas.microsoft.com/office/drawing/2014/main" id="{4A646303-B254-EC91-D77E-B4D08270A089}"/>
+              </a:ext>
+            </a:extLst>
+          </p:cNvPr>
+          <p:cNvSpPr/>
+          <p:nvPr/>
+        </p:nvSpPr>
+        <p:spPr>
+          <a:xfrm>
+            <a:off x="3856278" y="1613169"/>
+            <a:ext cx="753113" cy="271984"/>
+          </a:xfrm>
+          <a:prstGeom prst="roundRect">
+            <a:avLst/>
+          </a:prstGeom>
+          <a:solidFill>
+            <a:srgbClr val="F2F0F6"/>
+          </a:solidFill>
+          <a:ln>
+            <a:solidFill>
+              <a:srgbClr val="360184"/>
+            </a:solidFill>
+          </a:ln>
+        </p:spPr>
+        <p:style>
+          <a:lnRef idx="2">
+            <a:schemeClr val="accent1">
+              <a:shade val="15000"/>
+            </a:schemeClr>
+          </a:lnRef>
+          <a:fillRef idx="1">
+            <a:schemeClr val="accent1"/>
+          </a:fillRef>
+          <a:effectRef idx="0">
+            <a:schemeClr val="accent1"/>
+          </a:effectRef>
+          <a:fontRef idx="minor">
+            <a:schemeClr val="lt1"/>
+          </a:fontRef>
+        </p:style>
+        <p:txBody>
+          <a:bodyPr rtlCol="0" anchor="ctr"/>
+          <a:lstStyle/>
+          <a:p>
+            <a:pPr algn="ctr"/>
+            <a:r>
+              <a:rPr lang="en-US" sz="1000" dirty="0">
+                <a:solidFill>
+                  <a:schemeClr val="tx1"/>
+                </a:solidFill>
+              </a:rPr>
+              <a:t>Thread 1</a:t>
+            </a:r>
+          </a:p>
+        </p:txBody>
+      </p:sp>
+      <p:sp>
+        <p:nvSpPr>
+          <p:cNvPr id="20" name="Rounded Rectangle 19">
+            <a:extLst>
+              <a:ext uri="{FF2B5EF4-FFF2-40B4-BE49-F238E27FC236}">
+                <a16:creationId xmlns:a16="http://schemas.microsoft.com/office/drawing/2014/main" id="{6CF209F5-5B38-17C5-848F-CEAA21C2AB53}"/>
+              </a:ext>
+            </a:extLst>
+          </p:cNvPr>
+          <p:cNvSpPr/>
+          <p:nvPr/>
+        </p:nvSpPr>
+        <p:spPr>
+          <a:xfrm>
+            <a:off x="3854644" y="1885153"/>
+            <a:ext cx="753113" cy="271984"/>
+          </a:xfrm>
+          <a:prstGeom prst="roundRect">
+            <a:avLst/>
+          </a:prstGeom>
+          <a:solidFill>
+            <a:srgbClr val="F2F0F6"/>
+          </a:solidFill>
+          <a:ln>
+            <a:solidFill>
+              <a:srgbClr val="360184"/>
+            </a:solidFill>
+          </a:ln>
+        </p:spPr>
+        <p:style>
+          <a:lnRef idx="2">
+            <a:schemeClr val="accent1">
+              <a:shade val="15000"/>
+            </a:schemeClr>
+          </a:lnRef>
+          <a:fillRef idx="1">
+            <a:schemeClr val="accent1"/>
+          </a:fillRef>
+          <a:effectRef idx="0">
+            <a:schemeClr val="accent1"/>
+          </a:effectRef>
+          <a:fontRef idx="minor">
+            <a:schemeClr val="lt1"/>
+          </a:fontRef>
+        </p:style>
+        <p:txBody>
+          <a:bodyPr rtlCol="0" anchor="ctr"/>
+          <a:lstStyle/>
+          <a:p>
+            <a:pPr algn="ctr"/>
+            <a:r>
+              <a:rPr lang="en-US" sz="1000" dirty="0">
+                <a:solidFill>
+                  <a:schemeClr val="tx1"/>
+                </a:solidFill>
+              </a:rPr>
+              <a:t>Thread 2</a:t>
+            </a:r>
+          </a:p>
+        </p:txBody>
+      </p:sp>
+      <p:sp>
+        <p:nvSpPr>
+          <p:cNvPr id="21" name="Rounded Rectangle 20">
+            <a:extLst>
+              <a:ext uri="{FF2B5EF4-FFF2-40B4-BE49-F238E27FC236}">
+                <a16:creationId xmlns:a16="http://schemas.microsoft.com/office/drawing/2014/main" id="{65541D10-A30F-31FF-75A8-EA8CCBB81A4F}"/>
+              </a:ext>
+            </a:extLst>
+          </p:cNvPr>
+          <p:cNvSpPr/>
+          <p:nvPr/>
+        </p:nvSpPr>
+        <p:spPr>
+          <a:xfrm>
+            <a:off x="3854643" y="2157137"/>
+            <a:ext cx="753113" cy="271984"/>
+          </a:xfrm>
+          <a:prstGeom prst="roundRect">
+            <a:avLst/>
+          </a:prstGeom>
+          <a:solidFill>
+            <a:srgbClr val="F2F0F6"/>
+          </a:solidFill>
+          <a:ln>
+            <a:solidFill>
+              <a:srgbClr val="360184"/>
+            </a:solidFill>
+          </a:ln>
+        </p:spPr>
+        <p:style>
+          <a:lnRef idx="2">
+            <a:schemeClr val="accent1">
+              <a:shade val="15000"/>
+            </a:schemeClr>
+          </a:lnRef>
+          <a:fillRef idx="1">
+            <a:schemeClr val="accent1"/>
+          </a:fillRef>
+          <a:effectRef idx="0">
+            <a:schemeClr val="accent1"/>
+          </a:effectRef>
+          <a:fontRef idx="minor">
+            <a:schemeClr val="lt1"/>
+          </a:fontRef>
+        </p:style>
+        <p:txBody>
+          <a:bodyPr rtlCol="0" anchor="ctr"/>
+          <a:lstStyle/>
+          <a:p>
+            <a:pPr algn="ctr"/>
+            <a:r>
+              <a:rPr lang="en-US" sz="1000" dirty="0">
+                <a:solidFill>
+                  <a:schemeClr val="tx1"/>
+                </a:solidFill>
+              </a:rPr>
+              <a:t>Thread 3</a:t>
+            </a:r>
+          </a:p>
+        </p:txBody>
+      </p:sp>
+      <p:cxnSp>
+        <p:nvCxnSpPr>
+          <p:cNvPr id="23" name="Straight Arrow Connector 22">
+            <a:extLst>
+              <a:ext uri="{FF2B5EF4-FFF2-40B4-BE49-F238E27FC236}">
+                <a16:creationId xmlns:a16="http://schemas.microsoft.com/office/drawing/2014/main" id="{F4C62C61-0319-3C82-56B5-5BBE8DC5AA61}"/>
+              </a:ext>
+            </a:extLst>
+          </p:cNvPr>
+          <p:cNvCxnSpPr>
+            <a:cxnSpLocks/>
+          </p:cNvCxnSpPr>
+          <p:nvPr/>
+        </p:nvCxnSpPr>
+        <p:spPr>
+          <a:xfrm>
+            <a:off x="1449658" y="615651"/>
+            <a:ext cx="558006" cy="0"/>
+          </a:xfrm>
+          <a:prstGeom prst="straightConnector1">
+            <a:avLst/>
+          </a:prstGeom>
+          <a:ln w="12700">
+            <a:solidFill>
+              <a:schemeClr val="tx1"/>
+            </a:solidFill>
+            <a:tailEnd type="triangle"/>
+          </a:ln>
+        </p:spPr>
+        <p:style>
+          <a:lnRef idx="1">
+            <a:schemeClr val="accent1"/>
+          </a:lnRef>
+          <a:fillRef idx="0">
+            <a:schemeClr val="accent1"/>
+          </a:fillRef>
+          <a:effectRef idx="0">
+            <a:schemeClr val="accent1"/>
+          </a:effectRef>
+          <a:fontRef idx="minor">
+            <a:schemeClr val="tx1"/>
+          </a:fontRef>
+        </p:style>
+      </p:cxnSp>
+      <p:cxnSp>
+        <p:nvCxnSpPr>
+          <p:cNvPr id="24" name="Straight Arrow Connector 23">
+            <a:extLst>
+              <a:ext uri="{FF2B5EF4-FFF2-40B4-BE49-F238E27FC236}">
+                <a16:creationId xmlns:a16="http://schemas.microsoft.com/office/drawing/2014/main" id="{741D8A21-9299-65C8-AFE1-4D690DB0C454}"/>
+              </a:ext>
+            </a:extLst>
+          </p:cNvPr>
+          <p:cNvCxnSpPr>
+            <a:cxnSpLocks/>
+          </p:cNvCxnSpPr>
+          <p:nvPr/>
+        </p:nvCxnSpPr>
+        <p:spPr>
+          <a:xfrm flipH="1">
+            <a:off x="1449658" y="723871"/>
+            <a:ext cx="558006" cy="0"/>
+          </a:xfrm>
+          <a:prstGeom prst="straightConnector1">
+            <a:avLst/>
+          </a:prstGeom>
+          <a:ln w="12700">
+            <a:solidFill>
+              <a:schemeClr val="tx1"/>
+            </a:solidFill>
+            <a:tailEnd type="triangle"/>
+          </a:ln>
+        </p:spPr>
+        <p:style>
+          <a:lnRef idx="1">
+            <a:schemeClr val="accent1"/>
+          </a:lnRef>
+          <a:fillRef idx="0">
+            <a:schemeClr val="accent1"/>
+          </a:fillRef>
+          <a:effectRef idx="0">
+            <a:schemeClr val="accent1"/>
+          </a:effectRef>
+          <a:fontRef idx="minor">
+            <a:schemeClr val="tx1"/>
+          </a:fontRef>
+        </p:style>
+      </p:cxnSp>
+      <p:cxnSp>
+        <p:nvCxnSpPr>
+          <p:cNvPr id="25" name="Straight Arrow Connector 24">
+            <a:extLst>
+              <a:ext uri="{FF2B5EF4-FFF2-40B4-BE49-F238E27FC236}">
+                <a16:creationId xmlns:a16="http://schemas.microsoft.com/office/drawing/2014/main" id="{4275F2C2-8AF3-827F-1D0C-936571A780EE}"/>
+              </a:ext>
+            </a:extLst>
+          </p:cNvPr>
+          <p:cNvCxnSpPr>
+            <a:cxnSpLocks/>
+          </p:cNvCxnSpPr>
+          <p:nvPr/>
+        </p:nvCxnSpPr>
+        <p:spPr>
+          <a:xfrm>
+            <a:off x="3120197" y="615651"/>
+            <a:ext cx="558006" cy="0"/>
+          </a:xfrm>
+          <a:prstGeom prst="straightConnector1">
+            <a:avLst/>
+          </a:prstGeom>
+          <a:ln w="12700">
+            <a:solidFill>
+              <a:schemeClr val="tx1"/>
+            </a:solidFill>
+            <a:tailEnd type="triangle"/>
+          </a:ln>
+        </p:spPr>
+        <p:style>
+          <a:lnRef idx="1">
+            <a:schemeClr val="accent1"/>
+          </a:lnRef>
+          <a:fillRef idx="0">
+            <a:schemeClr val="accent1"/>
+          </a:fillRef>
+          <a:effectRef idx="0">
+            <a:schemeClr val="accent1"/>
+          </a:effectRef>
+          <a:fontRef idx="minor">
+            <a:schemeClr val="tx1"/>
+          </a:fontRef>
+        </p:style>
+      </p:cxnSp>
+      <p:cxnSp>
+        <p:nvCxnSpPr>
+          <p:cNvPr id="26" name="Straight Arrow Connector 25">
+            <a:extLst>
+              <a:ext uri="{FF2B5EF4-FFF2-40B4-BE49-F238E27FC236}">
+                <a16:creationId xmlns:a16="http://schemas.microsoft.com/office/drawing/2014/main" id="{B03C4195-D917-D768-9008-83DF505E1C1B}"/>
+              </a:ext>
+            </a:extLst>
+          </p:cNvPr>
+          <p:cNvCxnSpPr>
+            <a:cxnSpLocks/>
+          </p:cNvCxnSpPr>
+          <p:nvPr/>
+        </p:nvCxnSpPr>
+        <p:spPr>
+          <a:xfrm flipH="1">
+            <a:off x="3120197" y="723871"/>
+            <a:ext cx="558006" cy="0"/>
+          </a:xfrm>
+          <a:prstGeom prst="straightConnector1">
+            <a:avLst/>
+          </a:prstGeom>
+          <a:ln w="12700">
+            <a:solidFill>
+              <a:schemeClr val="tx1"/>
+            </a:solidFill>
+            <a:tailEnd type="triangle"/>
+          </a:ln>
+        </p:spPr>
+        <p:style>
+          <a:lnRef idx="1">
+            <a:schemeClr val="accent1"/>
+          </a:lnRef>
+          <a:fillRef idx="0">
+            <a:schemeClr val="accent1"/>
+          </a:fillRef>
+          <a:effectRef idx="0">
+            <a:schemeClr val="accent1"/>
+          </a:effectRef>
+          <a:fontRef idx="minor">
+            <a:schemeClr val="tx1"/>
+          </a:fontRef>
+        </p:style>
+      </p:cxnSp>
+      <p:cxnSp>
+        <p:nvCxnSpPr>
+          <p:cNvPr id="28" name="Straight Arrow Connector 27">
+            <a:extLst>
+              <a:ext uri="{FF2B5EF4-FFF2-40B4-BE49-F238E27FC236}">
+                <a16:creationId xmlns:a16="http://schemas.microsoft.com/office/drawing/2014/main" id="{9D01E4B8-8569-7B7B-7620-99BB622CF791}"/>
+              </a:ext>
+            </a:extLst>
+          </p:cNvPr>
+          <p:cNvCxnSpPr>
+            <a:stCxn id="4" idx="2"/>
+            <a:endCxn id="5" idx="0"/>
+          </p:cNvCxnSpPr>
+          <p:nvPr/>
+        </p:nvCxnSpPr>
+        <p:spPr>
+          <a:xfrm flipH="1">
+            <a:off x="893391" y="926936"/>
+            <a:ext cx="1" cy="414249"/>
+          </a:xfrm>
+          <a:prstGeom prst="straightConnector1">
+            <a:avLst/>
+          </a:prstGeom>
+          <a:ln w="12700">
+            <a:solidFill>
+              <a:schemeClr val="tx1"/>
+            </a:solidFill>
+            <a:tailEnd type="triangle"/>
+          </a:ln>
+        </p:spPr>
+        <p:style>
+          <a:lnRef idx="1">
+            <a:schemeClr val="accent1"/>
+          </a:lnRef>
+          <a:fillRef idx="0">
+            <a:schemeClr val="accent1"/>
+          </a:fillRef>
+          <a:effectRef idx="0">
+            <a:schemeClr val="accent1"/>
+          </a:effectRef>
+          <a:fontRef idx="minor">
+            <a:schemeClr val="tx1"/>
+          </a:fontRef>
+        </p:style>
+      </p:cxnSp>
+      <p:cxnSp>
+        <p:nvCxnSpPr>
+          <p:cNvPr id="29" name="Straight Arrow Connector 28">
+            <a:extLst>
+              <a:ext uri="{FF2B5EF4-FFF2-40B4-BE49-F238E27FC236}">
+                <a16:creationId xmlns:a16="http://schemas.microsoft.com/office/drawing/2014/main" id="{B841F6C8-14FE-C92D-4346-F9201CAD8A4E}"/>
+              </a:ext>
+            </a:extLst>
+          </p:cNvPr>
+          <p:cNvCxnSpPr/>
+          <p:nvPr/>
+        </p:nvCxnSpPr>
+        <p:spPr>
+          <a:xfrm flipH="1">
+            <a:off x="2560659" y="926936"/>
+            <a:ext cx="1" cy="414249"/>
+          </a:xfrm>
+          <a:prstGeom prst="straightConnector1">
+            <a:avLst/>
+          </a:prstGeom>
+          <a:ln w="12700">
+            <a:solidFill>
+              <a:schemeClr val="tx1"/>
+            </a:solidFill>
+            <a:tailEnd type="triangle"/>
+          </a:ln>
+        </p:spPr>
+        <p:style>
+          <a:lnRef idx="1">
+            <a:schemeClr val="accent1"/>
+          </a:lnRef>
+          <a:fillRef idx="0">
+            <a:schemeClr val="accent1"/>
+          </a:fillRef>
+          <a:effectRef idx="0">
+            <a:schemeClr val="accent1"/>
+          </a:effectRef>
+          <a:fontRef idx="minor">
+            <a:schemeClr val="tx1"/>
+          </a:fontRef>
+        </p:style>
+      </p:cxnSp>
+      <p:cxnSp>
+        <p:nvCxnSpPr>
+          <p:cNvPr id="30" name="Straight Arrow Connector 29">
+            <a:extLst>
+              <a:ext uri="{FF2B5EF4-FFF2-40B4-BE49-F238E27FC236}">
+                <a16:creationId xmlns:a16="http://schemas.microsoft.com/office/drawing/2014/main" id="{E6296B51-F81A-3962-C316-965A05F8E610}"/>
+              </a:ext>
+            </a:extLst>
+          </p:cNvPr>
+          <p:cNvCxnSpPr/>
+          <p:nvPr/>
+        </p:nvCxnSpPr>
+        <p:spPr>
+          <a:xfrm flipH="1">
+            <a:off x="4240708" y="920663"/>
+            <a:ext cx="1" cy="414249"/>
+          </a:xfrm>
+          <a:prstGeom prst="straightConnector1">
+            <a:avLst/>
+          </a:prstGeom>
+          <a:ln w="12700">
+            <a:solidFill>
+              <a:schemeClr val="tx1"/>
+            </a:solidFill>
+            <a:tailEnd type="triangle"/>
+          </a:ln>
+        </p:spPr>
+        <p:style>
+          <a:lnRef idx="1">
+            <a:schemeClr val="accent1"/>
+          </a:lnRef>
+          <a:fillRef idx="0">
+            <a:schemeClr val="accent1"/>
+          </a:fillRef>
+          <a:effectRef idx="0">
+            <a:schemeClr val="accent1"/>
+          </a:effectRef>
+          <a:fontRef idx="minor">
+            <a:schemeClr val="tx1"/>
+          </a:fontRef>
+        </p:style>
+      </p:cxnSp>
+      <p:cxnSp>
+        <p:nvCxnSpPr>
+          <p:cNvPr id="34" name="Elbow Connector 33">
+            <a:extLst>
+              <a:ext uri="{FF2B5EF4-FFF2-40B4-BE49-F238E27FC236}">
+                <a16:creationId xmlns:a16="http://schemas.microsoft.com/office/drawing/2014/main" id="{FDBE5BB2-DF94-69FF-8A76-D01D9E1E7776}"/>
+              </a:ext>
+            </a:extLst>
+          </p:cNvPr>
+          <p:cNvCxnSpPr>
+            <a:cxnSpLocks/>
+          </p:cNvCxnSpPr>
+          <p:nvPr/>
+        </p:nvCxnSpPr>
+        <p:spPr>
+          <a:xfrm rot="5400000" flipH="1" flipV="1">
+            <a:off x="2509821" y="-1257953"/>
+            <a:ext cx="12700" cy="3341078"/>
+          </a:xfrm>
+          <a:prstGeom prst="bentConnector3">
+            <a:avLst>
+              <a:gd name="adj1" fmla="val 1800000"/>
+            </a:avLst>
+          </a:prstGeom>
+          <a:ln w="12700">
+            <a:solidFill>
+              <a:schemeClr val="tx1"/>
+            </a:solidFill>
+            <a:tailEnd type="triangle"/>
+          </a:ln>
+        </p:spPr>
+        <p:style>
+          <a:lnRef idx="1">
+            <a:schemeClr val="accent1"/>
+          </a:lnRef>
+          <a:fillRef idx="0">
+            <a:schemeClr val="accent1"/>
+          </a:fillRef>
+          <a:effectRef idx="0">
+            <a:schemeClr val="accent1"/>
+          </a:effectRef>
+          <a:fontRef idx="minor">
+            <a:schemeClr val="tx1"/>
+          </a:fontRef>
+        </p:style>
+      </p:cxnSp>
+      <p:cxnSp>
+        <p:nvCxnSpPr>
+          <p:cNvPr id="35" name="Elbow Connector 34">
+            <a:extLst>
+              <a:ext uri="{FF2B5EF4-FFF2-40B4-BE49-F238E27FC236}">
+                <a16:creationId xmlns:a16="http://schemas.microsoft.com/office/drawing/2014/main" id="{0E7670D9-6C6F-6621-1246-279F0450E349}"/>
+              </a:ext>
+            </a:extLst>
+          </p:cNvPr>
+          <p:cNvCxnSpPr>
+            <a:cxnSpLocks/>
+          </p:cNvCxnSpPr>
+          <p:nvPr/>
+        </p:nvCxnSpPr>
+        <p:spPr>
+          <a:xfrm rot="16200000" flipV="1">
+            <a:off x="2618041" y="-1256579"/>
+            <a:ext cx="12700" cy="3341078"/>
+          </a:xfrm>
+          <a:prstGeom prst="bentConnector3">
+            <a:avLst>
+              <a:gd name="adj1" fmla="val 2396449"/>
+            </a:avLst>
+          </a:prstGeom>
+          <a:ln w="12700">
+            <a:solidFill>
+              <a:schemeClr val="tx1"/>
+            </a:solidFill>
+            <a:tailEnd type="triangle"/>
+          </a:ln>
+        </p:spPr>
+        <p:style>
+          <a:lnRef idx="1">
+            <a:schemeClr val="accent1"/>
+          </a:lnRef>
+          <a:fillRef idx="0">
+            <a:schemeClr val="accent1"/>
+          </a:fillRef>
+          <a:effectRef idx="0">
+            <a:schemeClr val="accent1"/>
+          </a:effectRef>
+          <a:fontRef idx="minor">
+            <a:schemeClr val="tx1"/>
+          </a:fontRef>
+        </p:style>
+      </p:cxnSp>
+    </p:spTree>
+    <p:extLst>
+      <p:ext uri="{BB962C8B-B14F-4D97-AF65-F5344CB8AC3E}">
+        <p14:creationId xmlns:p14="http://schemas.microsoft.com/office/powerpoint/2010/main" val="3763073775"/>
       </p:ext>
     </p:extLst>
   </p:cSld>

</xml_diff>